<commit_message>
presentation documents can contain diagram images, improved detail decision template in presentation docs (TFS Integration from 'addin.visualstudio.com (VC)' Id: 342;CreationDate: 2013-07-28 12:50:14 UTC;)((Edited by spyrosikmd@gmail.com))
</commit_message>
<xml_diff>
--- a/DecisionViewpoints/Template.pptx
+++ b/DecisionViewpoints/Template.pptx
@@ -6,6 +6,7 @@
   </p:sldMasterIdLst>
   <p:sldIdLst>
     <p:sldId id="256" r:id="rId2"/>
+    <p:sldId id="257" r:id="rId3"/>
   </p:sldIdLst>
   <p:sldSz cx="9144000" cy="6858000" type="screen4x3"/>
   <p:notesSz cx="6858000" cy="9144000"/>
@@ -108,7 +109,7 @@
 </file>
 
 <file path=ppt/slideLayouts/slideLayout1.xml><?xml version="1.0" encoding="utf-8"?>
-<p:sldLayout xmlns:a="http://schemas.openxmlformats.org/drawingml/2006/main" xmlns:r="http://schemas.openxmlformats.org/officeDocument/2006/relationships" xmlns:p="http://schemas.openxmlformats.org/presentationml/2006/main" type="title" preserve="1">
+<p:sldLayout xmlns:a="http://schemas.openxmlformats.org/drawingml/2006/main" xmlns:r="http://schemas.openxmlformats.org/officeDocument/2006/relationships" xmlns:p="http://schemas.openxmlformats.org/presentationml/2006/main" preserve="1" userDrawn="1">
   <p:cSld name="Title Slide">
     <p:spTree>
       <p:nvGrpSpPr>
@@ -288,7 +289,7 @@
           <a:p>
             <a:fld id="{3EC25210-86F0-4E6C-AD5E-B8BB5E189FC5}" type="datetimeFigureOut">
               <a:rPr lang="en-US" smtClean="0"/>
-              <a:t>7/27/2013</a:t>
+              <a:t>7/28/2013</a:t>
             </a:fld>
             <a:endParaRPr lang="en-US"/>
           </a:p>
@@ -333,6 +334,36 @@
               <a:t>‹#›</a:t>
             </a:fld>
             <a:endParaRPr lang="en-US"/>
+          </a:p>
+        </p:txBody>
+      </p:sp>
+      <p:sp>
+        <p:nvSpPr>
+          <p:cNvPr id="9" name="Text Placeholder 7"/>
+          <p:cNvSpPr>
+            <a:spLocks noGrp="1"/>
+          </p:cNvSpPr>
+          <p:nvPr>
+            <p:ph type="body" sz="quarter" idx="13"/>
+          </p:nvPr>
+        </p:nvSpPr>
+        <p:spPr>
+          <a:xfrm>
+            <a:off x="1828800" y="838200"/>
+            <a:ext cx="2895600" cy="609600"/>
+          </a:xfrm>
+        </p:spPr>
+        <p:txBody>
+          <a:bodyPr/>
+          <a:lstStyle>
+            <a:lvl1pPr marL="0" indent="0">
+              <a:buNone/>
+              <a:defRPr/>
+            </a:lvl1pPr>
+          </a:lstStyle>
+          <a:p>
+            <a:pPr lvl="0"/>
+            <a:endParaRPr lang="en-US" dirty="0"/>
           </a:p>
         </p:txBody>
       </p:sp>
@@ -458,7 +489,7 @@
           <a:p>
             <a:fld id="{3EC25210-86F0-4E6C-AD5E-B8BB5E189FC5}" type="datetimeFigureOut">
               <a:rPr lang="en-US" smtClean="0"/>
-              <a:t>7/27/2013</a:t>
+              <a:t>7/28/2013</a:t>
             </a:fld>
             <a:endParaRPr lang="en-US"/>
           </a:p>
@@ -638,7 +669,7 @@
           <a:p>
             <a:fld id="{3EC25210-86F0-4E6C-AD5E-B8BB5E189FC5}" type="datetimeFigureOut">
               <a:rPr lang="en-US" smtClean="0"/>
-              <a:t>7/27/2013</a:t>
+              <a:t>7/28/2013</a:t>
             </a:fld>
             <a:endParaRPr lang="en-US"/>
           </a:p>
@@ -808,7 +839,7 @@
           <a:p>
             <a:fld id="{3EC25210-86F0-4E6C-AD5E-B8BB5E189FC5}" type="datetimeFigureOut">
               <a:rPr lang="en-US" smtClean="0"/>
-              <a:t>7/27/2013</a:t>
+              <a:t>7/28/2013</a:t>
             </a:fld>
             <a:endParaRPr lang="en-US"/>
           </a:p>
@@ -1054,7 +1085,7 @@
           <a:p>
             <a:fld id="{3EC25210-86F0-4E6C-AD5E-B8BB5E189FC5}" type="datetimeFigureOut">
               <a:rPr lang="en-US" smtClean="0"/>
-              <a:t>7/27/2013</a:t>
+              <a:t>7/28/2013</a:t>
             </a:fld>
             <a:endParaRPr lang="en-US"/>
           </a:p>
@@ -1342,7 +1373,7 @@
           <a:p>
             <a:fld id="{3EC25210-86F0-4E6C-AD5E-B8BB5E189FC5}" type="datetimeFigureOut">
               <a:rPr lang="en-US" smtClean="0"/>
-              <a:t>7/27/2013</a:t>
+              <a:t>7/28/2013</a:t>
             </a:fld>
             <a:endParaRPr lang="en-US"/>
           </a:p>
@@ -1764,7 +1795,7 @@
           <a:p>
             <a:fld id="{3EC25210-86F0-4E6C-AD5E-B8BB5E189FC5}" type="datetimeFigureOut">
               <a:rPr lang="en-US" smtClean="0"/>
-              <a:t>7/27/2013</a:t>
+              <a:t>7/28/2013</a:t>
             </a:fld>
             <a:endParaRPr lang="en-US"/>
           </a:p>
@@ -1882,7 +1913,7 @@
           <a:p>
             <a:fld id="{3EC25210-86F0-4E6C-AD5E-B8BB5E189FC5}" type="datetimeFigureOut">
               <a:rPr lang="en-US" smtClean="0"/>
-              <a:t>7/27/2013</a:t>
+              <a:t>7/28/2013</a:t>
             </a:fld>
             <a:endParaRPr lang="en-US"/>
           </a:p>
@@ -1977,7 +2008,7 @@
           <a:p>
             <a:fld id="{3EC25210-86F0-4E6C-AD5E-B8BB5E189FC5}" type="datetimeFigureOut">
               <a:rPr lang="en-US" smtClean="0"/>
-              <a:t>7/27/2013</a:t>
+              <a:t>7/28/2013</a:t>
             </a:fld>
             <a:endParaRPr lang="en-US"/>
           </a:p>
@@ -2254,7 +2285,7 @@
           <a:p>
             <a:fld id="{3EC25210-86F0-4E6C-AD5E-B8BB5E189FC5}" type="datetimeFigureOut">
               <a:rPr lang="en-US" smtClean="0"/>
-              <a:t>7/27/2013</a:t>
+              <a:t>7/28/2013</a:t>
             </a:fld>
             <a:endParaRPr lang="en-US"/>
           </a:p>
@@ -2507,7 +2538,7 @@
           <a:p>
             <a:fld id="{3EC25210-86F0-4E6C-AD5E-B8BB5E189FC5}" type="datetimeFigureOut">
               <a:rPr lang="en-US" smtClean="0"/>
-              <a:t>7/27/2013</a:t>
+              <a:t>7/28/2013</a:t>
             </a:fld>
             <a:endParaRPr lang="en-US"/>
           </a:p>
@@ -2720,7 +2751,7 @@
           <a:p>
             <a:fld id="{3EC25210-86F0-4E6C-AD5E-B8BB5E189FC5}" type="datetimeFigureOut">
               <a:rPr lang="en-US" smtClean="0"/>
-              <a:t>7/27/2013</a:t>
+              <a:t>7/28/2013</a:t>
             </a:fld>
             <a:endParaRPr lang="en-US"/>
           </a:p>
@@ -3104,14 +3135,14 @@
           <p:nvPr>
             <p:extLst>
               <p:ext uri="{D42A27DB-BD31-4B8C-83A1-F6EECF244321}">
-                <p14:modId xmlns:p14="http://schemas.microsoft.com/office/powerpoint/2010/main" val="3734576391"/>
+                <p14:modId xmlns:p14="http://schemas.microsoft.com/office/powerpoint/2010/main" val="3251908189"/>
               </p:ext>
             </p:extLst>
           </p:nvPr>
         </p:nvGraphicFramePr>
         <p:xfrm>
-          <a:off x="1524000" y="1397000"/>
-          <a:ext cx="6096000" cy="1483360"/>
+          <a:off x="838200" y="685800"/>
+          <a:ext cx="7391401" cy="2743201"/>
         </p:xfrm>
         <a:graphic>
           <a:graphicData uri="http://schemas.openxmlformats.org/drawingml/2006/table">
@@ -3120,19 +3151,20 @@
                 <a:tableStyleId>{5C22544A-7EE6-4342-B048-85BDC9FD1C3A}</a:tableStyleId>
               </a:tblPr>
               <a:tblGrid>
-                <a:gridCol w="1219200"/>
-                <a:gridCol w="1219200"/>
-                <a:gridCol w="1219200"/>
-                <a:gridCol w="1219200"/>
-                <a:gridCol w="1219200"/>
+                <a:gridCol w="1676400"/>
+                <a:gridCol w="5715001"/>
               </a:tblGrid>
-              <a:tr h="370840">
+              <a:tr h="304801">
                 <a:tc>
                   <a:txBody>
                     <a:bodyPr/>
                     <a:lstStyle/>
                     <a:p>
-                      <a:endParaRPr lang="en-US" dirty="0"/>
+                      <a:r>
+                        <a:rPr lang="en-US" sz="1200" dirty="0" smtClean="0"/>
+                        <a:t>Name</a:t>
+                      </a:r>
+                      <a:endParaRPr lang="en-US" sz="1200" dirty="0"/>
                     </a:p>
                   </a:txBody>
                   <a:tcPr/>
@@ -3143,10 +3175,26 @@
                     <a:lstStyle/>
                     <a:p>
                       <a:r>
-                        <a:rPr lang="en-US" dirty="0" smtClean="0"/>
-                        <a:t>Concerns</a:t>
+                        <a:rPr lang="en-US" sz="1200" dirty="0" smtClean="0"/>
+                        <a:t>{name}</a:t>
                       </a:r>
-                      <a:endParaRPr lang="en-US" dirty="0"/>
+                      <a:endParaRPr lang="en-US" sz="1200" dirty="0"/>
+                    </a:p>
+                  </a:txBody>
+                  <a:tcPr/>
+                </a:tc>
+              </a:tr>
+              <a:tr h="304800">
+                <a:tc>
+                  <a:txBody>
+                    <a:bodyPr/>
+                    <a:lstStyle/>
+                    <a:p>
+                      <a:r>
+                        <a:rPr lang="en-US" sz="1200" dirty="0" smtClean="0"/>
+                        <a:t>State</a:t>
+                      </a:r>
+                      <a:endParaRPr lang="en-US" sz="1200" dirty="0"/>
                     </a:p>
                   </a:txBody>
                   <a:tcPr/>
@@ -3157,46 +3205,26 @@
                     <a:lstStyle/>
                     <a:p>
                       <a:r>
-                        <a:rPr lang="en-US" dirty="0" smtClean="0"/>
-                        <a:t>#d1#</a:t>
+                        <a:rPr lang="en-US" sz="1200" dirty="0" smtClean="0"/>
+                        <a:t>{state}</a:t>
                       </a:r>
-                      <a:endParaRPr lang="en-US" dirty="0"/>
-                    </a:p>
-                  </a:txBody>
-                  <a:tcPr/>
-                </a:tc>
-                <a:tc>
-                  <a:txBody>
-                    <a:bodyPr/>
-                    <a:lstStyle/>
-                    <a:p>
-                      <a:endParaRPr lang="en-US"/>
-                    </a:p>
-                  </a:txBody>
-                  <a:tcPr/>
-                </a:tc>
-                <a:tc>
-                  <a:txBody>
-                    <a:bodyPr/>
-                    <a:lstStyle/>
-                    <a:p>
-                      <a:endParaRPr lang="en-US"/>
+                      <a:endParaRPr lang="en-US" sz="1200" dirty="0"/>
                     </a:p>
                   </a:txBody>
                   <a:tcPr/>
                 </a:tc>
               </a:tr>
-              <a:tr h="370840">
+              <a:tr h="304800">
                 <a:tc>
                   <a:txBody>
                     <a:bodyPr/>
                     <a:lstStyle/>
                     <a:p>
                       <a:r>
-                        <a:rPr lang="en-US" dirty="0" smtClean="0"/>
-                        <a:t>#req1#</a:t>
+                        <a:rPr lang="en-US" sz="1200" dirty="0" smtClean="0"/>
+                        <a:t>Group</a:t>
                       </a:r>
-                      <a:endParaRPr lang="en-US" dirty="0"/>
+                      <a:endParaRPr lang="en-US" sz="1200" dirty="0"/>
                     </a:p>
                   </a:txBody>
                   <a:tcPr/>
@@ -3207,10 +3235,26 @@
                     <a:lstStyle/>
                     <a:p>
                       <a:r>
-                        <a:rPr lang="en-US" smtClean="0"/>
-                        <a:t>#c1#</a:t>
+                        <a:rPr lang="en-US" sz="1200" dirty="0" smtClean="0"/>
+                        <a:t>{group}</a:t>
                       </a:r>
-                      <a:endParaRPr lang="en-US"/>
+                      <a:endParaRPr lang="en-US" sz="1200" dirty="0"/>
+                    </a:p>
+                  </a:txBody>
+                  <a:tcPr/>
+                </a:tc>
+              </a:tr>
+              <a:tr h="304800">
+                <a:tc>
+                  <a:txBody>
+                    <a:bodyPr/>
+                    <a:lstStyle/>
+                    <a:p>
+                      <a:r>
+                        <a:rPr lang="en-US" sz="1200" dirty="0" smtClean="0"/>
+                        <a:t>Problem/Issue</a:t>
+                      </a:r>
+                      <a:endParaRPr lang="en-US" sz="1200" dirty="0"/>
                     </a:p>
                   </a:txBody>
                   <a:tcPr/>
@@ -3221,10 +3265,26 @@
                     <a:lstStyle/>
                     <a:p>
                       <a:r>
-                        <a:rPr lang="en-US" dirty="0" smtClean="0"/>
-                        <a:t>#rat1#</a:t>
+                        <a:rPr lang="en-US" sz="1200" dirty="0" smtClean="0"/>
+                        <a:t>{issue}</a:t>
                       </a:r>
-                      <a:endParaRPr lang="en-US" dirty="0"/>
+                      <a:endParaRPr lang="en-US" sz="1200" dirty="0"/>
+                    </a:p>
+                  </a:txBody>
+                  <a:tcPr/>
+                </a:tc>
+              </a:tr>
+              <a:tr h="304800">
+                <a:tc>
+                  <a:txBody>
+                    <a:bodyPr/>
+                    <a:lstStyle/>
+                    <a:p>
+                      <a:r>
+                        <a:rPr lang="en-US" sz="1200" dirty="0" smtClean="0"/>
+                        <a:t>Decision</a:t>
+                      </a:r>
+                      <a:endParaRPr lang="en-US" sz="1200" dirty="0"/>
                     </a:p>
                   </a:txBody>
                   <a:tcPr/>
@@ -3234,7 +3294,27 @@
                     <a:bodyPr/>
                     <a:lstStyle/>
                     <a:p>
-                      <a:endParaRPr lang="en-US"/>
+                      <a:r>
+                        <a:rPr lang="en-US" sz="1200" dirty="0" smtClean="0"/>
+                        <a:t>{decision}</a:t>
+                      </a:r>
+                      <a:endParaRPr lang="en-US" sz="1200" dirty="0"/>
+                    </a:p>
+                  </a:txBody>
+                  <a:tcPr/>
+                </a:tc>
+              </a:tr>
+              <a:tr h="304800">
+                <a:tc>
+                  <a:txBody>
+                    <a:bodyPr/>
+                    <a:lstStyle/>
+                    <a:p>
+                      <a:r>
+                        <a:rPr lang="en-US" sz="1200" dirty="0" smtClean="0"/>
+                        <a:t>Alternatives</a:t>
+                      </a:r>
+                      <a:endParaRPr lang="en-US" sz="1200" dirty="0"/>
                     </a:p>
                   </a:txBody>
                   <a:tcPr/>
@@ -3244,23 +3324,27 @@
                     <a:bodyPr/>
                     <a:lstStyle/>
                     <a:p>
-                      <a:endParaRPr lang="en-US"/>
+                      <a:r>
+                        <a:rPr lang="en-US" sz="1200" dirty="0" smtClean="0"/>
+                        <a:t>{alternatives}</a:t>
+                      </a:r>
+                      <a:endParaRPr lang="en-US" sz="1200" dirty="0"/>
                     </a:p>
                   </a:txBody>
                   <a:tcPr/>
                 </a:tc>
               </a:tr>
-              <a:tr h="370840">
+              <a:tr h="304800">
                 <a:tc>
                   <a:txBody>
                     <a:bodyPr/>
                     <a:lstStyle/>
                     <a:p>
                       <a:r>
-                        <a:rPr lang="en-US" dirty="0" smtClean="0"/>
-                        <a:t>#r2#</a:t>
+                        <a:rPr lang="en-US" sz="1200" dirty="0" smtClean="0"/>
+                        <a:t>Arguments</a:t>
                       </a:r>
-                      <a:endParaRPr lang="en-US" dirty="0"/>
+                      <a:endParaRPr lang="en-US" sz="1200" dirty="0"/>
                     </a:p>
                   </a:txBody>
                   <a:tcPr/>
@@ -3270,7 +3354,27 @@
                     <a:bodyPr/>
                     <a:lstStyle/>
                     <a:p>
-                      <a:endParaRPr lang="en-US"/>
+                      <a:r>
+                        <a:rPr lang="en-US" sz="1200" dirty="0" smtClean="0"/>
+                        <a:t>{arguments}</a:t>
+                      </a:r>
+                      <a:endParaRPr lang="en-US" sz="1200" dirty="0"/>
+                    </a:p>
+                  </a:txBody>
+                  <a:tcPr/>
+                </a:tc>
+              </a:tr>
+              <a:tr h="304800">
+                <a:tc>
+                  <a:txBody>
+                    <a:bodyPr/>
+                    <a:lstStyle/>
+                    <a:p>
+                      <a:r>
+                        <a:rPr lang="en-US" sz="1200" dirty="0" smtClean="0"/>
+                        <a:t>Related Decision</a:t>
+                      </a:r>
+                      <a:endParaRPr lang="en-US" sz="1200" dirty="0"/>
                     </a:p>
                   </a:txBody>
                   <a:tcPr/>
@@ -3280,7 +3384,27 @@
                     <a:bodyPr/>
                     <a:lstStyle/>
                     <a:p>
-                      <a:endParaRPr lang="en-US"/>
+                      <a:r>
+                        <a:rPr lang="en-US" sz="1200" dirty="0" smtClean="0"/>
+                        <a:t>{decisions}</a:t>
+                      </a:r>
+                      <a:endParaRPr lang="en-US" sz="1200" dirty="0"/>
+                    </a:p>
+                  </a:txBody>
+                  <a:tcPr/>
+                </a:tc>
+              </a:tr>
+              <a:tr h="304800">
+                <a:tc>
+                  <a:txBody>
+                    <a:bodyPr/>
+                    <a:lstStyle/>
+                    <a:p>
+                      <a:r>
+                        <a:rPr lang="en-US" sz="1200" dirty="0" smtClean="0"/>
+                        <a:t>Related Requirements</a:t>
+                      </a:r>
+                      <a:endParaRPr lang="en-US" sz="1200" dirty="0"/>
                     </a:p>
                   </a:txBody>
                   <a:tcPr/>
@@ -3290,89 +3414,11 @@
                     <a:bodyPr/>
                     <a:lstStyle/>
                     <a:p>
-                      <a:endParaRPr lang="en-US"/>
-                    </a:p>
-                  </a:txBody>
-                  <a:tcPr/>
-                </a:tc>
-                <a:tc>
-                  <a:txBody>
-                    <a:bodyPr/>
-                    <a:lstStyle/>
-                    <a:p>
-                      <a:endParaRPr lang="en-US"/>
-                    </a:p>
-                  </a:txBody>
-                  <a:tcPr/>
-                </a:tc>
-              </a:tr>
-              <a:tr h="370840">
-                <a:tc>
-                  <a:txBody>
-                    <a:bodyPr/>
-                    <a:lstStyle/>
-                    <a:p>
-                      <a:pPr marL="0" marR="0" indent="0" algn="l" defTabSz="914400" rtl="0" eaLnBrk="1" fontAlgn="auto" latinLnBrk="0" hangingPunct="1">
-                        <a:lnSpc>
-                          <a:spcPct val="100000"/>
-                        </a:lnSpc>
-                        <a:spcBef>
-                          <a:spcPts val="0"/>
-                        </a:spcBef>
-                        <a:spcAft>
-                          <a:spcPts val="0"/>
-                        </a:spcAft>
-                        <a:buClrTx/>
-                        <a:buSzTx/>
-                        <a:buFontTx/>
-                        <a:buNone/>
-                        <a:tabLst/>
-                        <a:defRPr/>
-                      </a:pPr>
                       <a:r>
-                        <a:rPr lang="en-US" dirty="0" smtClean="0"/>
-                        <a:t>#r3#</a:t>
+                        <a:rPr lang="en-US" sz="1200" dirty="0" smtClean="0"/>
+                        <a:t>{requirements}</a:t>
                       </a:r>
-                    </a:p>
-                  </a:txBody>
-                  <a:tcPr/>
-                </a:tc>
-                <a:tc>
-                  <a:txBody>
-                    <a:bodyPr/>
-                    <a:lstStyle/>
-                    <a:p>
-                      <a:endParaRPr lang="en-US" dirty="0"/>
-                    </a:p>
-                  </a:txBody>
-                  <a:tcPr/>
-                </a:tc>
-                <a:tc>
-                  <a:txBody>
-                    <a:bodyPr/>
-                    <a:lstStyle/>
-                    <a:p>
-                      <a:endParaRPr lang="en-US"/>
-                    </a:p>
-                  </a:txBody>
-                  <a:tcPr/>
-                </a:tc>
-                <a:tc>
-                  <a:txBody>
-                    <a:bodyPr/>
-                    <a:lstStyle/>
-                    <a:p>
-                      <a:endParaRPr lang="en-US"/>
-                    </a:p>
-                  </a:txBody>
-                  <a:tcPr/>
-                </a:tc>
-                <a:tc>
-                  <a:txBody>
-                    <a:bodyPr/>
-                    <a:lstStyle/>
-                    <a:p>
-                      <a:endParaRPr lang="en-US" dirty="0"/>
+                      <a:endParaRPr lang="en-US" sz="1200" dirty="0"/>
                     </a:p>
                   </a:txBody>
                   <a:tcPr/>
@@ -3386,6 +3432,89 @@
     <p:extLst>
       <p:ext uri="{BB962C8B-B14F-4D97-AF65-F5344CB8AC3E}">
         <p14:creationId xmlns:p14="http://schemas.microsoft.com/office/powerpoint/2010/main" val="331602207"/>
+      </p:ext>
+    </p:extLst>
+  </p:cSld>
+  <p:clrMapOvr>
+    <a:masterClrMapping/>
+  </p:clrMapOvr>
+</p:sld>
+</file>
+
+<file path=ppt/slides/slide2.xml><?xml version="1.0" encoding="utf-8"?>
+<p:sld xmlns:a="http://schemas.openxmlformats.org/drawingml/2006/main" xmlns:r="http://schemas.openxmlformats.org/officeDocument/2006/relationships" xmlns:p="http://schemas.openxmlformats.org/presentationml/2006/main">
+  <p:cSld>
+    <p:spTree>
+      <p:nvGrpSpPr>
+        <p:cNvPr id="1" name=""/>
+        <p:cNvGrpSpPr/>
+        <p:nvPr/>
+      </p:nvGrpSpPr>
+      <p:grpSpPr>
+        <a:xfrm>
+          <a:off x="0" y="0"/>
+          <a:ext cx="0" cy="0"/>
+          <a:chOff x="0" y="0"/>
+          <a:chExt cx="0" cy="0"/>
+        </a:xfrm>
+      </p:grpSpPr>
+      <p:sp>
+        <p:nvSpPr>
+          <p:cNvPr id="2" name="Title 1"/>
+          <p:cNvSpPr>
+            <a:spLocks noGrp="1"/>
+          </p:cNvSpPr>
+          <p:nvPr>
+            <p:ph type="title"/>
+          </p:nvPr>
+        </p:nvSpPr>
+        <p:spPr/>
+        <p:txBody>
+          <a:bodyPr/>
+          <a:lstStyle/>
+          <a:p>
+            <a:r>
+              <a:rPr lang="en-US" dirty="0" smtClean="0"/>
+              <a:t>{title}</a:t>
+            </a:r>
+            <a:endParaRPr lang="en-US" dirty="0"/>
+          </a:p>
+        </p:txBody>
+      </p:sp>
+      <p:pic>
+        <p:nvPicPr>
+          <p:cNvPr id="4" name="Picture 3"/>
+          <p:cNvPicPr>
+            <a:picLocks noChangeAspect="1"/>
+          </p:cNvPicPr>
+          <p:nvPr/>
+        </p:nvPicPr>
+        <p:blipFill>
+          <a:blip r:embed="rId2">
+            <a:extLst>
+              <a:ext uri="{28A0092B-C50C-407E-A947-70E740481C1C}">
+                <a14:useLocalDpi xmlns:a14="http://schemas.microsoft.com/office/drawing/2010/main" val="0"/>
+              </a:ext>
+            </a:extLst>
+          </a:blip>
+          <a:stretch>
+            <a:fillRect/>
+          </a:stretch>
+        </p:blipFill>
+        <p:spPr>
+          <a:xfrm>
+            <a:off x="1371600" y="1600200"/>
+            <a:ext cx="6248400" cy="4686300"/>
+          </a:xfrm>
+          <a:prstGeom prst="rect">
+            <a:avLst/>
+          </a:prstGeom>
+        </p:spPr>
+      </p:pic>
+    </p:spTree>
+    <p:extLst>
+      <p:ext uri="{BB962C8B-B14F-4D97-AF65-F5344CB8AC3E}">
+        <p14:creationId xmlns:p14="http://schemas.microsoft.com/office/powerpoint/2010/main" val="133293622"/>
       </p:ext>
     </p:extLst>
   </p:cSld>

</xml_diff>

<commit_message>
refactoring, created abstract slides and specific types of slides for presentation report (TFS Integration from 'addin.visualstudio.com (VC)' Id: 343;CreationDate: 2013-07-28 15:03:10 UTC;)((Edited by spyrosikmd@gmail.com))
</commit_message>
<xml_diff>
--- a/DecisionViewpoints/Template.pptx
+++ b/DecisionViewpoints/Template.pptx
@@ -6,7 +6,8 @@
   </p:sldMasterIdLst>
   <p:sldIdLst>
     <p:sldId id="256" r:id="rId2"/>
-    <p:sldId id="257" r:id="rId3"/>
+    <p:sldId id="258" r:id="rId3"/>
+    <p:sldId id="259" r:id="rId4"/>
   </p:sldIdLst>
   <p:sldSz cx="9144000" cy="6858000" type="screen4x3"/>
   <p:notesSz cx="6858000" cy="9144000"/>
@@ -3483,9 +3484,9 @@
       </p:sp>
       <p:pic>
         <p:nvPicPr>
-          <p:cNvPr id="4" name="Picture 3"/>
+          <p:cNvPr id="1026" name="Picture 2"/>
           <p:cNvPicPr>
-            <a:picLocks noChangeAspect="1"/>
+            <a:picLocks noChangeAspect="1" noChangeArrowheads="1"/>
           </p:cNvPicPr>
           <p:nvPr/>
         </p:nvPicPr>
@@ -3497,24 +3498,159 @@
               </a:ext>
             </a:extLst>
           </a:blip>
+          <a:srcRect/>
           <a:stretch>
             <a:fillRect/>
           </a:stretch>
         </p:blipFill>
-        <p:spPr>
+        <p:spPr bwMode="auto">
           <a:xfrm>
-            <a:off x="1371600" y="1600200"/>
-            <a:ext cx="6248400" cy="4686300"/>
+            <a:off x="1295400" y="1447800"/>
+            <a:ext cx="6553200" cy="4932783"/>
           </a:xfrm>
           <a:prstGeom prst="rect">
             <a:avLst/>
           </a:prstGeom>
+          <a:noFill/>
+          <a:ln>
+            <a:noFill/>
+          </a:ln>
+          <a:extLst>
+            <a:ext uri="{909E8E84-426E-40DD-AFC4-6F175D3DCCD1}">
+              <a14:hiddenFill xmlns:a14="http://schemas.microsoft.com/office/drawing/2010/main">
+                <a:solidFill>
+                  <a:schemeClr val="accent1"/>
+                </a:solidFill>
+              </a14:hiddenFill>
+            </a:ext>
+            <a:ext uri="{91240B29-F687-4F45-9708-019B960494DF}">
+              <a14:hiddenLine xmlns:a14="http://schemas.microsoft.com/office/drawing/2010/main" w="9525">
+                <a:solidFill>
+                  <a:schemeClr val="tx1"/>
+                </a:solidFill>
+                <a:miter lim="800000"/>
+                <a:headEnd/>
+                <a:tailEnd/>
+              </a14:hiddenLine>
+            </a:ext>
+          </a:extLst>
         </p:spPr>
       </p:pic>
     </p:spTree>
     <p:extLst>
       <p:ext uri="{BB962C8B-B14F-4D97-AF65-F5344CB8AC3E}">
-        <p14:creationId xmlns:p14="http://schemas.microsoft.com/office/powerpoint/2010/main" val="133293622"/>
+        <p14:creationId xmlns:p14="http://schemas.microsoft.com/office/powerpoint/2010/main" val="3486677695"/>
+      </p:ext>
+    </p:extLst>
+  </p:cSld>
+  <p:clrMapOvr>
+    <a:masterClrMapping/>
+  </p:clrMapOvr>
+</p:sld>
+</file>
+
+<file path=ppt/slides/slide3.xml><?xml version="1.0" encoding="utf-8"?>
+<p:sld xmlns:a="http://schemas.openxmlformats.org/drawingml/2006/main" xmlns:r="http://schemas.openxmlformats.org/officeDocument/2006/relationships" xmlns:p="http://schemas.openxmlformats.org/presentationml/2006/main">
+  <p:cSld>
+    <p:spTree>
+      <p:nvGrpSpPr>
+        <p:cNvPr id="1" name=""/>
+        <p:cNvGrpSpPr/>
+        <p:nvPr/>
+      </p:nvGrpSpPr>
+      <p:grpSpPr>
+        <a:xfrm>
+          <a:off x="0" y="0"/>
+          <a:ext cx="0" cy="0"/>
+          <a:chOff x="0" y="0"/>
+          <a:chExt cx="0" cy="0"/>
+        </a:xfrm>
+      </p:grpSpPr>
+      <p:sp>
+        <p:nvSpPr>
+          <p:cNvPr id="2" name="Title 1"/>
+          <p:cNvSpPr>
+            <a:spLocks noGrp="1"/>
+          </p:cNvSpPr>
+          <p:nvPr>
+            <p:ph type="title"/>
+          </p:nvPr>
+        </p:nvSpPr>
+        <p:spPr/>
+        <p:txBody>
+          <a:bodyPr/>
+          <a:lstStyle/>
+          <a:p>
+            <a:r>
+              <a:rPr lang="en-US" dirty="0"/>
+              <a:t>{title}</a:t>
+            </a:r>
+            <a:endParaRPr lang="en-US" dirty="0"/>
+          </a:p>
+        </p:txBody>
+      </p:sp>
+      <p:graphicFrame>
+        <p:nvGraphicFramePr>
+          <p:cNvPr id="4" name="Table 3"/>
+          <p:cNvGraphicFramePr>
+            <a:graphicFrameLocks noGrp="1"/>
+          </p:cNvGraphicFramePr>
+          <p:nvPr>
+            <p:extLst>
+              <p:ext uri="{D42A27DB-BD31-4B8C-83A1-F6EECF244321}">
+                <p14:modId xmlns:p14="http://schemas.microsoft.com/office/powerpoint/2010/main" val="1170981647"/>
+              </p:ext>
+            </p:extLst>
+          </p:nvPr>
+        </p:nvGraphicFramePr>
+        <p:xfrm>
+          <a:off x="304800" y="1600200"/>
+          <a:ext cx="3505200" cy="370840"/>
+        </p:xfrm>
+        <a:graphic>
+          <a:graphicData uri="http://schemas.openxmlformats.org/drawingml/2006/table">
+            <a:tbl>
+              <a:tblPr firstRow="1" bandRow="1">
+                <a:tableStyleId>{5C22544A-7EE6-4342-B048-85BDC9FD1C3A}</a:tableStyleId>
+              </a:tblPr>
+              <a:tblGrid>
+                <a:gridCol w="1752600"/>
+                <a:gridCol w="1752600"/>
+              </a:tblGrid>
+              <a:tr h="370840">
+                <a:tc>
+                  <a:txBody>
+                    <a:bodyPr/>
+                    <a:lstStyle/>
+                    <a:p>
+                      <a:endParaRPr lang="en-US" sz="1200" dirty="0"/>
+                    </a:p>
+                  </a:txBody>
+                  <a:tcPr/>
+                </a:tc>
+                <a:tc>
+                  <a:txBody>
+                    <a:bodyPr/>
+                    <a:lstStyle/>
+                    <a:p>
+                      <a:r>
+                        <a:rPr lang="en-US" dirty="0" smtClean="0"/>
+                        <a:t>Concerns</a:t>
+                      </a:r>
+                      <a:endParaRPr lang="en-US" dirty="0"/>
+                    </a:p>
+                  </a:txBody>
+                  <a:tcPr/>
+                </a:tc>
+              </a:tr>
+            </a:tbl>
+          </a:graphicData>
+        </a:graphic>
+      </p:graphicFrame>
+    </p:spTree>
+    <p:extLst>
+      <p:ext uri="{BB962C8B-B14F-4D97-AF65-F5344CB8AC3E}">
+        <p14:creationId xmlns:p14="http://schemas.microsoft.com/office/powerpoint/2010/main" val="1849363573"/>
       </p:ext>
     </p:extLst>
   </p:cSld>

</xml_diff>

<commit_message>
implement prototype of excel report (TFS Integration from 'addin.visualstudio.com (VC)' Id: 345;CreationDate: 2013-07-29 13:18:08 UTC;)((Edited by spyrosikmd@gmail.com))
</commit_message>
<xml_diff>
--- a/DecisionViewpoints/Template.pptx
+++ b/DecisionViewpoints/Template.pptx
@@ -3585,7 +3585,6 @@
               <a:rPr lang="en-US" dirty="0"/>
               <a:t>{title}</a:t>
             </a:r>
-            <a:endParaRPr lang="en-US" dirty="0"/>
           </a:p>
         </p:txBody>
       </p:sp>
@@ -3598,14 +3597,14 @@
           <p:nvPr>
             <p:extLst>
               <p:ext uri="{D42A27DB-BD31-4B8C-83A1-F6EECF244321}">
-                <p14:modId xmlns:p14="http://schemas.microsoft.com/office/powerpoint/2010/main" val="1170981647"/>
+                <p14:modId xmlns:p14="http://schemas.microsoft.com/office/powerpoint/2010/main" val="2079796323"/>
               </p:ext>
             </p:extLst>
           </p:nvPr>
         </p:nvGraphicFramePr>
         <p:xfrm>
           <a:off x="304800" y="1600200"/>
-          <a:ext cx="3505200" cy="370840"/>
+          <a:ext cx="3124200" cy="274320"/>
         </p:xfrm>
         <a:graphic>
           <a:graphicData uri="http://schemas.openxmlformats.org/drawingml/2006/table">
@@ -3614,10 +3613,10 @@
                 <a:tableStyleId>{5C22544A-7EE6-4342-B048-85BDC9FD1C3A}</a:tableStyleId>
               </a:tblPr>
               <a:tblGrid>
-                <a:gridCol w="1752600"/>
-                <a:gridCol w="1752600"/>
+                <a:gridCol w="1562100"/>
+                <a:gridCol w="1562100"/>
               </a:tblGrid>
-              <a:tr h="370840">
+              <a:tr h="228600">
                 <a:tc>
                   <a:txBody>
                     <a:bodyPr/>
@@ -3634,10 +3633,10 @@
                     <a:lstStyle/>
                     <a:p>
                       <a:r>
-                        <a:rPr lang="en-US" dirty="0" smtClean="0"/>
+                        <a:rPr lang="en-US" sz="1200" dirty="0" smtClean="0"/>
                         <a:t>Concerns</a:t>
                       </a:r>
-                      <a:endParaRPr lang="en-US" dirty="0"/>
+                      <a:endParaRPr lang="en-US" sz="1200" dirty="0"/>
                     </a:p>
                   </a:txBody>
                   <a:tcPr/>

</xml_diff>

<commit_message>
changed a message (TFS Integration from 'addin.visualstudio.com (VC)' Id: 401;CreationDate: 2013-12-02 07:48:43 UTC;)((Edited by cm@notagain.de))
</commit_message>
<xml_diff>
--- a/DecisionViewpoints/Template.pptx
+++ b/DecisionViewpoints/Template.pptx
@@ -2,12 +2,13 @@
 <file path=ppt/presentation.xml><?xml version="1.0" encoding="utf-8"?>
 <p:presentation xmlns:a="http://schemas.openxmlformats.org/drawingml/2006/main" xmlns:r="http://schemas.openxmlformats.org/officeDocument/2006/relationships" xmlns:p="http://schemas.openxmlformats.org/presentationml/2006/main" saveSubsetFonts="1">
   <p:sldMasterIdLst>
-    <p:sldMasterId id="2147483648" r:id="rId1"/>
+    <p:sldMasterId id="2147484277" r:id="rId1"/>
   </p:sldMasterIdLst>
   <p:sldIdLst>
     <p:sldId id="256" r:id="rId2"/>
-    <p:sldId id="258" r:id="rId3"/>
-    <p:sldId id="259" r:id="rId4"/>
+    <p:sldId id="260" r:id="rId3"/>
+    <p:sldId id="258" r:id="rId4"/>
+    <p:sldId id="259" r:id="rId5"/>
   </p:sldIdLst>
   <p:sldSz cx="9144000" cy="6858000" type="screen4x3"/>
   <p:notesSz cx="6858000" cy="9144000"/>
@@ -110,7 +111,7 @@
 </file>
 
 <file path=ppt/slideLayouts/slideLayout1.xml><?xml version="1.0" encoding="utf-8"?>
-<p:sldLayout xmlns:a="http://schemas.openxmlformats.org/drawingml/2006/main" xmlns:r="http://schemas.openxmlformats.org/officeDocument/2006/relationships" xmlns:p="http://schemas.openxmlformats.org/presentationml/2006/main" preserve="1" userDrawn="1">
+<p:sldLayout xmlns:a="http://schemas.openxmlformats.org/drawingml/2006/main" xmlns:r="http://schemas.openxmlformats.org/officeDocument/2006/relationships" xmlns:p="http://schemas.openxmlformats.org/presentationml/2006/main" type="title" preserve="1">
   <p:cSld name="Title Slide">
     <p:spTree>
       <p:nvGrpSpPr>
@@ -128,29 +129,115 @@
       </p:grpSpPr>
       <p:sp>
         <p:nvSpPr>
-          <p:cNvPr id="2" name="Title 1"/>
-          <p:cNvSpPr>
-            <a:spLocks noGrp="1"/>
-          </p:cNvSpPr>
-          <p:nvPr>
-            <p:ph type="ctrTitle"/>
-          </p:nvPr>
+          <p:cNvPr id="7" name="Rectangle 6"/>
+          <p:cNvSpPr/>
+          <p:nvPr/>
         </p:nvSpPr>
         <p:spPr>
           <a:xfrm>
-            <a:off x="685800" y="2130425"/>
-            <a:ext cx="7772400" cy="1470025"/>
+            <a:off x="1328166" y="1295400"/>
+            <a:ext cx="6487668" cy="3152887"/>
+          </a:xfrm>
+          <a:prstGeom prst="rect">
+            <a:avLst/>
+          </a:prstGeom>
+          <a:ln w="3175">
+            <a:solidFill>
+              <a:schemeClr val="bg1"/>
+            </a:solidFill>
+          </a:ln>
+          <a:effectLst>
+            <a:outerShdw blurRad="63500" sx="100500" sy="100500" algn="ctr" rotWithShape="0">
+              <a:prstClr val="black">
+                <a:alpha val="50000"/>
+              </a:prstClr>
+            </a:outerShdw>
+          </a:effectLst>
+        </p:spPr>
+        <p:txBody>
+          <a:bodyPr vert="horz" lIns="91440" tIns="45720" rIns="91440" bIns="45720" rtlCol="0">
+            <a:normAutofit/>
+          </a:bodyPr>
+          <a:lstStyle/>
+          <a:p>
+            <a:pPr marL="0" indent="0" algn="l" defTabSz="914400" rtl="0" eaLnBrk="1" latinLnBrk="0" hangingPunct="1">
+              <a:spcBef>
+                <a:spcPts val="2000"/>
+              </a:spcBef>
+              <a:buClr>
+                <a:schemeClr val="accent1">
+                  <a:lumMod val="60000"/>
+                  <a:lumOff val="40000"/>
+                </a:schemeClr>
+              </a:buClr>
+              <a:buSzPct val="110000"/>
+              <a:buFont typeface="Wingdings 2" pitchFamily="18" charset="2"/>
+              <a:buNone/>
+            </a:pPr>
+            <a:endParaRPr sz="3200" kern="1200">
+              <a:solidFill>
+                <a:schemeClr val="tx1">
+                  <a:lumMod val="65000"/>
+                  <a:lumOff val="35000"/>
+                </a:schemeClr>
+              </a:solidFill>
+              <a:latin typeface="+mn-lt"/>
+              <a:ea typeface="+mn-ea"/>
+              <a:cs typeface="+mn-cs"/>
+            </a:endParaRPr>
+          </a:p>
+        </p:txBody>
+      </p:sp>
+      <p:sp>
+        <p:nvSpPr>
+          <p:cNvPr id="2" name="Title 1"/>
+          <p:cNvSpPr>
+            <a:spLocks noGrp="1"/>
+          </p:cNvSpPr>
+          <p:nvPr>
+            <p:ph type="ctrTitle"/>
+          </p:nvPr>
+        </p:nvSpPr>
+        <p:spPr>
+          <a:xfrm>
+            <a:off x="1322921" y="1523999"/>
+            <a:ext cx="6498158" cy="1724867"/>
           </a:xfrm>
         </p:spPr>
         <p:txBody>
-          <a:bodyPr/>
-          <a:lstStyle/>
+          <a:bodyPr vert="horz" lIns="91440" tIns="45720" rIns="91440" bIns="45720" rtlCol="0" anchor="b" anchorCtr="0">
+            <a:noAutofit/>
+          </a:bodyPr>
+          <a:lstStyle>
+            <a:lvl1pPr marL="0" indent="0" algn="ctr" defTabSz="914400" rtl="0" eaLnBrk="1" latinLnBrk="0" hangingPunct="1">
+              <a:spcBef>
+                <a:spcPct val="0"/>
+              </a:spcBef>
+              <a:buClr>
+                <a:schemeClr val="accent1">
+                  <a:lumMod val="60000"/>
+                  <a:lumOff val="40000"/>
+                </a:schemeClr>
+              </a:buClr>
+              <a:buSzPct val="110000"/>
+              <a:buFont typeface="Wingdings 2" pitchFamily="18" charset="2"/>
+              <a:buNone/>
+              <a:defRPr sz="4600" kern="1200">
+                <a:solidFill>
+                  <a:schemeClr val="accent1"/>
+                </a:solidFill>
+                <a:latin typeface="+mj-lt"/>
+                <a:ea typeface="+mj-ea"/>
+                <a:cs typeface="+mj-cs"/>
+              </a:defRPr>
+            </a:lvl1pPr>
+          </a:lstStyle>
           <a:p>
             <a:r>
               <a:rPr lang="en-US" smtClean="0"/>
               <a:t>Click to edit Master title style</a:t>
             </a:r>
-            <a:endParaRPr lang="en-US"/>
+            <a:endParaRPr/>
           </a:p>
         </p:txBody>
       </p:sp>
@@ -166,21 +253,37 @@
         </p:nvSpPr>
         <p:spPr>
           <a:xfrm>
-            <a:off x="1371600" y="3886200"/>
-            <a:ext cx="6400800" cy="1752600"/>
+            <a:off x="1322921" y="3299012"/>
+            <a:ext cx="6498159" cy="916641"/>
           </a:xfrm>
         </p:spPr>
         <p:txBody>
-          <a:bodyPr/>
+          <a:bodyPr vert="horz" lIns="91440" tIns="45720" rIns="91440" bIns="45720" rtlCol="0">
+            <a:normAutofit/>
+          </a:bodyPr>
           <a:lstStyle>
-            <a:lvl1pPr marL="0" indent="0" algn="ctr">
-              <a:buNone/>
-              <a:defRPr>
+            <a:lvl1pPr marL="0" indent="0" algn="ctr" defTabSz="914400" rtl="0" eaLnBrk="1" latinLnBrk="0" hangingPunct="1">
+              <a:spcBef>
+                <a:spcPts val="300"/>
+              </a:spcBef>
+              <a:buClr>
+                <a:schemeClr val="accent1">
+                  <a:lumMod val="60000"/>
+                  <a:lumOff val="40000"/>
+                </a:schemeClr>
+              </a:buClr>
+              <a:buSzPct val="110000"/>
+              <a:buFont typeface="Wingdings 2" pitchFamily="18" charset="2"/>
+              <a:buNone/>
+              <a:defRPr sz="1800" kern="1200">
                 <a:solidFill>
                   <a:schemeClr val="tx1">
                     <a:tint val="75000"/>
                   </a:schemeClr>
                 </a:solidFill>
+                <a:latin typeface="+mn-lt"/>
+                <a:ea typeface="+mn-ea"/>
+                <a:cs typeface="+mn-cs"/>
               </a:defRPr>
             </a:lvl1pPr>
             <a:lvl2pPr marL="457200" indent="0" algn="ctr">
@@ -269,7 +372,7 @@
               <a:rPr lang="en-US" smtClean="0"/>
               <a:t>Click to edit Master subtitle style</a:t>
             </a:r>
-            <a:endParaRPr lang="en-US"/>
+            <a:endParaRPr dirty="0"/>
           </a:p>
         </p:txBody>
       </p:sp>
@@ -290,7 +393,8 @@
           <a:p>
             <a:fld id="{3EC25210-86F0-4E6C-AD5E-B8BB5E189FC5}" type="datetimeFigureOut">
               <a:rPr lang="en-US" smtClean="0"/>
-              <a:t>7/28/2013</a:t>
+              <a:pPr/>
+              <a:t>29/11/13</a:t>
             </a:fld>
             <a:endParaRPr lang="en-US"/>
           </a:p>
@@ -330,7 +434,7 @@
           <a:bodyPr/>
           <a:lstStyle/>
           <a:p>
-            <a:fld id="{302C726E-FB28-4EB3-B2FA-7AE9B707067F}" type="slidenum">
+            <a:fld id="{7F5CE407-6216-4202-80E4-A30DC2F709B2}" type="slidenum">
               <a:rPr lang="en-US" smtClean="0"/>
               <a:t>‹#›</a:t>
             </a:fld>
@@ -338,42 +442,7 @@
           </a:p>
         </p:txBody>
       </p:sp>
-      <p:sp>
-        <p:nvSpPr>
-          <p:cNvPr id="9" name="Text Placeholder 7"/>
-          <p:cNvSpPr>
-            <a:spLocks noGrp="1"/>
-          </p:cNvSpPr>
-          <p:nvPr>
-            <p:ph type="body" sz="quarter" idx="13"/>
-          </p:nvPr>
-        </p:nvSpPr>
-        <p:spPr>
-          <a:xfrm>
-            <a:off x="1828800" y="838200"/>
-            <a:ext cx="2895600" cy="609600"/>
-          </a:xfrm>
-        </p:spPr>
-        <p:txBody>
-          <a:bodyPr/>
-          <a:lstStyle>
-            <a:lvl1pPr marL="0" indent="0">
-              <a:buNone/>
-              <a:defRPr/>
-            </a:lvl1pPr>
-          </a:lstStyle>
-          <a:p>
-            <a:pPr lvl="0"/>
-            <a:endParaRPr lang="en-US" dirty="0"/>
-          </a:p>
-        </p:txBody>
-      </p:sp>
     </p:spTree>
-    <p:extLst>
-      <p:ext uri="{BB962C8B-B14F-4D97-AF65-F5344CB8AC3E}">
-        <p14:creationId xmlns:p14="http://schemas.microsoft.com/office/powerpoint/2010/main" val="3875837434"/>
-      </p:ext>
-    </p:extLst>
   </p:cSld>
   <p:clrMapOvr>
     <a:masterClrMapping/>
@@ -382,6 +451,300 @@
 </file>
 
 <file path=ppt/slideLayouts/slideLayout10.xml><?xml version="1.0" encoding="utf-8"?>
+<p:sldLayout xmlns:a="http://schemas.openxmlformats.org/drawingml/2006/main" xmlns:r="http://schemas.openxmlformats.org/officeDocument/2006/relationships" xmlns:p="http://schemas.openxmlformats.org/presentationml/2006/main" preserve="1">
+  <p:cSld name="Picture with Caption">
+    <p:spTree>
+      <p:nvGrpSpPr>
+        <p:cNvPr id="1" name=""/>
+        <p:cNvGrpSpPr/>
+        <p:nvPr/>
+      </p:nvGrpSpPr>
+      <p:grpSpPr>
+        <a:xfrm>
+          <a:off x="0" y="0"/>
+          <a:ext cx="0" cy="0"/>
+          <a:chOff x="0" y="0"/>
+          <a:chExt cx="0" cy="0"/>
+        </a:xfrm>
+      </p:grpSpPr>
+      <p:sp>
+        <p:nvSpPr>
+          <p:cNvPr id="2" name="Title 1"/>
+          <p:cNvSpPr>
+            <a:spLocks noGrp="1"/>
+          </p:cNvSpPr>
+          <p:nvPr>
+            <p:ph type="title"/>
+          </p:nvPr>
+        </p:nvSpPr>
+        <p:spPr>
+          <a:xfrm>
+            <a:off x="533398" y="611872"/>
+            <a:ext cx="4079545" cy="1162050"/>
+          </a:xfrm>
+        </p:spPr>
+        <p:txBody>
+          <a:bodyPr anchor="b"/>
+          <a:lstStyle>
+            <a:lvl1pPr algn="ctr">
+              <a:defRPr sz="3600" b="0"/>
+            </a:lvl1pPr>
+          </a:lstStyle>
+          <a:p>
+            <a:r>
+              <a:rPr lang="en-US" smtClean="0"/>
+              <a:t>Click to edit Master title style</a:t>
+            </a:r>
+            <a:endParaRPr/>
+          </a:p>
+        </p:txBody>
+      </p:sp>
+      <p:sp>
+        <p:nvSpPr>
+          <p:cNvPr id="4" name="Text Placeholder 3"/>
+          <p:cNvSpPr>
+            <a:spLocks noGrp="1"/>
+          </p:cNvSpPr>
+          <p:nvPr>
+            <p:ph type="body" sz="half" idx="2"/>
+          </p:nvPr>
+        </p:nvSpPr>
+        <p:spPr>
+          <a:xfrm>
+            <a:off x="533398" y="1787856"/>
+            <a:ext cx="4079545" cy="3720152"/>
+          </a:xfrm>
+        </p:spPr>
+        <p:txBody>
+          <a:bodyPr>
+            <a:normAutofit/>
+          </a:bodyPr>
+          <a:lstStyle>
+            <a:lvl1pPr marL="0" indent="0" algn="ctr">
+              <a:spcBef>
+                <a:spcPts val="600"/>
+              </a:spcBef>
+              <a:buNone/>
+              <a:defRPr sz="1800"/>
+            </a:lvl1pPr>
+            <a:lvl2pPr marL="457200" indent="0">
+              <a:buNone/>
+              <a:defRPr sz="1200"/>
+            </a:lvl2pPr>
+            <a:lvl3pPr marL="914400" indent="0">
+              <a:buNone/>
+              <a:defRPr sz="1000"/>
+            </a:lvl3pPr>
+            <a:lvl4pPr marL="1371600" indent="0">
+              <a:buNone/>
+              <a:defRPr sz="900"/>
+            </a:lvl4pPr>
+            <a:lvl5pPr marL="1828800" indent="0">
+              <a:buNone/>
+              <a:defRPr sz="900"/>
+            </a:lvl5pPr>
+            <a:lvl6pPr marL="2286000" indent="0">
+              <a:buNone/>
+              <a:defRPr sz="900"/>
+            </a:lvl6pPr>
+            <a:lvl7pPr marL="2743200" indent="0">
+              <a:buNone/>
+              <a:defRPr sz="900"/>
+            </a:lvl7pPr>
+            <a:lvl8pPr marL="3200400" indent="0">
+              <a:buNone/>
+              <a:defRPr sz="900"/>
+            </a:lvl8pPr>
+            <a:lvl9pPr marL="3657600" indent="0">
+              <a:buNone/>
+              <a:defRPr sz="900"/>
+            </a:lvl9pPr>
+          </a:lstStyle>
+          <a:p>
+            <a:pPr lvl="0"/>
+            <a:r>
+              <a:rPr lang="en-US" smtClean="0"/>
+              <a:t>Click to edit Master text styles</a:t>
+            </a:r>
+          </a:p>
+        </p:txBody>
+      </p:sp>
+      <p:sp>
+        <p:nvSpPr>
+          <p:cNvPr id="5" name="Date Placeholder 4"/>
+          <p:cNvSpPr>
+            <a:spLocks noGrp="1"/>
+          </p:cNvSpPr>
+          <p:nvPr>
+            <p:ph type="dt" sz="half" idx="10"/>
+          </p:nvPr>
+        </p:nvSpPr>
+        <p:spPr/>
+        <p:txBody>
+          <a:bodyPr/>
+          <a:lstStyle/>
+          <a:p>
+            <a:fld id="{3EC25210-86F0-4E6C-AD5E-B8BB5E189FC5}" type="datetimeFigureOut">
+              <a:rPr lang="en-US" smtClean="0"/>
+              <a:pPr/>
+              <a:t>29/11/13</a:t>
+            </a:fld>
+            <a:endParaRPr lang="en-US"/>
+          </a:p>
+        </p:txBody>
+      </p:sp>
+      <p:sp>
+        <p:nvSpPr>
+          <p:cNvPr id="6" name="Footer Placeholder 5"/>
+          <p:cNvSpPr>
+            <a:spLocks noGrp="1"/>
+          </p:cNvSpPr>
+          <p:nvPr>
+            <p:ph type="ftr" sz="quarter" idx="11"/>
+          </p:nvPr>
+        </p:nvSpPr>
+        <p:spPr/>
+        <p:txBody>
+          <a:bodyPr/>
+          <a:lstStyle/>
+          <a:p>
+            <a:endParaRPr lang="en-US"/>
+          </a:p>
+        </p:txBody>
+      </p:sp>
+      <p:sp>
+        <p:nvSpPr>
+          <p:cNvPr id="7" name="Slide Number Placeholder 6"/>
+          <p:cNvSpPr>
+            <a:spLocks noGrp="1"/>
+          </p:cNvSpPr>
+          <p:nvPr>
+            <p:ph type="sldNum" sz="quarter" idx="12"/>
+          </p:nvPr>
+        </p:nvSpPr>
+        <p:spPr/>
+        <p:txBody>
+          <a:bodyPr/>
+          <a:lstStyle/>
+          <a:p>
+            <a:fld id="{302C726E-FB28-4EB3-B2FA-7AE9B707067F}" type="slidenum">
+              <a:rPr lang="en-US" smtClean="0"/>
+              <a:pPr/>
+              <a:t>‹#›</a:t>
+            </a:fld>
+            <a:endParaRPr lang="en-US"/>
+          </a:p>
+        </p:txBody>
+      </p:sp>
+      <p:sp>
+        <p:nvSpPr>
+          <p:cNvPr id="8" name="Picture Placeholder 2"/>
+          <p:cNvSpPr>
+            <a:spLocks noGrp="1"/>
+          </p:cNvSpPr>
+          <p:nvPr>
+            <p:ph type="pic" idx="1"/>
+          </p:nvPr>
+        </p:nvSpPr>
+        <p:spPr>
+          <a:xfrm>
+            <a:off x="5090617" y="359392"/>
+            <a:ext cx="3657600" cy="5318077"/>
+          </a:xfrm>
+          <a:ln w="3175">
+            <a:solidFill>
+              <a:schemeClr val="bg1"/>
+            </a:solidFill>
+          </a:ln>
+          <a:effectLst>
+            <a:outerShdw blurRad="63500" sx="100500" sy="100500" algn="ctr" rotWithShape="0">
+              <a:prstClr val="black">
+                <a:alpha val="50000"/>
+              </a:prstClr>
+            </a:outerShdw>
+          </a:effectLst>
+        </p:spPr>
+        <p:txBody>
+          <a:bodyPr vert="horz" lIns="91440" tIns="45720" rIns="91440" bIns="45720" rtlCol="0">
+            <a:normAutofit/>
+          </a:bodyPr>
+          <a:lstStyle>
+            <a:lvl1pPr marL="0" indent="0" algn="l" defTabSz="914400" rtl="0" eaLnBrk="1" latinLnBrk="0" hangingPunct="1">
+              <a:spcBef>
+                <a:spcPts val="2000"/>
+              </a:spcBef>
+              <a:buClr>
+                <a:schemeClr val="accent1">
+                  <a:lumMod val="60000"/>
+                  <a:lumOff val="40000"/>
+                </a:schemeClr>
+              </a:buClr>
+              <a:buSzPct val="110000"/>
+              <a:buFont typeface="Wingdings 2" pitchFamily="18" charset="2"/>
+              <a:buNone/>
+              <a:defRPr sz="3200" kern="1200">
+                <a:solidFill>
+                  <a:schemeClr val="tx1">
+                    <a:lumMod val="65000"/>
+                    <a:lumOff val="35000"/>
+                  </a:schemeClr>
+                </a:solidFill>
+                <a:latin typeface="+mn-lt"/>
+                <a:ea typeface="+mn-ea"/>
+                <a:cs typeface="+mn-cs"/>
+              </a:defRPr>
+            </a:lvl1pPr>
+            <a:lvl2pPr marL="457200" indent="0">
+              <a:buNone/>
+              <a:defRPr sz="2800"/>
+            </a:lvl2pPr>
+            <a:lvl3pPr marL="914400" indent="0">
+              <a:buNone/>
+              <a:defRPr sz="2400"/>
+            </a:lvl3pPr>
+            <a:lvl4pPr marL="1371600" indent="0">
+              <a:buNone/>
+              <a:defRPr sz="2000"/>
+            </a:lvl4pPr>
+            <a:lvl5pPr marL="1828800" indent="0">
+              <a:buNone/>
+              <a:defRPr sz="2000"/>
+            </a:lvl5pPr>
+            <a:lvl6pPr marL="2286000" indent="0">
+              <a:buNone/>
+              <a:defRPr sz="2000"/>
+            </a:lvl6pPr>
+            <a:lvl7pPr marL="2743200" indent="0">
+              <a:buNone/>
+              <a:defRPr sz="2000"/>
+            </a:lvl7pPr>
+            <a:lvl8pPr marL="3200400" indent="0">
+              <a:buNone/>
+              <a:defRPr sz="2000"/>
+            </a:lvl8pPr>
+            <a:lvl9pPr marL="3657600" indent="0">
+              <a:buNone/>
+              <a:defRPr sz="2000"/>
+            </a:lvl9pPr>
+          </a:lstStyle>
+          <a:p>
+            <a:r>
+              <a:rPr lang="en-US" smtClean="0"/>
+              <a:t>Drag picture to placeholder or click icon to add</a:t>
+            </a:r>
+            <a:endParaRPr/>
+          </a:p>
+        </p:txBody>
+      </p:sp>
+    </p:spTree>
+  </p:cSld>
+  <p:clrMapOvr>
+    <a:masterClrMapping/>
+  </p:clrMapOvr>
+</p:sldLayout>
+</file>
+
+<file path=ppt/slideLayouts/slideLayout11.xml><?xml version="1.0" encoding="utf-8"?>
 <p:sldLayout xmlns:a="http://schemas.openxmlformats.org/drawingml/2006/main" xmlns:r="http://schemas.openxmlformats.org/officeDocument/2006/relationships" xmlns:p="http://schemas.openxmlformats.org/presentationml/2006/main" type="vertTx" preserve="1">
   <p:cSld name="Title and Vertical Text">
     <p:spTree>
@@ -417,7 +780,7 @@
               <a:rPr lang="en-US" smtClean="0"/>
               <a:t>Click to edit Master title style</a:t>
             </a:r>
-            <a:endParaRPr lang="en-US"/>
+            <a:endParaRPr/>
           </a:p>
         </p:txBody>
       </p:sp>
@@ -434,7 +797,11 @@
         <p:spPr/>
         <p:txBody>
           <a:bodyPr vert="eaVert"/>
-          <a:lstStyle/>
+          <a:lstStyle>
+            <a:lvl5pPr>
+              <a:defRPr/>
+            </a:lvl5pPr>
+          </a:lstStyle>
           <a:p>
             <a:pPr lvl="0"/>
             <a:r>
@@ -469,7 +836,7 @@
               <a:rPr lang="en-US" smtClean="0"/>
               <a:t>Fifth level</a:t>
             </a:r>
-            <a:endParaRPr lang="en-US"/>
+            <a:endParaRPr dirty="0"/>
           </a:p>
         </p:txBody>
       </p:sp>
@@ -490,7 +857,8 @@
           <a:p>
             <a:fld id="{3EC25210-86F0-4E6C-AD5E-B8BB5E189FC5}" type="datetimeFigureOut">
               <a:rPr lang="en-US" smtClean="0"/>
-              <a:t>7/28/2013</a:t>
+              <a:pPr/>
+              <a:t>29/11/13</a:t>
             </a:fld>
             <a:endParaRPr lang="en-US"/>
           </a:p>
@@ -532,6 +900,7 @@
           <a:p>
             <a:fld id="{302C726E-FB28-4EB3-B2FA-7AE9B707067F}" type="slidenum">
               <a:rPr lang="en-US" smtClean="0"/>
+              <a:pPr/>
               <a:t>‹#›</a:t>
             </a:fld>
             <a:endParaRPr lang="en-US"/>
@@ -539,11 +908,6 @@
         </p:txBody>
       </p:sp>
     </p:spTree>
-    <p:extLst>
-      <p:ext uri="{BB962C8B-B14F-4D97-AF65-F5344CB8AC3E}">
-        <p14:creationId xmlns:p14="http://schemas.microsoft.com/office/powerpoint/2010/main" val="1468866947"/>
-      </p:ext>
-    </p:extLst>
   </p:cSld>
   <p:clrMapOvr>
     <a:masterClrMapping/>
@@ -551,7 +915,7 @@
 </p:sldLayout>
 </file>
 
-<file path=ppt/slideLayouts/slideLayout11.xml><?xml version="1.0" encoding="utf-8"?>
+<file path=ppt/slideLayouts/slideLayout12.xml><?xml version="1.0" encoding="utf-8"?>
 <p:sldLayout xmlns:a="http://schemas.openxmlformats.org/drawingml/2006/main" xmlns:r="http://schemas.openxmlformats.org/officeDocument/2006/relationships" xmlns:p="http://schemas.openxmlformats.org/presentationml/2006/main" type="vertTitleAndTx" preserve="1">
   <p:cSld name="Vertical Title and Text">
     <p:spTree>
@@ -580,8 +944,8 @@
         </p:nvSpPr>
         <p:spPr>
           <a:xfrm>
-            <a:off x="6629400" y="274638"/>
-            <a:ext cx="2057400" cy="5851525"/>
+            <a:off x="7369792" y="368301"/>
+            <a:ext cx="1524000" cy="5575300"/>
           </a:xfrm>
         </p:spPr>
         <p:txBody>
@@ -592,7 +956,7 @@
               <a:rPr lang="en-US" smtClean="0"/>
               <a:t>Click to edit Master title style</a:t>
             </a:r>
-            <a:endParaRPr lang="en-US"/>
+            <a:endParaRPr/>
           </a:p>
         </p:txBody>
       </p:sp>
@@ -608,13 +972,17 @@
         </p:nvSpPr>
         <p:spPr>
           <a:xfrm>
-            <a:off x="457200" y="274638"/>
-            <a:ext cx="6019800" cy="5851525"/>
+            <a:off x="549274" y="368301"/>
+            <a:ext cx="6689726" cy="5575300"/>
           </a:xfrm>
         </p:spPr>
         <p:txBody>
           <a:bodyPr vert="eaVert"/>
-          <a:lstStyle/>
+          <a:lstStyle>
+            <a:lvl5pPr>
+              <a:defRPr/>
+            </a:lvl5pPr>
+          </a:lstStyle>
           <a:p>
             <a:pPr lvl="0"/>
             <a:r>
@@ -649,7 +1017,7 @@
               <a:rPr lang="en-US" smtClean="0"/>
               <a:t>Fifth level</a:t>
             </a:r>
-            <a:endParaRPr lang="en-US"/>
+            <a:endParaRPr dirty="0"/>
           </a:p>
         </p:txBody>
       </p:sp>
@@ -670,7 +1038,8 @@
           <a:p>
             <a:fld id="{3EC25210-86F0-4E6C-AD5E-B8BB5E189FC5}" type="datetimeFigureOut">
               <a:rPr lang="en-US" smtClean="0"/>
-              <a:t>7/28/2013</a:t>
+              <a:pPr/>
+              <a:t>29/11/13</a:t>
             </a:fld>
             <a:endParaRPr lang="en-US"/>
           </a:p>
@@ -712,6 +1081,7 @@
           <a:p>
             <a:fld id="{302C726E-FB28-4EB3-B2FA-7AE9B707067F}" type="slidenum">
               <a:rPr lang="en-US" smtClean="0"/>
+              <a:pPr/>
               <a:t>‹#›</a:t>
             </a:fld>
             <a:endParaRPr lang="en-US"/>
@@ -719,9 +1089,278 @@
         </p:txBody>
       </p:sp>
     </p:spTree>
+  </p:cSld>
+  <p:clrMapOvr>
+    <a:masterClrMapping/>
+  </p:clrMapOvr>
+</p:sldLayout>
+</file>
+
+<file path=ppt/slideLayouts/slideLayout13.xml><?xml version="1.0" encoding="utf-8"?>
+<p:sldLayout xmlns:a="http://schemas.openxmlformats.org/drawingml/2006/main" xmlns:r="http://schemas.openxmlformats.org/officeDocument/2006/relationships" xmlns:p="http://schemas.openxmlformats.org/presentationml/2006/main" userDrawn="1">
+  <p:cSld name="1_Title Slide">
+    <p:spTree>
+      <p:nvGrpSpPr>
+        <p:cNvPr id="1" name=""/>
+        <p:cNvGrpSpPr/>
+        <p:nvPr/>
+      </p:nvGrpSpPr>
+      <p:grpSpPr>
+        <a:xfrm>
+          <a:off x="0" y="0"/>
+          <a:ext cx="0" cy="0"/>
+          <a:chOff x="0" y="0"/>
+          <a:chExt cx="0" cy="0"/>
+        </a:xfrm>
+      </p:grpSpPr>
+      <p:sp>
+        <p:nvSpPr>
+          <p:cNvPr id="2" name="Title 1"/>
+          <p:cNvSpPr>
+            <a:spLocks noGrp="1"/>
+          </p:cNvSpPr>
+          <p:nvPr>
+            <p:ph type="ctrTitle"/>
+          </p:nvPr>
+        </p:nvSpPr>
+        <p:spPr>
+          <a:xfrm>
+            <a:off x="685800" y="2130425"/>
+            <a:ext cx="7772400" cy="1470025"/>
+          </a:xfrm>
+        </p:spPr>
+        <p:txBody>
+          <a:bodyPr/>
+          <a:lstStyle/>
+          <a:p>
+            <a:r>
+              <a:rPr lang="en-US" smtClean="0"/>
+              <a:t>Click to edit Master title style</a:t>
+            </a:r>
+            <a:endParaRPr lang="en-US"/>
+          </a:p>
+        </p:txBody>
+      </p:sp>
+      <p:sp>
+        <p:nvSpPr>
+          <p:cNvPr id="3" name="Subtitle 2"/>
+          <p:cNvSpPr>
+            <a:spLocks noGrp="1"/>
+          </p:cNvSpPr>
+          <p:nvPr>
+            <p:ph type="subTitle" idx="1"/>
+          </p:nvPr>
+        </p:nvSpPr>
+        <p:spPr>
+          <a:xfrm>
+            <a:off x="1371600" y="3886200"/>
+            <a:ext cx="6400800" cy="1752600"/>
+          </a:xfrm>
+        </p:spPr>
+        <p:txBody>
+          <a:bodyPr/>
+          <a:lstStyle>
+            <a:lvl1pPr marL="0" indent="0" algn="ctr">
+              <a:buNone/>
+              <a:defRPr>
+                <a:solidFill>
+                  <a:schemeClr val="tx1">
+                    <a:tint val="75000"/>
+                  </a:schemeClr>
+                </a:solidFill>
+              </a:defRPr>
+            </a:lvl1pPr>
+            <a:lvl2pPr marL="457200" indent="0" algn="ctr">
+              <a:buNone/>
+              <a:defRPr>
+                <a:solidFill>
+                  <a:schemeClr val="tx1">
+                    <a:tint val="75000"/>
+                  </a:schemeClr>
+                </a:solidFill>
+              </a:defRPr>
+            </a:lvl2pPr>
+            <a:lvl3pPr marL="914400" indent="0" algn="ctr">
+              <a:buNone/>
+              <a:defRPr>
+                <a:solidFill>
+                  <a:schemeClr val="tx1">
+                    <a:tint val="75000"/>
+                  </a:schemeClr>
+                </a:solidFill>
+              </a:defRPr>
+            </a:lvl3pPr>
+            <a:lvl4pPr marL="1371600" indent="0" algn="ctr">
+              <a:buNone/>
+              <a:defRPr>
+                <a:solidFill>
+                  <a:schemeClr val="tx1">
+                    <a:tint val="75000"/>
+                  </a:schemeClr>
+                </a:solidFill>
+              </a:defRPr>
+            </a:lvl4pPr>
+            <a:lvl5pPr marL="1828800" indent="0" algn="ctr">
+              <a:buNone/>
+              <a:defRPr>
+                <a:solidFill>
+                  <a:schemeClr val="tx1">
+                    <a:tint val="75000"/>
+                  </a:schemeClr>
+                </a:solidFill>
+              </a:defRPr>
+            </a:lvl5pPr>
+            <a:lvl6pPr marL="2286000" indent="0" algn="ctr">
+              <a:buNone/>
+              <a:defRPr>
+                <a:solidFill>
+                  <a:schemeClr val="tx1">
+                    <a:tint val="75000"/>
+                  </a:schemeClr>
+                </a:solidFill>
+              </a:defRPr>
+            </a:lvl6pPr>
+            <a:lvl7pPr marL="2743200" indent="0" algn="ctr">
+              <a:buNone/>
+              <a:defRPr>
+                <a:solidFill>
+                  <a:schemeClr val="tx1">
+                    <a:tint val="75000"/>
+                  </a:schemeClr>
+                </a:solidFill>
+              </a:defRPr>
+            </a:lvl7pPr>
+            <a:lvl8pPr marL="3200400" indent="0" algn="ctr">
+              <a:buNone/>
+              <a:defRPr>
+                <a:solidFill>
+                  <a:schemeClr val="tx1">
+                    <a:tint val="75000"/>
+                  </a:schemeClr>
+                </a:solidFill>
+              </a:defRPr>
+            </a:lvl8pPr>
+            <a:lvl9pPr marL="3657600" indent="0" algn="ctr">
+              <a:buNone/>
+              <a:defRPr>
+                <a:solidFill>
+                  <a:schemeClr val="tx1">
+                    <a:tint val="75000"/>
+                  </a:schemeClr>
+                </a:solidFill>
+              </a:defRPr>
+            </a:lvl9pPr>
+          </a:lstStyle>
+          <a:p>
+            <a:r>
+              <a:rPr lang="en-US" smtClean="0"/>
+              <a:t>Click to edit Master subtitle style</a:t>
+            </a:r>
+            <a:endParaRPr lang="en-US"/>
+          </a:p>
+        </p:txBody>
+      </p:sp>
+      <p:sp>
+        <p:nvSpPr>
+          <p:cNvPr id="4" name="Date Placeholder 3"/>
+          <p:cNvSpPr>
+            <a:spLocks noGrp="1"/>
+          </p:cNvSpPr>
+          <p:nvPr>
+            <p:ph type="dt" sz="half" idx="10"/>
+          </p:nvPr>
+        </p:nvSpPr>
+        <p:spPr/>
+        <p:txBody>
+          <a:bodyPr/>
+          <a:lstStyle/>
+          <a:p>
+            <a:fld id="{3EC25210-86F0-4E6C-AD5E-B8BB5E189FC5}" type="datetimeFigureOut">
+              <a:rPr lang="en-US" smtClean="0"/>
+              <a:pPr/>
+              <a:t>29/11/13</a:t>
+            </a:fld>
+            <a:endParaRPr lang="en-US"/>
+          </a:p>
+        </p:txBody>
+      </p:sp>
+      <p:sp>
+        <p:nvSpPr>
+          <p:cNvPr id="5" name="Footer Placeholder 4"/>
+          <p:cNvSpPr>
+            <a:spLocks noGrp="1"/>
+          </p:cNvSpPr>
+          <p:nvPr>
+            <p:ph type="ftr" sz="quarter" idx="11"/>
+          </p:nvPr>
+        </p:nvSpPr>
+        <p:spPr/>
+        <p:txBody>
+          <a:bodyPr/>
+          <a:lstStyle/>
+          <a:p>
+            <a:endParaRPr lang="en-US"/>
+          </a:p>
+        </p:txBody>
+      </p:sp>
+      <p:sp>
+        <p:nvSpPr>
+          <p:cNvPr id="6" name="Slide Number Placeholder 5"/>
+          <p:cNvSpPr>
+            <a:spLocks noGrp="1"/>
+          </p:cNvSpPr>
+          <p:nvPr>
+            <p:ph type="sldNum" sz="quarter" idx="12"/>
+          </p:nvPr>
+        </p:nvSpPr>
+        <p:spPr/>
+        <p:txBody>
+          <a:bodyPr/>
+          <a:lstStyle/>
+          <a:p>
+            <a:fld id="{302C726E-FB28-4EB3-B2FA-7AE9B707067F}" type="slidenum">
+              <a:rPr lang="en-US" smtClean="0"/>
+              <a:pPr/>
+              <a:t>‹#›</a:t>
+            </a:fld>
+            <a:endParaRPr lang="en-US"/>
+          </a:p>
+        </p:txBody>
+      </p:sp>
+      <p:sp>
+        <p:nvSpPr>
+          <p:cNvPr id="9" name="Text Placeholder 7"/>
+          <p:cNvSpPr>
+            <a:spLocks noGrp="1"/>
+          </p:cNvSpPr>
+          <p:nvPr>
+            <p:ph type="body" sz="quarter" idx="13"/>
+          </p:nvPr>
+        </p:nvSpPr>
+        <p:spPr>
+          <a:xfrm>
+            <a:off x="1828800" y="838200"/>
+            <a:ext cx="2895600" cy="609600"/>
+          </a:xfrm>
+        </p:spPr>
+        <p:txBody>
+          <a:bodyPr/>
+          <a:lstStyle>
+            <a:lvl1pPr marL="0" indent="0">
+              <a:buNone/>
+              <a:defRPr/>
+            </a:lvl1pPr>
+          </a:lstStyle>
+          <a:p>
+            <a:pPr lvl="0"/>
+            <a:endParaRPr lang="en-US" dirty="0"/>
+          </a:p>
+        </p:txBody>
+      </p:sp>
+    </p:spTree>
     <p:extLst>
       <p:ext uri="{BB962C8B-B14F-4D97-AF65-F5344CB8AC3E}">
-        <p14:creationId xmlns:p14="http://schemas.microsoft.com/office/powerpoint/2010/main" val="3381178884"/>
+        <p14:creationId xmlns:p14="http://schemas.microsoft.com/office/powerpoint/2010/main" val="3875837434"/>
       </p:ext>
     </p:extLst>
   </p:cSld>
@@ -767,7 +1406,7 @@
               <a:rPr lang="en-US" smtClean="0"/>
               <a:t>Click to edit Master title style</a:t>
             </a:r>
-            <a:endParaRPr lang="en-US"/>
+            <a:endParaRPr/>
           </a:p>
         </p:txBody>
       </p:sp>
@@ -779,6 +1418,62 @@
           </p:cNvSpPr>
           <p:nvPr>
             <p:ph idx="1"/>
+          </p:nvPr>
+        </p:nvSpPr>
+        <p:spPr/>
+        <p:txBody>
+          <a:bodyPr/>
+          <a:lstStyle>
+            <a:lvl5pPr>
+              <a:defRPr/>
+            </a:lvl5pPr>
+          </a:lstStyle>
+          <a:p>
+            <a:pPr lvl="0"/>
+            <a:r>
+              <a:rPr lang="en-US" smtClean="0"/>
+              <a:t>Click to edit Master text styles</a:t>
+            </a:r>
+          </a:p>
+          <a:p>
+            <a:pPr lvl="1"/>
+            <a:r>
+              <a:rPr lang="en-US" smtClean="0"/>
+              <a:t>Second level</a:t>
+            </a:r>
+          </a:p>
+          <a:p>
+            <a:pPr lvl="2"/>
+            <a:r>
+              <a:rPr lang="en-US" smtClean="0"/>
+              <a:t>Third level</a:t>
+            </a:r>
+          </a:p>
+          <a:p>
+            <a:pPr lvl="3"/>
+            <a:r>
+              <a:rPr lang="en-US" smtClean="0"/>
+              <a:t>Fourth level</a:t>
+            </a:r>
+          </a:p>
+          <a:p>
+            <a:pPr lvl="4"/>
+            <a:r>
+              <a:rPr lang="en-US" smtClean="0"/>
+              <a:t>Fifth level</a:t>
+            </a:r>
+            <a:endParaRPr dirty="0"/>
+          </a:p>
+        </p:txBody>
+      </p:sp>
+      <p:sp>
+        <p:nvSpPr>
+          <p:cNvPr id="4" name="Date Placeholder 3"/>
+          <p:cNvSpPr>
+            <a:spLocks noGrp="1"/>
+          </p:cNvSpPr>
+          <p:nvPr>
+            <p:ph type="dt" sz="half" idx="10"/>
           </p:nvPr>
         </p:nvSpPr>
         <p:spPr/>
@@ -786,51 +1481,23 @@
           <a:bodyPr/>
           <a:lstStyle/>
           <a:p>
-            <a:pPr lvl="0"/>
-            <a:r>
-              <a:rPr lang="en-US" smtClean="0"/>
-              <a:t>Click to edit Master text styles</a:t>
-            </a:r>
-          </a:p>
-          <a:p>
-            <a:pPr lvl="1"/>
-            <a:r>
-              <a:rPr lang="en-US" smtClean="0"/>
-              <a:t>Second level</a:t>
-            </a:r>
-          </a:p>
-          <a:p>
-            <a:pPr lvl="2"/>
-            <a:r>
-              <a:rPr lang="en-US" smtClean="0"/>
-              <a:t>Third level</a:t>
-            </a:r>
-          </a:p>
-          <a:p>
-            <a:pPr lvl="3"/>
-            <a:r>
-              <a:rPr lang="en-US" smtClean="0"/>
-              <a:t>Fourth level</a:t>
-            </a:r>
-          </a:p>
-          <a:p>
-            <a:pPr lvl="4"/>
-            <a:r>
-              <a:rPr lang="en-US" smtClean="0"/>
-              <a:t>Fifth level</a:t>
-            </a:r>
+            <a:fld id="{3EC25210-86F0-4E6C-AD5E-B8BB5E189FC5}" type="datetimeFigureOut">
+              <a:rPr lang="en-US" smtClean="0"/>
+              <a:pPr/>
+              <a:t>29/11/13</a:t>
+            </a:fld>
             <a:endParaRPr lang="en-US"/>
           </a:p>
         </p:txBody>
       </p:sp>
       <p:sp>
         <p:nvSpPr>
-          <p:cNvPr id="4" name="Date Placeholder 3"/>
-          <p:cNvSpPr>
-            <a:spLocks noGrp="1"/>
-          </p:cNvSpPr>
-          <p:nvPr>
-            <p:ph type="dt" sz="half" idx="10"/>
+          <p:cNvPr id="5" name="Footer Placeholder 4"/>
+          <p:cNvSpPr>
+            <a:spLocks noGrp="1"/>
+          </p:cNvSpPr>
+          <p:nvPr>
+            <p:ph type="ftr" sz="quarter" idx="11"/>
           </p:nvPr>
         </p:nvSpPr>
         <p:spPr/>
@@ -838,22 +1505,18 @@
           <a:bodyPr/>
           <a:lstStyle/>
           <a:p>
-            <a:fld id="{3EC25210-86F0-4E6C-AD5E-B8BB5E189FC5}" type="datetimeFigureOut">
-              <a:rPr lang="en-US" smtClean="0"/>
-              <a:t>7/28/2013</a:t>
-            </a:fld>
             <a:endParaRPr lang="en-US"/>
           </a:p>
         </p:txBody>
       </p:sp>
       <p:sp>
         <p:nvSpPr>
-          <p:cNvPr id="5" name="Footer Placeholder 4"/>
-          <p:cNvSpPr>
-            <a:spLocks noGrp="1"/>
-          </p:cNvSpPr>
-          <p:nvPr>
-            <p:ph type="ftr" sz="quarter" idx="11"/>
+          <p:cNvPr id="6" name="Slide Number Placeholder 5"/>
+          <p:cNvSpPr>
+            <a:spLocks noGrp="1"/>
+          </p:cNvSpPr>
+          <p:nvPr>
+            <p:ph type="sldNum" sz="quarter" idx="12"/>
           </p:nvPr>
         </p:nvSpPr>
         <p:spPr/>
@@ -861,27 +1524,9 @@
           <a:bodyPr/>
           <a:lstStyle/>
           <a:p>
-            <a:endParaRPr lang="en-US"/>
-          </a:p>
-        </p:txBody>
-      </p:sp>
-      <p:sp>
-        <p:nvSpPr>
-          <p:cNvPr id="6" name="Slide Number Placeholder 5"/>
-          <p:cNvSpPr>
-            <a:spLocks noGrp="1"/>
-          </p:cNvSpPr>
-          <p:nvPr>
-            <p:ph type="sldNum" sz="quarter" idx="12"/>
-          </p:nvPr>
-        </p:nvSpPr>
-        <p:spPr/>
-        <p:txBody>
-          <a:bodyPr/>
-          <a:lstStyle/>
-          <a:p>
             <a:fld id="{302C726E-FB28-4EB3-B2FA-7AE9B707067F}" type="slidenum">
               <a:rPr lang="en-US" smtClean="0"/>
+              <a:pPr/>
               <a:t>‹#›</a:t>
             </a:fld>
             <a:endParaRPr lang="en-US"/>
@@ -889,11 +1534,6 @@
         </p:txBody>
       </p:sp>
     </p:spTree>
-    <p:extLst>
-      <p:ext uri="{BB962C8B-B14F-4D97-AF65-F5344CB8AC3E}">
-        <p14:creationId xmlns:p14="http://schemas.microsoft.com/office/powerpoint/2010/main" val="3391662222"/>
-      </p:ext>
-    </p:extLst>
   </p:cSld>
   <p:clrMapOvr>
     <a:masterClrMapping/>
@@ -902,6 +1542,327 @@
 </file>
 
 <file path=ppt/slideLayouts/slideLayout3.xml><?xml version="1.0" encoding="utf-8"?>
+<p:sldLayout xmlns:a="http://schemas.openxmlformats.org/drawingml/2006/main" xmlns:r="http://schemas.openxmlformats.org/officeDocument/2006/relationships" xmlns:p="http://schemas.openxmlformats.org/presentationml/2006/main" preserve="1">
+  <p:cSld name="Title Slide with Picture">
+    <p:spTree>
+      <p:nvGrpSpPr>
+        <p:cNvPr id="1" name=""/>
+        <p:cNvGrpSpPr/>
+        <p:nvPr/>
+      </p:nvGrpSpPr>
+      <p:grpSpPr>
+        <a:xfrm>
+          <a:off x="0" y="0"/>
+          <a:ext cx="0" cy="0"/>
+          <a:chOff x="0" y="0"/>
+          <a:chExt cx="0" cy="0"/>
+        </a:xfrm>
+      </p:grpSpPr>
+      <p:sp>
+        <p:nvSpPr>
+          <p:cNvPr id="2" name="Title 1"/>
+          <p:cNvSpPr>
+            <a:spLocks noGrp="1"/>
+          </p:cNvSpPr>
+          <p:nvPr>
+            <p:ph type="ctrTitle"/>
+          </p:nvPr>
+        </p:nvSpPr>
+        <p:spPr>
+          <a:xfrm>
+            <a:off x="363538" y="3352801"/>
+            <a:ext cx="8416925" cy="1470025"/>
+          </a:xfrm>
+        </p:spPr>
+        <p:txBody>
+          <a:bodyPr/>
+          <a:lstStyle/>
+          <a:p>
+            <a:r>
+              <a:rPr lang="en-US" smtClean="0"/>
+              <a:t>Click to edit Master title style</a:t>
+            </a:r>
+            <a:endParaRPr dirty="0"/>
+          </a:p>
+        </p:txBody>
+      </p:sp>
+      <p:sp>
+        <p:nvSpPr>
+          <p:cNvPr id="3" name="Subtitle 2"/>
+          <p:cNvSpPr>
+            <a:spLocks noGrp="1"/>
+          </p:cNvSpPr>
+          <p:nvPr>
+            <p:ph type="subTitle" idx="1"/>
+          </p:nvPr>
+        </p:nvSpPr>
+        <p:spPr>
+          <a:xfrm>
+            <a:off x="363538" y="4771029"/>
+            <a:ext cx="8416925" cy="972671"/>
+          </a:xfrm>
+        </p:spPr>
+        <p:txBody>
+          <a:bodyPr>
+            <a:normAutofit/>
+          </a:bodyPr>
+          <a:lstStyle>
+            <a:lvl1pPr marL="0" indent="0" algn="ctr">
+              <a:spcBef>
+                <a:spcPts val="300"/>
+              </a:spcBef>
+              <a:buNone/>
+              <a:defRPr sz="1800">
+                <a:solidFill>
+                  <a:schemeClr val="tx1">
+                    <a:tint val="75000"/>
+                  </a:schemeClr>
+                </a:solidFill>
+              </a:defRPr>
+            </a:lvl1pPr>
+            <a:lvl2pPr marL="457200" indent="0" algn="ctr">
+              <a:buNone/>
+              <a:defRPr>
+                <a:solidFill>
+                  <a:schemeClr val="tx1">
+                    <a:tint val="75000"/>
+                  </a:schemeClr>
+                </a:solidFill>
+              </a:defRPr>
+            </a:lvl2pPr>
+            <a:lvl3pPr marL="914400" indent="0" algn="ctr">
+              <a:buNone/>
+              <a:defRPr>
+                <a:solidFill>
+                  <a:schemeClr val="tx1">
+                    <a:tint val="75000"/>
+                  </a:schemeClr>
+                </a:solidFill>
+              </a:defRPr>
+            </a:lvl3pPr>
+            <a:lvl4pPr marL="1371600" indent="0" algn="ctr">
+              <a:buNone/>
+              <a:defRPr>
+                <a:solidFill>
+                  <a:schemeClr val="tx1">
+                    <a:tint val="75000"/>
+                  </a:schemeClr>
+                </a:solidFill>
+              </a:defRPr>
+            </a:lvl4pPr>
+            <a:lvl5pPr marL="1828800" indent="0" algn="ctr">
+              <a:buNone/>
+              <a:defRPr>
+                <a:solidFill>
+                  <a:schemeClr val="tx1">
+                    <a:tint val="75000"/>
+                  </a:schemeClr>
+                </a:solidFill>
+              </a:defRPr>
+            </a:lvl5pPr>
+            <a:lvl6pPr marL="2286000" indent="0" algn="ctr">
+              <a:buNone/>
+              <a:defRPr>
+                <a:solidFill>
+                  <a:schemeClr val="tx1">
+                    <a:tint val="75000"/>
+                  </a:schemeClr>
+                </a:solidFill>
+              </a:defRPr>
+            </a:lvl6pPr>
+            <a:lvl7pPr marL="2743200" indent="0" algn="ctr">
+              <a:buNone/>
+              <a:defRPr>
+                <a:solidFill>
+                  <a:schemeClr val="tx1">
+                    <a:tint val="75000"/>
+                  </a:schemeClr>
+                </a:solidFill>
+              </a:defRPr>
+            </a:lvl7pPr>
+            <a:lvl8pPr marL="3200400" indent="0" algn="ctr">
+              <a:buNone/>
+              <a:defRPr>
+                <a:solidFill>
+                  <a:schemeClr val="tx1">
+                    <a:tint val="75000"/>
+                  </a:schemeClr>
+                </a:solidFill>
+              </a:defRPr>
+            </a:lvl8pPr>
+            <a:lvl9pPr marL="3657600" indent="0" algn="ctr">
+              <a:buNone/>
+              <a:defRPr>
+                <a:solidFill>
+                  <a:schemeClr val="tx1">
+                    <a:tint val="75000"/>
+                  </a:schemeClr>
+                </a:solidFill>
+              </a:defRPr>
+            </a:lvl9pPr>
+          </a:lstStyle>
+          <a:p>
+            <a:r>
+              <a:rPr lang="en-US" smtClean="0"/>
+              <a:t>Click to edit Master subtitle style</a:t>
+            </a:r>
+            <a:endParaRPr dirty="0"/>
+          </a:p>
+        </p:txBody>
+      </p:sp>
+      <p:sp>
+        <p:nvSpPr>
+          <p:cNvPr id="4" name="Date Placeholder 3"/>
+          <p:cNvSpPr>
+            <a:spLocks noGrp="1"/>
+          </p:cNvSpPr>
+          <p:nvPr>
+            <p:ph type="dt" sz="half" idx="10"/>
+          </p:nvPr>
+        </p:nvSpPr>
+        <p:spPr/>
+        <p:txBody>
+          <a:bodyPr/>
+          <a:lstStyle/>
+          <a:p>
+            <a:fld id="{3EC25210-86F0-4E6C-AD5E-B8BB5E189FC5}" type="datetimeFigureOut">
+              <a:rPr lang="en-US" smtClean="0"/>
+              <a:pPr/>
+              <a:t>29/11/13</a:t>
+            </a:fld>
+            <a:endParaRPr lang="en-US"/>
+          </a:p>
+        </p:txBody>
+      </p:sp>
+      <p:sp>
+        <p:nvSpPr>
+          <p:cNvPr id="5" name="Footer Placeholder 4"/>
+          <p:cNvSpPr>
+            <a:spLocks noGrp="1"/>
+          </p:cNvSpPr>
+          <p:nvPr>
+            <p:ph type="ftr" sz="quarter" idx="11"/>
+          </p:nvPr>
+        </p:nvSpPr>
+        <p:spPr/>
+        <p:txBody>
+          <a:bodyPr/>
+          <a:lstStyle/>
+          <a:p>
+            <a:endParaRPr lang="en-US"/>
+          </a:p>
+        </p:txBody>
+      </p:sp>
+      <p:sp>
+        <p:nvSpPr>
+          <p:cNvPr id="6" name="Slide Number Placeholder 5"/>
+          <p:cNvSpPr>
+            <a:spLocks noGrp="1"/>
+          </p:cNvSpPr>
+          <p:nvPr>
+            <p:ph type="sldNum" sz="quarter" idx="12"/>
+          </p:nvPr>
+        </p:nvSpPr>
+        <p:spPr/>
+        <p:txBody>
+          <a:bodyPr/>
+          <a:lstStyle/>
+          <a:p>
+            <a:fld id="{302C726E-FB28-4EB3-B2FA-7AE9B707067F}" type="slidenum">
+              <a:rPr lang="en-US" smtClean="0"/>
+              <a:pPr/>
+              <a:t>‹#›</a:t>
+            </a:fld>
+            <a:endParaRPr lang="en-US"/>
+          </a:p>
+        </p:txBody>
+      </p:sp>
+      <p:sp>
+        <p:nvSpPr>
+          <p:cNvPr id="9" name="Picture Placeholder 2"/>
+          <p:cNvSpPr>
+            <a:spLocks noGrp="1"/>
+          </p:cNvSpPr>
+          <p:nvPr>
+            <p:ph type="pic" idx="13"/>
+          </p:nvPr>
+        </p:nvSpPr>
+        <p:spPr>
+          <a:xfrm>
+            <a:off x="370980" y="363538"/>
+            <a:ext cx="8402040" cy="2836862"/>
+          </a:xfrm>
+          <a:ln w="3175">
+            <a:solidFill>
+              <a:schemeClr val="bg1"/>
+            </a:solidFill>
+          </a:ln>
+          <a:effectLst>
+            <a:outerShdw blurRad="63500" sx="100500" sy="100500" algn="ctr" rotWithShape="0">
+              <a:prstClr val="black">
+                <a:alpha val="50000"/>
+              </a:prstClr>
+            </a:outerShdw>
+          </a:effectLst>
+        </p:spPr>
+        <p:txBody>
+          <a:bodyPr/>
+          <a:lstStyle>
+            <a:lvl1pPr marL="0" indent="0">
+              <a:buNone/>
+              <a:defRPr sz="3200"/>
+            </a:lvl1pPr>
+            <a:lvl2pPr marL="457200" indent="0">
+              <a:buNone/>
+              <a:defRPr sz="2800"/>
+            </a:lvl2pPr>
+            <a:lvl3pPr marL="914400" indent="0">
+              <a:buNone/>
+              <a:defRPr sz="2400"/>
+            </a:lvl3pPr>
+            <a:lvl4pPr marL="1371600" indent="0">
+              <a:buNone/>
+              <a:defRPr sz="2000"/>
+            </a:lvl4pPr>
+            <a:lvl5pPr marL="1828800" indent="0">
+              <a:buNone/>
+              <a:defRPr sz="2000"/>
+            </a:lvl5pPr>
+            <a:lvl6pPr marL="2286000" indent="0">
+              <a:buNone/>
+              <a:defRPr sz="2000"/>
+            </a:lvl6pPr>
+            <a:lvl7pPr marL="2743200" indent="0">
+              <a:buNone/>
+              <a:defRPr sz="2000"/>
+            </a:lvl7pPr>
+            <a:lvl8pPr marL="3200400" indent="0">
+              <a:buNone/>
+              <a:defRPr sz="2000"/>
+            </a:lvl8pPr>
+            <a:lvl9pPr marL="3657600" indent="0">
+              <a:buNone/>
+              <a:defRPr sz="2000"/>
+            </a:lvl9pPr>
+          </a:lstStyle>
+          <a:p>
+            <a:r>
+              <a:rPr lang="en-US" smtClean="0"/>
+              <a:t>Drag picture to placeholder or click icon to add</a:t>
+            </a:r>
+            <a:endParaRPr/>
+          </a:p>
+        </p:txBody>
+      </p:sp>
+    </p:spTree>
+  </p:cSld>
+  <p:clrMapOvr>
+    <a:masterClrMapping/>
+  </p:clrMapOvr>
+</p:sldLayout>
+</file>
+
+<file path=ppt/slideLayouts/slideLayout4.xml><?xml version="1.0" encoding="utf-8"?>
 <p:sldLayout xmlns:a="http://schemas.openxmlformats.org/drawingml/2006/main" xmlns:r="http://schemas.openxmlformats.org/officeDocument/2006/relationships" xmlns:p="http://schemas.openxmlformats.org/presentationml/2006/main" type="secHead" preserve="1">
   <p:cSld name="Section Header">
     <p:spTree>
@@ -930,15 +1891,15 @@
         </p:nvSpPr>
         <p:spPr>
           <a:xfrm>
-            <a:off x="722313" y="4406900"/>
-            <a:ext cx="7772400" cy="1362075"/>
+            <a:off x="549275" y="2403144"/>
+            <a:ext cx="8056563" cy="1362075"/>
           </a:xfrm>
         </p:spPr>
         <p:txBody>
-          <a:bodyPr anchor="t"/>
+          <a:bodyPr anchor="b" anchorCtr="0"/>
           <a:lstStyle>
-            <a:lvl1pPr algn="l">
-              <a:defRPr sz="4000" b="1" cap="all"/>
+            <a:lvl1pPr algn="ctr">
+              <a:defRPr sz="4600" b="0" cap="none" baseline="0"/>
             </a:lvl1pPr>
           </a:lstStyle>
           <a:p>
@@ -946,7 +1907,7 @@
               <a:rPr lang="en-US" smtClean="0"/>
               <a:t>Click to edit Master title style</a:t>
             </a:r>
-            <a:endParaRPr lang="en-US"/>
+            <a:endParaRPr/>
           </a:p>
         </p:txBody>
       </p:sp>
@@ -962,16 +1923,21 @@
         </p:nvSpPr>
         <p:spPr>
           <a:xfrm>
-            <a:off x="722313" y="2906713"/>
-            <a:ext cx="7772400" cy="1500187"/>
+            <a:off x="549275" y="3736005"/>
+            <a:ext cx="8056563" cy="1500187"/>
           </a:xfrm>
         </p:spPr>
         <p:txBody>
-          <a:bodyPr anchor="b"/>
+          <a:bodyPr anchor="t" anchorCtr="0">
+            <a:normAutofit/>
+          </a:bodyPr>
           <a:lstStyle>
-            <a:lvl1pPr marL="0" indent="0">
-              <a:buNone/>
-              <a:defRPr sz="2000">
+            <a:lvl1pPr marL="0" indent="0" algn="ctr">
+              <a:spcBef>
+                <a:spcPts val="300"/>
+              </a:spcBef>
+              <a:buNone/>
+              <a:defRPr sz="1800">
                 <a:solidFill>
                   <a:schemeClr val="tx1">
                     <a:tint val="75000"/>
@@ -1086,7 +2052,8 @@
           <a:p>
             <a:fld id="{3EC25210-86F0-4E6C-AD5E-B8BB5E189FC5}" type="datetimeFigureOut">
               <a:rPr lang="en-US" smtClean="0"/>
-              <a:t>7/28/2013</a:t>
+              <a:pPr/>
+              <a:t>29/11/13</a:t>
             </a:fld>
             <a:endParaRPr lang="en-US"/>
           </a:p>
@@ -1128,6 +2095,7 @@
           <a:p>
             <a:fld id="{302C726E-FB28-4EB3-B2FA-7AE9B707067F}" type="slidenum">
               <a:rPr lang="en-US" smtClean="0"/>
+              <a:pPr/>
               <a:t>‹#›</a:t>
             </a:fld>
             <a:endParaRPr lang="en-US"/>
@@ -1135,11 +2103,6 @@
         </p:txBody>
       </p:sp>
     </p:spTree>
-    <p:extLst>
-      <p:ext uri="{BB962C8B-B14F-4D97-AF65-F5344CB8AC3E}">
-        <p14:creationId xmlns:p14="http://schemas.microsoft.com/office/powerpoint/2010/main" val="2261538752"/>
-      </p:ext>
-    </p:extLst>
   </p:cSld>
   <p:clrMapOvr>
     <a:masterClrMapping/>
@@ -1147,7 +2110,7 @@
 </p:sldLayout>
 </file>
 
-<file path=ppt/slideLayouts/slideLayout4.xml><?xml version="1.0" encoding="utf-8"?>
+<file path=ppt/slideLayouts/slideLayout5.xml><?xml version="1.0" encoding="utf-8"?>
 <p:sldLayout xmlns:a="http://schemas.openxmlformats.org/drawingml/2006/main" xmlns:r="http://schemas.openxmlformats.org/officeDocument/2006/relationships" xmlns:p="http://schemas.openxmlformats.org/presentationml/2006/main" type="twoObj" preserve="1">
   <p:cSld name="Two Content">
     <p:spTree>
@@ -1174,7 +2137,12 @@
             <p:ph type="title"/>
           </p:nvPr>
         </p:nvSpPr>
-        <p:spPr/>
+        <p:spPr>
+          <a:xfrm>
+            <a:off x="549275" y="107576"/>
+            <a:ext cx="8042276" cy="1336956"/>
+          </a:xfrm>
+        </p:spPr>
         <p:txBody>
           <a:bodyPr/>
           <a:lstStyle/>
@@ -1183,7 +2151,7 @@
               <a:rPr lang="en-US" smtClean="0"/>
               <a:t>Click to edit Master title style</a:t>
             </a:r>
-            <a:endParaRPr lang="en-US"/>
+            <a:endParaRPr/>
           </a:p>
         </p:txBody>
       </p:sp>
@@ -1199,21 +2167,26 @@
         </p:nvSpPr>
         <p:spPr>
           <a:xfrm>
-            <a:off x="457200" y="1600200"/>
-            <a:ext cx="4038600" cy="4525963"/>
+            <a:off x="549275" y="1600201"/>
+            <a:ext cx="3840480" cy="4343400"/>
           </a:xfrm>
         </p:spPr>
         <p:txBody>
-          <a:bodyPr/>
+          <a:bodyPr>
+            <a:normAutofit/>
+          </a:bodyPr>
           <a:lstStyle>
             <a:lvl1pPr>
-              <a:defRPr sz="2800"/>
+              <a:spcBef>
+                <a:spcPts val="1600"/>
+              </a:spcBef>
+              <a:defRPr sz="2000"/>
             </a:lvl1pPr>
             <a:lvl2pPr>
-              <a:defRPr sz="2400"/>
+              <a:defRPr sz="1800"/>
             </a:lvl2pPr>
             <a:lvl3pPr>
-              <a:defRPr sz="2000"/>
+              <a:defRPr sz="1800"/>
             </a:lvl3pPr>
             <a:lvl4pPr>
               <a:defRPr sz="1800"/>
@@ -1268,7 +2241,7 @@
               <a:rPr lang="en-US" smtClean="0"/>
               <a:t>Fifth level</a:t>
             </a:r>
-            <a:endParaRPr lang="en-US"/>
+            <a:endParaRPr dirty="0"/>
           </a:p>
         </p:txBody>
       </p:sp>
@@ -1284,21 +2257,26 @@
         </p:nvSpPr>
         <p:spPr>
           <a:xfrm>
-            <a:off x="4648200" y="1600200"/>
-            <a:ext cx="4038600" cy="4525963"/>
+            <a:off x="4751071" y="1600201"/>
+            <a:ext cx="3840480" cy="4343400"/>
           </a:xfrm>
         </p:spPr>
         <p:txBody>
-          <a:bodyPr/>
+          <a:bodyPr>
+            <a:normAutofit/>
+          </a:bodyPr>
           <a:lstStyle>
             <a:lvl1pPr>
-              <a:defRPr sz="2800"/>
+              <a:spcBef>
+                <a:spcPts val="1600"/>
+              </a:spcBef>
+              <a:defRPr sz="2000"/>
             </a:lvl1pPr>
             <a:lvl2pPr>
-              <a:defRPr sz="2400"/>
+              <a:defRPr sz="1800"/>
             </a:lvl2pPr>
             <a:lvl3pPr>
-              <a:defRPr sz="2000"/>
+              <a:defRPr sz="1800"/>
             </a:lvl3pPr>
             <a:lvl4pPr>
               <a:defRPr sz="1800"/>
@@ -1353,7 +2331,7 @@
               <a:rPr lang="en-US" smtClean="0"/>
               <a:t>Fifth level</a:t>
             </a:r>
-            <a:endParaRPr lang="en-US"/>
+            <a:endParaRPr dirty="0"/>
           </a:p>
         </p:txBody>
       </p:sp>
@@ -1374,7 +2352,8 @@
           <a:p>
             <a:fld id="{3EC25210-86F0-4E6C-AD5E-B8BB5E189FC5}" type="datetimeFigureOut">
               <a:rPr lang="en-US" smtClean="0"/>
-              <a:t>7/28/2013</a:t>
+              <a:pPr/>
+              <a:t>29/11/13</a:t>
             </a:fld>
             <a:endParaRPr lang="en-US"/>
           </a:p>
@@ -1416,6 +2395,7 @@
           <a:p>
             <a:fld id="{302C726E-FB28-4EB3-B2FA-7AE9B707067F}" type="slidenum">
               <a:rPr lang="en-US" smtClean="0"/>
+              <a:pPr/>
               <a:t>‹#›</a:t>
             </a:fld>
             <a:endParaRPr lang="en-US"/>
@@ -1423,11 +2403,6 @@
         </p:txBody>
       </p:sp>
     </p:spTree>
-    <p:extLst>
-      <p:ext uri="{BB962C8B-B14F-4D97-AF65-F5344CB8AC3E}">
-        <p14:creationId xmlns:p14="http://schemas.microsoft.com/office/powerpoint/2010/main" val="1940934208"/>
-      </p:ext>
-    </p:extLst>
   </p:cSld>
   <p:clrMapOvr>
     <a:masterClrMapping/>
@@ -1435,7 +2410,7 @@
 </p:sldLayout>
 </file>
 
-<file path=ppt/slideLayouts/slideLayout5.xml><?xml version="1.0" encoding="utf-8"?>
+<file path=ppt/slideLayouts/slideLayout6.xml><?xml version="1.0" encoding="utf-8"?>
 <p:sldLayout xmlns:a="http://schemas.openxmlformats.org/drawingml/2006/main" xmlns:r="http://schemas.openxmlformats.org/officeDocument/2006/relationships" xmlns:p="http://schemas.openxmlformats.org/presentationml/2006/main" type="twoTxTwoObj" preserve="1">
   <p:cSld name="Comparison">
     <p:spTree>
@@ -1462,7 +2437,12 @@
             <p:ph type="title"/>
           </p:nvPr>
         </p:nvSpPr>
-        <p:spPr/>
+        <p:spPr>
+          <a:xfrm>
+            <a:off x="549274" y="107576"/>
+            <a:ext cx="8042276" cy="1336956"/>
+          </a:xfrm>
+        </p:spPr>
         <p:txBody>
           <a:bodyPr/>
           <a:lstStyle>
@@ -1475,7 +2455,7 @@
               <a:rPr lang="en-US" smtClean="0"/>
               <a:t>Click to edit Master title style</a:t>
             </a:r>
-            <a:endParaRPr lang="en-US"/>
+            <a:endParaRPr/>
           </a:p>
         </p:txBody>
       </p:sp>
@@ -1491,16 +2471,28 @@
         </p:nvSpPr>
         <p:spPr>
           <a:xfrm>
-            <a:off x="457200" y="1535113"/>
-            <a:ext cx="4040188" cy="639762"/>
+            <a:off x="549274" y="1453224"/>
+            <a:ext cx="3840480" cy="750887"/>
           </a:xfrm>
         </p:spPr>
         <p:txBody>
-          <a:bodyPr anchor="b"/>
+          <a:bodyPr anchor="b">
+            <a:noAutofit/>
+          </a:bodyPr>
           <a:lstStyle>
-            <a:lvl1pPr marL="0" indent="0">
-              <a:buNone/>
-              <a:defRPr sz="2400" b="1"/>
+            <a:lvl1pPr marL="0" indent="0" algn="ctr">
+              <a:spcBef>
+                <a:spcPts val="0"/>
+              </a:spcBef>
+              <a:buNone/>
+              <a:defRPr sz="2400" b="0">
+                <a:solidFill>
+                  <a:schemeClr val="accent1">
+                    <a:lumMod val="60000"/>
+                    <a:lumOff val="40000"/>
+                  </a:schemeClr>
+                </a:solidFill>
+              </a:defRPr>
             </a:lvl1pPr>
             <a:lvl2pPr marL="457200" indent="0">
               <a:buNone/>
@@ -1556,27 +2548,32 @@
         </p:nvSpPr>
         <p:spPr>
           <a:xfrm>
-            <a:off x="457200" y="2174875"/>
-            <a:ext cx="4040188" cy="3951288"/>
+            <a:off x="549274" y="2347415"/>
+            <a:ext cx="3840480" cy="3596185"/>
           </a:xfrm>
         </p:spPr>
         <p:txBody>
-          <a:bodyPr/>
+          <a:bodyPr>
+            <a:normAutofit/>
+          </a:bodyPr>
           <a:lstStyle>
             <a:lvl1pPr>
-              <a:defRPr sz="2400"/>
+              <a:spcBef>
+                <a:spcPts val="1600"/>
+              </a:spcBef>
+              <a:defRPr sz="2000"/>
             </a:lvl1pPr>
             <a:lvl2pPr>
-              <a:defRPr sz="2000"/>
+              <a:defRPr sz="1800"/>
             </a:lvl2pPr>
             <a:lvl3pPr>
               <a:defRPr sz="1800"/>
             </a:lvl3pPr>
             <a:lvl4pPr>
-              <a:defRPr sz="1600"/>
+              <a:defRPr sz="1800"/>
             </a:lvl4pPr>
             <a:lvl5pPr>
-              <a:defRPr sz="1600"/>
+              <a:defRPr sz="1800"/>
             </a:lvl5pPr>
             <a:lvl6pPr>
               <a:defRPr sz="1600"/>
@@ -1625,7 +2622,7 @@
               <a:rPr lang="en-US" smtClean="0"/>
               <a:t>Fifth level</a:t>
             </a:r>
-            <a:endParaRPr lang="en-US"/>
+            <a:endParaRPr dirty="0"/>
           </a:p>
         </p:txBody>
       </p:sp>
@@ -1641,16 +2638,28 @@
         </p:nvSpPr>
         <p:spPr>
           <a:xfrm>
-            <a:off x="4645025" y="1535113"/>
-            <a:ext cx="4041775" cy="639762"/>
+            <a:off x="4751070" y="1453224"/>
+            <a:ext cx="3840480" cy="750887"/>
           </a:xfrm>
         </p:spPr>
         <p:txBody>
-          <a:bodyPr anchor="b"/>
+          <a:bodyPr anchor="b">
+            <a:noAutofit/>
+          </a:bodyPr>
           <a:lstStyle>
-            <a:lvl1pPr marL="0" indent="0">
-              <a:buNone/>
-              <a:defRPr sz="2400" b="1"/>
+            <a:lvl1pPr marL="0" indent="0" algn="ctr">
+              <a:spcBef>
+                <a:spcPts val="0"/>
+              </a:spcBef>
+              <a:buNone/>
+              <a:defRPr sz="2400" b="0">
+                <a:solidFill>
+                  <a:schemeClr val="accent1">
+                    <a:lumMod val="60000"/>
+                    <a:lumOff val="40000"/>
+                  </a:schemeClr>
+                </a:solidFill>
+              </a:defRPr>
             </a:lvl1pPr>
             <a:lvl2pPr marL="457200" indent="0">
               <a:buNone/>
@@ -1706,27 +2715,32 @@
         </p:nvSpPr>
         <p:spPr>
           <a:xfrm>
-            <a:off x="4645025" y="2174875"/>
-            <a:ext cx="4041775" cy="3951288"/>
+            <a:off x="4751070" y="2347415"/>
+            <a:ext cx="3840480" cy="3596185"/>
           </a:xfrm>
         </p:spPr>
         <p:txBody>
-          <a:bodyPr/>
+          <a:bodyPr>
+            <a:normAutofit/>
+          </a:bodyPr>
           <a:lstStyle>
             <a:lvl1pPr>
-              <a:defRPr sz="2400"/>
+              <a:spcBef>
+                <a:spcPts val="1600"/>
+              </a:spcBef>
+              <a:defRPr sz="2000"/>
             </a:lvl1pPr>
             <a:lvl2pPr>
-              <a:defRPr sz="2000"/>
+              <a:defRPr sz="1800"/>
             </a:lvl2pPr>
             <a:lvl3pPr>
               <a:defRPr sz="1800"/>
             </a:lvl3pPr>
             <a:lvl4pPr>
-              <a:defRPr sz="1600"/>
+              <a:defRPr sz="1800"/>
             </a:lvl4pPr>
             <a:lvl5pPr>
-              <a:defRPr sz="1600"/>
+              <a:defRPr sz="1800"/>
             </a:lvl5pPr>
             <a:lvl6pPr>
               <a:defRPr sz="1600"/>
@@ -1775,7 +2789,7 @@
               <a:rPr lang="en-US" smtClean="0"/>
               <a:t>Fifth level</a:t>
             </a:r>
-            <a:endParaRPr lang="en-US"/>
+            <a:endParaRPr dirty="0"/>
           </a:p>
         </p:txBody>
       </p:sp>
@@ -1796,7 +2810,8 @@
           <a:p>
             <a:fld id="{3EC25210-86F0-4E6C-AD5E-B8BB5E189FC5}" type="datetimeFigureOut">
               <a:rPr lang="en-US" smtClean="0"/>
-              <a:t>7/28/2013</a:t>
+              <a:pPr/>
+              <a:t>29/11/13</a:t>
             </a:fld>
             <a:endParaRPr lang="en-US"/>
           </a:p>
@@ -1838,6 +2853,7 @@
           <a:p>
             <a:fld id="{302C726E-FB28-4EB3-B2FA-7AE9B707067F}" type="slidenum">
               <a:rPr lang="en-US" smtClean="0"/>
+              <a:pPr/>
               <a:t>‹#›</a:t>
             </a:fld>
             <a:endParaRPr lang="en-US"/>
@@ -1845,11 +2861,6 @@
         </p:txBody>
       </p:sp>
     </p:spTree>
-    <p:extLst>
-      <p:ext uri="{BB962C8B-B14F-4D97-AF65-F5344CB8AC3E}">
-        <p14:creationId xmlns:p14="http://schemas.microsoft.com/office/powerpoint/2010/main" val="752897712"/>
-      </p:ext>
-    </p:extLst>
   </p:cSld>
   <p:clrMapOvr>
     <a:masterClrMapping/>
@@ -1857,7 +2868,7 @@
 </p:sldLayout>
 </file>
 
-<file path=ppt/slideLayouts/slideLayout6.xml><?xml version="1.0" encoding="utf-8"?>
+<file path=ppt/slideLayouts/slideLayout7.xml><?xml version="1.0" encoding="utf-8"?>
 <p:sldLayout xmlns:a="http://schemas.openxmlformats.org/drawingml/2006/main" xmlns:r="http://schemas.openxmlformats.org/officeDocument/2006/relationships" xmlns:p="http://schemas.openxmlformats.org/presentationml/2006/main" type="titleOnly" preserve="1">
   <p:cSld name="Title Only">
     <p:spTree>
@@ -1893,7 +2904,7 @@
               <a:rPr lang="en-US" smtClean="0"/>
               <a:t>Click to edit Master title style</a:t>
             </a:r>
-            <a:endParaRPr lang="en-US"/>
+            <a:endParaRPr/>
           </a:p>
         </p:txBody>
       </p:sp>
@@ -1914,7 +2925,8 @@
           <a:p>
             <a:fld id="{3EC25210-86F0-4E6C-AD5E-B8BB5E189FC5}" type="datetimeFigureOut">
               <a:rPr lang="en-US" smtClean="0"/>
-              <a:t>7/28/2013</a:t>
+              <a:pPr/>
+              <a:t>29/11/13</a:t>
             </a:fld>
             <a:endParaRPr lang="en-US"/>
           </a:p>
@@ -1956,6 +2968,7 @@
           <a:p>
             <a:fld id="{302C726E-FB28-4EB3-B2FA-7AE9B707067F}" type="slidenum">
               <a:rPr lang="en-US" smtClean="0"/>
+              <a:pPr/>
               <a:t>‹#›</a:t>
             </a:fld>
             <a:endParaRPr lang="en-US"/>
@@ -1963,11 +2976,6 @@
         </p:txBody>
       </p:sp>
     </p:spTree>
-    <p:extLst>
-      <p:ext uri="{BB962C8B-B14F-4D97-AF65-F5344CB8AC3E}">
-        <p14:creationId xmlns:p14="http://schemas.microsoft.com/office/powerpoint/2010/main" val="687955540"/>
-      </p:ext>
-    </p:extLst>
   </p:cSld>
   <p:clrMapOvr>
     <a:masterClrMapping/>
@@ -1975,7 +2983,7 @@
 </p:sldLayout>
 </file>
 
-<file path=ppt/slideLayouts/slideLayout7.xml><?xml version="1.0" encoding="utf-8"?>
+<file path=ppt/slideLayouts/slideLayout8.xml><?xml version="1.0" encoding="utf-8"?>
 <p:sldLayout xmlns:a="http://schemas.openxmlformats.org/drawingml/2006/main" xmlns:r="http://schemas.openxmlformats.org/officeDocument/2006/relationships" xmlns:p="http://schemas.openxmlformats.org/presentationml/2006/main" type="blank" preserve="1">
   <p:cSld name="Blank">
     <p:spTree>
@@ -2009,7 +3017,8 @@
           <a:p>
             <a:fld id="{3EC25210-86F0-4E6C-AD5E-B8BB5E189FC5}" type="datetimeFigureOut">
               <a:rPr lang="en-US" smtClean="0"/>
-              <a:t>7/28/2013</a:t>
+              <a:pPr/>
+              <a:t>29/11/13</a:t>
             </a:fld>
             <a:endParaRPr lang="en-US"/>
           </a:p>
@@ -2051,6 +3060,7 @@
           <a:p>
             <a:fld id="{302C726E-FB28-4EB3-B2FA-7AE9B707067F}" type="slidenum">
               <a:rPr lang="en-US" smtClean="0"/>
+              <a:pPr/>
               <a:t>‹#›</a:t>
             </a:fld>
             <a:endParaRPr lang="en-US"/>
@@ -2058,11 +3068,6 @@
         </p:txBody>
       </p:sp>
     </p:spTree>
-    <p:extLst>
-      <p:ext uri="{BB962C8B-B14F-4D97-AF65-F5344CB8AC3E}">
-        <p14:creationId xmlns:p14="http://schemas.microsoft.com/office/powerpoint/2010/main" val="1781609794"/>
-      </p:ext>
-    </p:extLst>
   </p:cSld>
   <p:clrMapOvr>
     <a:masterClrMapping/>
@@ -2070,7 +3075,7 @@
 </p:sldLayout>
 </file>
 
-<file path=ppt/slideLayouts/slideLayout8.xml><?xml version="1.0" encoding="utf-8"?>
+<file path=ppt/slideLayouts/slideLayout9.xml><?xml version="1.0" encoding="utf-8"?>
 <p:sldLayout xmlns:a="http://schemas.openxmlformats.org/drawingml/2006/main" xmlns:r="http://schemas.openxmlformats.org/officeDocument/2006/relationships" xmlns:p="http://schemas.openxmlformats.org/presentationml/2006/main" type="objTx" preserve="1">
   <p:cSld name="Content with Caption">
     <p:spTree>
@@ -2099,15 +3104,15 @@
         </p:nvSpPr>
         <p:spPr>
           <a:xfrm>
-            <a:off x="457200" y="273050"/>
-            <a:ext cx="3008313" cy="1162050"/>
+            <a:off x="533399" y="611872"/>
+            <a:ext cx="3840480" cy="1162050"/>
           </a:xfrm>
         </p:spPr>
         <p:txBody>
           <a:bodyPr anchor="b"/>
           <a:lstStyle>
-            <a:lvl1pPr algn="l">
-              <a:defRPr sz="2000" b="1"/>
+            <a:lvl1pPr algn="ctr">
+              <a:defRPr sz="3600" b="0"/>
             </a:lvl1pPr>
           </a:lstStyle>
           <a:p>
@@ -2115,7 +3120,7 @@
               <a:rPr lang="en-US" smtClean="0"/>
               <a:t>Click to edit Master title style</a:t>
             </a:r>
-            <a:endParaRPr lang="en-US"/>
+            <a:endParaRPr/>
           </a:p>
         </p:txBody>
       </p:sp>
@@ -2131,27 +3136,32 @@
         </p:nvSpPr>
         <p:spPr>
           <a:xfrm>
-            <a:off x="3575050" y="273050"/>
-            <a:ext cx="5111750" cy="5853113"/>
+            <a:off x="4742824" y="368300"/>
+            <a:ext cx="3840480" cy="5575300"/>
           </a:xfrm>
         </p:spPr>
         <p:txBody>
-          <a:bodyPr/>
+          <a:bodyPr>
+            <a:normAutofit/>
+          </a:bodyPr>
           <a:lstStyle>
             <a:lvl1pPr>
-              <a:defRPr sz="3200"/>
+              <a:spcBef>
+                <a:spcPts val="2000"/>
+              </a:spcBef>
+              <a:defRPr sz="2200"/>
             </a:lvl1pPr>
             <a:lvl2pPr>
-              <a:defRPr sz="2800"/>
+              <a:defRPr sz="2000"/>
             </a:lvl2pPr>
             <a:lvl3pPr>
-              <a:defRPr sz="2400"/>
+              <a:defRPr sz="1800"/>
             </a:lvl3pPr>
             <a:lvl4pPr>
-              <a:defRPr sz="2000"/>
+              <a:defRPr sz="1800"/>
             </a:lvl4pPr>
             <a:lvl5pPr>
-              <a:defRPr sz="2000"/>
+              <a:defRPr sz="1800"/>
             </a:lvl5pPr>
             <a:lvl6pPr>
               <a:defRPr sz="2000"/>
@@ -2200,7 +3210,7 @@
               <a:rPr lang="en-US" smtClean="0"/>
               <a:t>Fifth level</a:t>
             </a:r>
-            <a:endParaRPr lang="en-US"/>
+            <a:endParaRPr dirty="0"/>
           </a:p>
         </p:txBody>
       </p:sp>
@@ -2216,16 +3226,21 @@
         </p:nvSpPr>
         <p:spPr>
           <a:xfrm>
-            <a:off x="457200" y="1435100"/>
-            <a:ext cx="3008313" cy="4691063"/>
+            <a:off x="533399" y="1787856"/>
+            <a:ext cx="3840480" cy="3720152"/>
           </a:xfrm>
         </p:spPr>
         <p:txBody>
-          <a:bodyPr/>
+          <a:bodyPr>
+            <a:normAutofit/>
+          </a:bodyPr>
           <a:lstStyle>
-            <a:lvl1pPr marL="0" indent="0">
-              <a:buNone/>
-              <a:defRPr sz="1400"/>
+            <a:lvl1pPr marL="0" indent="0" algn="ctr">
+              <a:spcBef>
+                <a:spcPts val="600"/>
+              </a:spcBef>
+              <a:buNone/>
+              <a:defRPr sz="1800"/>
             </a:lvl1pPr>
             <a:lvl2pPr marL="457200" indent="0">
               <a:buNone/>
@@ -2286,7 +3301,8 @@
           <a:p>
             <a:fld id="{3EC25210-86F0-4E6C-AD5E-B8BB5E189FC5}" type="datetimeFigureOut">
               <a:rPr lang="en-US" smtClean="0"/>
-              <a:t>7/28/2013</a:t>
+              <a:pPr/>
+              <a:t>29/11/13</a:t>
             </a:fld>
             <a:endParaRPr lang="en-US"/>
           </a:p>
@@ -2326,7 +3342,7 @@
           <a:bodyPr/>
           <a:lstStyle/>
           <a:p>
-            <a:fld id="{302C726E-FB28-4EB3-B2FA-7AE9B707067F}" type="slidenum">
+            <a:fld id="{7F5CE407-6216-4202-80E4-A30DC2F709B2}" type="slidenum">
               <a:rPr lang="en-US" smtClean="0"/>
               <a:t>‹#›</a:t>
             </a:fld>
@@ -2335,264 +3351,6 @@
         </p:txBody>
       </p:sp>
     </p:spTree>
-    <p:extLst>
-      <p:ext uri="{BB962C8B-B14F-4D97-AF65-F5344CB8AC3E}">
-        <p14:creationId xmlns:p14="http://schemas.microsoft.com/office/powerpoint/2010/main" val="1134574186"/>
-      </p:ext>
-    </p:extLst>
-  </p:cSld>
-  <p:clrMapOvr>
-    <a:masterClrMapping/>
-  </p:clrMapOvr>
-</p:sldLayout>
-</file>
-
-<file path=ppt/slideLayouts/slideLayout9.xml><?xml version="1.0" encoding="utf-8"?>
-<p:sldLayout xmlns:a="http://schemas.openxmlformats.org/drawingml/2006/main" xmlns:r="http://schemas.openxmlformats.org/officeDocument/2006/relationships" xmlns:p="http://schemas.openxmlformats.org/presentationml/2006/main" type="picTx" preserve="1">
-  <p:cSld name="Picture with Caption">
-    <p:spTree>
-      <p:nvGrpSpPr>
-        <p:cNvPr id="1" name=""/>
-        <p:cNvGrpSpPr/>
-        <p:nvPr/>
-      </p:nvGrpSpPr>
-      <p:grpSpPr>
-        <a:xfrm>
-          <a:off x="0" y="0"/>
-          <a:ext cx="0" cy="0"/>
-          <a:chOff x="0" y="0"/>
-          <a:chExt cx="0" cy="0"/>
-        </a:xfrm>
-      </p:grpSpPr>
-      <p:sp>
-        <p:nvSpPr>
-          <p:cNvPr id="2" name="Title 1"/>
-          <p:cNvSpPr>
-            <a:spLocks noGrp="1"/>
-          </p:cNvSpPr>
-          <p:nvPr>
-            <p:ph type="title"/>
-          </p:nvPr>
-        </p:nvSpPr>
-        <p:spPr>
-          <a:xfrm>
-            <a:off x="1792288" y="4800600"/>
-            <a:ext cx="5486400" cy="566738"/>
-          </a:xfrm>
-        </p:spPr>
-        <p:txBody>
-          <a:bodyPr anchor="b"/>
-          <a:lstStyle>
-            <a:lvl1pPr algn="l">
-              <a:defRPr sz="2000" b="1"/>
-            </a:lvl1pPr>
-          </a:lstStyle>
-          <a:p>
-            <a:r>
-              <a:rPr lang="en-US" smtClean="0"/>
-              <a:t>Click to edit Master title style</a:t>
-            </a:r>
-            <a:endParaRPr lang="en-US"/>
-          </a:p>
-        </p:txBody>
-      </p:sp>
-      <p:sp>
-        <p:nvSpPr>
-          <p:cNvPr id="3" name="Picture Placeholder 2"/>
-          <p:cNvSpPr>
-            <a:spLocks noGrp="1"/>
-          </p:cNvSpPr>
-          <p:nvPr>
-            <p:ph type="pic" idx="1"/>
-          </p:nvPr>
-        </p:nvSpPr>
-        <p:spPr>
-          <a:xfrm>
-            <a:off x="1792288" y="612775"/>
-            <a:ext cx="5486400" cy="4114800"/>
-          </a:xfrm>
-        </p:spPr>
-        <p:txBody>
-          <a:bodyPr/>
-          <a:lstStyle>
-            <a:lvl1pPr marL="0" indent="0">
-              <a:buNone/>
-              <a:defRPr sz="3200"/>
-            </a:lvl1pPr>
-            <a:lvl2pPr marL="457200" indent="0">
-              <a:buNone/>
-              <a:defRPr sz="2800"/>
-            </a:lvl2pPr>
-            <a:lvl3pPr marL="914400" indent="0">
-              <a:buNone/>
-              <a:defRPr sz="2400"/>
-            </a:lvl3pPr>
-            <a:lvl4pPr marL="1371600" indent="0">
-              <a:buNone/>
-              <a:defRPr sz="2000"/>
-            </a:lvl4pPr>
-            <a:lvl5pPr marL="1828800" indent="0">
-              <a:buNone/>
-              <a:defRPr sz="2000"/>
-            </a:lvl5pPr>
-            <a:lvl6pPr marL="2286000" indent="0">
-              <a:buNone/>
-              <a:defRPr sz="2000"/>
-            </a:lvl6pPr>
-            <a:lvl7pPr marL="2743200" indent="0">
-              <a:buNone/>
-              <a:defRPr sz="2000"/>
-            </a:lvl7pPr>
-            <a:lvl8pPr marL="3200400" indent="0">
-              <a:buNone/>
-              <a:defRPr sz="2000"/>
-            </a:lvl8pPr>
-            <a:lvl9pPr marL="3657600" indent="0">
-              <a:buNone/>
-              <a:defRPr sz="2000"/>
-            </a:lvl9pPr>
-          </a:lstStyle>
-          <a:p>
-            <a:endParaRPr lang="en-US"/>
-          </a:p>
-        </p:txBody>
-      </p:sp>
-      <p:sp>
-        <p:nvSpPr>
-          <p:cNvPr id="4" name="Text Placeholder 3"/>
-          <p:cNvSpPr>
-            <a:spLocks noGrp="1"/>
-          </p:cNvSpPr>
-          <p:nvPr>
-            <p:ph type="body" sz="half" idx="2"/>
-          </p:nvPr>
-        </p:nvSpPr>
-        <p:spPr>
-          <a:xfrm>
-            <a:off x="1792288" y="5367338"/>
-            <a:ext cx="5486400" cy="804862"/>
-          </a:xfrm>
-        </p:spPr>
-        <p:txBody>
-          <a:bodyPr/>
-          <a:lstStyle>
-            <a:lvl1pPr marL="0" indent="0">
-              <a:buNone/>
-              <a:defRPr sz="1400"/>
-            </a:lvl1pPr>
-            <a:lvl2pPr marL="457200" indent="0">
-              <a:buNone/>
-              <a:defRPr sz="1200"/>
-            </a:lvl2pPr>
-            <a:lvl3pPr marL="914400" indent="0">
-              <a:buNone/>
-              <a:defRPr sz="1000"/>
-            </a:lvl3pPr>
-            <a:lvl4pPr marL="1371600" indent="0">
-              <a:buNone/>
-              <a:defRPr sz="900"/>
-            </a:lvl4pPr>
-            <a:lvl5pPr marL="1828800" indent="0">
-              <a:buNone/>
-              <a:defRPr sz="900"/>
-            </a:lvl5pPr>
-            <a:lvl6pPr marL="2286000" indent="0">
-              <a:buNone/>
-              <a:defRPr sz="900"/>
-            </a:lvl6pPr>
-            <a:lvl7pPr marL="2743200" indent="0">
-              <a:buNone/>
-              <a:defRPr sz="900"/>
-            </a:lvl7pPr>
-            <a:lvl8pPr marL="3200400" indent="0">
-              <a:buNone/>
-              <a:defRPr sz="900"/>
-            </a:lvl8pPr>
-            <a:lvl9pPr marL="3657600" indent="0">
-              <a:buNone/>
-              <a:defRPr sz="900"/>
-            </a:lvl9pPr>
-          </a:lstStyle>
-          <a:p>
-            <a:pPr lvl="0"/>
-            <a:r>
-              <a:rPr lang="en-US" smtClean="0"/>
-              <a:t>Click to edit Master text styles</a:t>
-            </a:r>
-          </a:p>
-        </p:txBody>
-      </p:sp>
-      <p:sp>
-        <p:nvSpPr>
-          <p:cNvPr id="5" name="Date Placeholder 4"/>
-          <p:cNvSpPr>
-            <a:spLocks noGrp="1"/>
-          </p:cNvSpPr>
-          <p:nvPr>
-            <p:ph type="dt" sz="half" idx="10"/>
-          </p:nvPr>
-        </p:nvSpPr>
-        <p:spPr/>
-        <p:txBody>
-          <a:bodyPr/>
-          <a:lstStyle/>
-          <a:p>
-            <a:fld id="{3EC25210-86F0-4E6C-AD5E-B8BB5E189FC5}" type="datetimeFigureOut">
-              <a:rPr lang="en-US" smtClean="0"/>
-              <a:t>7/28/2013</a:t>
-            </a:fld>
-            <a:endParaRPr lang="en-US"/>
-          </a:p>
-        </p:txBody>
-      </p:sp>
-      <p:sp>
-        <p:nvSpPr>
-          <p:cNvPr id="6" name="Footer Placeholder 5"/>
-          <p:cNvSpPr>
-            <a:spLocks noGrp="1"/>
-          </p:cNvSpPr>
-          <p:nvPr>
-            <p:ph type="ftr" sz="quarter" idx="11"/>
-          </p:nvPr>
-        </p:nvSpPr>
-        <p:spPr/>
-        <p:txBody>
-          <a:bodyPr/>
-          <a:lstStyle/>
-          <a:p>
-            <a:endParaRPr lang="en-US"/>
-          </a:p>
-        </p:txBody>
-      </p:sp>
-      <p:sp>
-        <p:nvSpPr>
-          <p:cNvPr id="7" name="Slide Number Placeholder 6"/>
-          <p:cNvSpPr>
-            <a:spLocks noGrp="1"/>
-          </p:cNvSpPr>
-          <p:nvPr>
-            <p:ph type="sldNum" sz="quarter" idx="12"/>
-          </p:nvPr>
-        </p:nvSpPr>
-        <p:spPr/>
-        <p:txBody>
-          <a:bodyPr/>
-          <a:lstStyle/>
-          <a:p>
-            <a:fld id="{302C726E-FB28-4EB3-B2FA-7AE9B707067F}" type="slidenum">
-              <a:rPr lang="en-US" smtClean="0"/>
-              <a:t>‹#›</a:t>
-            </a:fld>
-            <a:endParaRPr lang="en-US"/>
-          </a:p>
-        </p:txBody>
-      </p:sp>
-    </p:spTree>
-    <p:extLst>
-      <p:ext uri="{BB962C8B-B14F-4D97-AF65-F5344CB8AC3E}">
-        <p14:creationId xmlns:p14="http://schemas.microsoft.com/office/powerpoint/2010/main" val="10562102"/>
-      </p:ext>
-    </p:extLst>
   </p:cSld>
   <p:clrMapOvr>
     <a:masterClrMapping/>
@@ -2604,8 +3362,8 @@
 <p:sldMaster xmlns:a="http://schemas.openxmlformats.org/drawingml/2006/main" xmlns:r="http://schemas.openxmlformats.org/officeDocument/2006/relationships" xmlns:p="http://schemas.openxmlformats.org/presentationml/2006/main">
   <p:cSld>
     <p:bg>
-      <p:bgRef idx="1001">
-        <a:schemeClr val="bg1"/>
+      <p:bgRef idx="1003">
+        <a:schemeClr val="bg2"/>
       </p:bgRef>
     </p:bg>
     <p:spTree>
@@ -2634,16 +3392,16 @@
         </p:nvSpPr>
         <p:spPr>
           <a:xfrm>
-            <a:off x="457200" y="274638"/>
-            <a:ext cx="8229600" cy="1143000"/>
+            <a:off x="549275" y="107576"/>
+            <a:ext cx="8042276" cy="1336956"/>
           </a:xfrm>
           <a:prstGeom prst="rect">
             <a:avLst/>
           </a:prstGeom>
         </p:spPr>
         <p:txBody>
-          <a:bodyPr vert="horz" lIns="91440" tIns="45720" rIns="91440" bIns="45720" rtlCol="0" anchor="ctr">
-            <a:normAutofit/>
+          <a:bodyPr vert="horz" lIns="91440" tIns="45720" rIns="91440" bIns="45720" rtlCol="0" anchor="b" anchorCtr="0">
+            <a:noAutofit/>
           </a:bodyPr>
           <a:lstStyle/>
           <a:p>
@@ -2651,7 +3409,7 @@
               <a:rPr lang="en-US" smtClean="0"/>
               <a:t>Click to edit Master title style</a:t>
             </a:r>
-            <a:endParaRPr lang="en-US"/>
+            <a:endParaRPr/>
           </a:p>
         </p:txBody>
       </p:sp>
@@ -2667,8 +3425,8 @@
         </p:nvSpPr>
         <p:spPr>
           <a:xfrm>
-            <a:off x="457200" y="1600200"/>
-            <a:ext cx="8229600" cy="4525963"/>
+            <a:off x="549275" y="1600201"/>
+            <a:ext cx="8042276" cy="4343400"/>
           </a:xfrm>
           <a:prstGeom prst="rect">
             <a:avLst/>
@@ -2713,7 +3471,7 @@
               <a:rPr lang="en-US" smtClean="0"/>
               <a:t>Fifth level</a:t>
             </a:r>
-            <a:endParaRPr lang="en-US"/>
+            <a:endParaRPr dirty="0"/>
           </a:p>
         </p:txBody>
       </p:sp>
@@ -2729,7 +3487,7 @@
         </p:nvSpPr>
         <p:spPr>
           <a:xfrm>
-            <a:off x="457200" y="6356350"/>
+            <a:off x="5629835" y="6275668"/>
             <a:ext cx="2133600" cy="365125"/>
           </a:xfrm>
           <a:prstGeom prst="rect">
@@ -2739,12 +3497,10 @@
         <p:txBody>
           <a:bodyPr vert="horz" lIns="91440" tIns="45720" rIns="91440" bIns="45720" rtlCol="0" anchor="ctr"/>
           <a:lstStyle>
-            <a:lvl1pPr algn="l">
+            <a:lvl1pPr algn="r">
               <a:defRPr sz="1200">
                 <a:solidFill>
-                  <a:schemeClr val="tx1">
-                    <a:tint val="75000"/>
-                  </a:schemeClr>
+                  <a:schemeClr val="bg1"/>
                 </a:solidFill>
               </a:defRPr>
             </a:lvl1pPr>
@@ -2752,7 +3508,8 @@
           <a:p>
             <a:fld id="{3EC25210-86F0-4E6C-AD5E-B8BB5E189FC5}" type="datetimeFigureOut">
               <a:rPr lang="en-US" smtClean="0"/>
-              <a:t>7/28/2013</a:t>
+              <a:pPr/>
+              <a:t>29/11/13</a:t>
             </a:fld>
             <a:endParaRPr lang="en-US"/>
           </a:p>
@@ -2770,8 +3527,8 @@
         </p:nvSpPr>
         <p:spPr>
           <a:xfrm>
-            <a:off x="3124200" y="6356350"/>
-            <a:ext cx="2895600" cy="365125"/>
+            <a:off x="264458" y="6275668"/>
+            <a:ext cx="4840941" cy="365125"/>
           </a:xfrm>
           <a:prstGeom prst="rect">
             <a:avLst/>
@@ -2780,12 +3537,10 @@
         <p:txBody>
           <a:bodyPr vert="horz" lIns="91440" tIns="45720" rIns="91440" bIns="45720" rtlCol="0" anchor="ctr"/>
           <a:lstStyle>
-            <a:lvl1pPr algn="ctr">
+            <a:lvl1pPr algn="l">
               <a:defRPr sz="1200">
                 <a:solidFill>
-                  <a:schemeClr val="tx1">
-                    <a:tint val="75000"/>
-                  </a:schemeClr>
+                  <a:schemeClr val="bg1"/>
                 </a:solidFill>
               </a:defRPr>
             </a:lvl1pPr>
@@ -2807,8 +3562,8 @@
         </p:nvSpPr>
         <p:spPr>
           <a:xfrm>
-            <a:off x="6553200" y="6356350"/>
-            <a:ext cx="2133600" cy="365125"/>
+            <a:off x="7897906" y="6275668"/>
+            <a:ext cx="990600" cy="365125"/>
           </a:xfrm>
           <a:prstGeom prst="rect">
             <a:avLst/>
@@ -2818,11 +3573,9 @@
           <a:bodyPr vert="horz" lIns="91440" tIns="45720" rIns="91440" bIns="45720" rtlCol="0" anchor="ctr"/>
           <a:lstStyle>
             <a:lvl1pPr algn="r">
-              <a:defRPr sz="1200">
+              <a:defRPr sz="3600">
                 <a:solidFill>
-                  <a:schemeClr val="tx1">
-                    <a:tint val="75000"/>
-                  </a:schemeClr>
+                  <a:schemeClr val="bg1"/>
                 </a:solidFill>
               </a:defRPr>
             </a:lvl1pPr>
@@ -2830,6 +3583,7 @@
           <a:p>
             <a:fld id="{302C726E-FB28-4EB3-B2FA-7AE9B707067F}" type="slidenum">
               <a:rPr lang="en-US" smtClean="0"/>
+              <a:pPr/>
               <a:t>‹#›</a:t>
             </a:fld>
             <a:endParaRPr lang="en-US"/>
@@ -2837,25 +3591,22 @@
         </p:txBody>
       </p:sp>
     </p:spTree>
-    <p:extLst>
-      <p:ext uri="{BB962C8B-B14F-4D97-AF65-F5344CB8AC3E}">
-        <p14:creationId xmlns:p14="http://schemas.microsoft.com/office/powerpoint/2010/main" val="2982515936"/>
-      </p:ext>
-    </p:extLst>
   </p:cSld>
   <p:clrMap bg1="lt1" tx1="dk1" bg2="lt2" tx2="dk2" accent1="accent1" accent2="accent2" accent3="accent3" accent4="accent4" accent5="accent5" accent6="accent6" hlink="hlink" folHlink="folHlink"/>
   <p:sldLayoutIdLst>
-    <p:sldLayoutId id="2147483649" r:id="rId1"/>
-    <p:sldLayoutId id="2147483650" r:id="rId2"/>
-    <p:sldLayoutId id="2147483651" r:id="rId3"/>
-    <p:sldLayoutId id="2147483652" r:id="rId4"/>
-    <p:sldLayoutId id="2147483653" r:id="rId5"/>
-    <p:sldLayoutId id="2147483654" r:id="rId6"/>
-    <p:sldLayoutId id="2147483655" r:id="rId7"/>
-    <p:sldLayoutId id="2147483656" r:id="rId8"/>
-    <p:sldLayoutId id="2147483657" r:id="rId9"/>
-    <p:sldLayoutId id="2147483658" r:id="rId10"/>
-    <p:sldLayoutId id="2147483659" r:id="rId11"/>
+    <p:sldLayoutId id="2147484278" r:id="rId1"/>
+    <p:sldLayoutId id="2147484279" r:id="rId2"/>
+    <p:sldLayoutId id="2147484280" r:id="rId3"/>
+    <p:sldLayoutId id="2147484281" r:id="rId4"/>
+    <p:sldLayoutId id="2147484282" r:id="rId5"/>
+    <p:sldLayoutId id="2147484283" r:id="rId6"/>
+    <p:sldLayoutId id="2147484284" r:id="rId7"/>
+    <p:sldLayoutId id="2147484285" r:id="rId8"/>
+    <p:sldLayoutId id="2147484286" r:id="rId9"/>
+    <p:sldLayoutId id="2147484287" r:id="rId10"/>
+    <p:sldLayoutId id="2147484288" r:id="rId11"/>
+    <p:sldLayoutId id="2147484289" r:id="rId12"/>
+    <p:sldLayoutId id="2147484290" r:id="rId13"/>
   </p:sldLayoutIdLst>
   <p:txStyles>
     <p:titleStyle>
@@ -2864,9 +3615,9 @@
           <a:spcPct val="0"/>
         </a:spcBef>
         <a:buNone/>
-        <a:defRPr sz="4400" kern="1200">
+        <a:defRPr sz="4600" kern="1200">
           <a:solidFill>
-            <a:schemeClr val="tx1"/>
+            <a:schemeClr val="accent1"/>
           </a:solidFill>
           <a:latin typeface="+mj-lt"/>
           <a:ea typeface="+mj-ea"/>
@@ -2875,135 +3626,217 @@
       </a:lvl1pPr>
     </p:titleStyle>
     <p:bodyStyle>
-      <a:lvl1pPr marL="342900" indent="-342900" algn="l" defTabSz="914400" rtl="0" eaLnBrk="1" latinLnBrk="0" hangingPunct="1">
+      <a:lvl1pPr marL="349250" indent="-349250" algn="l" defTabSz="914400" rtl="0" eaLnBrk="1" latinLnBrk="0" hangingPunct="1">
         <a:spcBef>
-          <a:spcPct val="20000"/>
+          <a:spcPts val="2000"/>
         </a:spcBef>
-        <a:buFont typeface="Arial" pitchFamily="34" charset="0"/>
-        <a:buChar char="•"/>
-        <a:defRPr sz="3200" kern="1200">
+        <a:buClr>
+          <a:schemeClr val="accent1">
+            <a:lumMod val="60000"/>
+            <a:lumOff val="40000"/>
+          </a:schemeClr>
+        </a:buClr>
+        <a:buSzPct val="110000"/>
+        <a:buFont typeface="Wingdings 2" pitchFamily="18" charset="2"/>
+        <a:buChar char=""/>
+        <a:defRPr sz="2400" kern="1200">
           <a:solidFill>
-            <a:schemeClr val="tx1"/>
+            <a:schemeClr val="tx1">
+              <a:lumMod val="65000"/>
+              <a:lumOff val="35000"/>
+            </a:schemeClr>
           </a:solidFill>
           <a:latin typeface="+mn-lt"/>
           <a:ea typeface="+mn-ea"/>
           <a:cs typeface="+mn-cs"/>
         </a:defRPr>
       </a:lvl1pPr>
-      <a:lvl2pPr marL="742950" indent="-285750" algn="l" defTabSz="914400" rtl="0" eaLnBrk="1" latinLnBrk="0" hangingPunct="1">
+      <a:lvl2pPr marL="685800" indent="-336550" algn="l" defTabSz="914400" rtl="0" eaLnBrk="1" latinLnBrk="0" hangingPunct="1">
         <a:spcBef>
-          <a:spcPct val="20000"/>
+          <a:spcPts val="600"/>
         </a:spcBef>
-        <a:buFont typeface="Arial" pitchFamily="34" charset="0"/>
-        <a:buChar char="–"/>
-        <a:defRPr sz="2800" kern="1200">
+        <a:buClr>
+          <a:schemeClr val="accent1">
+            <a:lumMod val="75000"/>
+          </a:schemeClr>
+        </a:buClr>
+        <a:buSzPct val="110000"/>
+        <a:buFont typeface="Wingdings 2" pitchFamily="18" charset="2"/>
+        <a:buChar char=""/>
+        <a:defRPr sz="2200" kern="1200">
           <a:solidFill>
-            <a:schemeClr val="tx1"/>
+            <a:schemeClr val="tx1">
+              <a:lumMod val="65000"/>
+              <a:lumOff val="35000"/>
+            </a:schemeClr>
           </a:solidFill>
           <a:latin typeface="+mn-lt"/>
           <a:ea typeface="+mn-ea"/>
           <a:cs typeface="+mn-cs"/>
         </a:defRPr>
       </a:lvl2pPr>
-      <a:lvl3pPr marL="1143000" indent="-228600" algn="l" defTabSz="914400" rtl="0" eaLnBrk="1" latinLnBrk="0" hangingPunct="1">
+      <a:lvl3pPr marL="968375" indent="-282575" algn="l" defTabSz="914400" rtl="0" eaLnBrk="1" latinLnBrk="0" hangingPunct="1">
         <a:spcBef>
-          <a:spcPct val="20000"/>
+          <a:spcPts val="600"/>
         </a:spcBef>
-        <a:buFont typeface="Arial" pitchFamily="34" charset="0"/>
-        <a:buChar char="•"/>
-        <a:defRPr sz="2400" kern="1200">
+        <a:buClr>
+          <a:schemeClr val="accent1">
+            <a:lumMod val="60000"/>
+            <a:lumOff val="40000"/>
+          </a:schemeClr>
+        </a:buClr>
+        <a:buSzPct val="110000"/>
+        <a:buFont typeface="Wingdings 2" pitchFamily="18" charset="2"/>
+        <a:buChar char=""/>
+        <a:defRPr sz="2000" kern="1200">
           <a:solidFill>
-            <a:schemeClr val="tx1"/>
+            <a:schemeClr val="tx1">
+              <a:lumMod val="65000"/>
+              <a:lumOff val="35000"/>
+            </a:schemeClr>
           </a:solidFill>
           <a:latin typeface="+mn-lt"/>
           <a:ea typeface="+mn-ea"/>
           <a:cs typeface="+mn-cs"/>
         </a:defRPr>
       </a:lvl3pPr>
-      <a:lvl4pPr marL="1600200" indent="-228600" algn="l" defTabSz="914400" rtl="0" eaLnBrk="1" latinLnBrk="0" hangingPunct="1">
+      <a:lvl4pPr marL="1263650" indent="-295275" algn="l" defTabSz="914400" rtl="0" eaLnBrk="1" latinLnBrk="0" hangingPunct="1">
         <a:spcBef>
-          <a:spcPct val="20000"/>
+          <a:spcPts val="600"/>
         </a:spcBef>
-        <a:buFont typeface="Arial" pitchFamily="34" charset="0"/>
-        <a:buChar char="–"/>
-        <a:defRPr sz="2000" kern="1200">
+        <a:buClr>
+          <a:schemeClr val="accent1">
+            <a:lumMod val="75000"/>
+          </a:schemeClr>
+        </a:buClr>
+        <a:buSzPct val="110000"/>
+        <a:buFont typeface="Wingdings 2" pitchFamily="18" charset="2"/>
+        <a:buChar char=""/>
+        <a:defRPr sz="1800" kern="1200">
           <a:solidFill>
-            <a:schemeClr val="tx1"/>
+            <a:schemeClr val="tx1">
+              <a:lumMod val="65000"/>
+              <a:lumOff val="35000"/>
+            </a:schemeClr>
           </a:solidFill>
           <a:latin typeface="+mn-lt"/>
           <a:ea typeface="+mn-ea"/>
           <a:cs typeface="+mn-cs"/>
         </a:defRPr>
       </a:lvl4pPr>
-      <a:lvl5pPr marL="2057400" indent="-228600" algn="l" defTabSz="914400" rtl="0" eaLnBrk="1" latinLnBrk="0" hangingPunct="1">
+      <a:lvl5pPr marL="1546225" indent="-282575" algn="l" defTabSz="914400" rtl="0" eaLnBrk="1" latinLnBrk="0" hangingPunct="1">
         <a:spcBef>
-          <a:spcPct val="20000"/>
+          <a:spcPts val="600"/>
         </a:spcBef>
-        <a:buFont typeface="Arial" pitchFamily="34" charset="0"/>
-        <a:buChar char="»"/>
-        <a:defRPr sz="2000" kern="1200">
+        <a:buClr>
+          <a:schemeClr val="accent1">
+            <a:lumMod val="60000"/>
+            <a:lumOff val="40000"/>
+          </a:schemeClr>
+        </a:buClr>
+        <a:buSzPct val="110000"/>
+        <a:buFont typeface="Wingdings 2" pitchFamily="18" charset="2"/>
+        <a:buChar char=""/>
+        <a:defRPr sz="1800" kern="1200">
           <a:solidFill>
-            <a:schemeClr val="tx1"/>
+            <a:schemeClr val="tx1">
+              <a:lumMod val="65000"/>
+              <a:lumOff val="35000"/>
+            </a:schemeClr>
           </a:solidFill>
           <a:latin typeface="+mn-lt"/>
           <a:ea typeface="+mn-ea"/>
           <a:cs typeface="+mn-cs"/>
         </a:defRPr>
       </a:lvl5pPr>
-      <a:lvl6pPr marL="2514600" indent="-228600" algn="l" defTabSz="914400" rtl="0" eaLnBrk="1" latinLnBrk="0" hangingPunct="1">
+      <a:lvl6pPr marL="1828800" indent="-282575" algn="l" defTabSz="914400" rtl="0" eaLnBrk="1" latinLnBrk="0" hangingPunct="1">
         <a:spcBef>
           <a:spcPct val="20000"/>
         </a:spcBef>
-        <a:buFont typeface="Arial" pitchFamily="34" charset="0"/>
-        <a:buChar char="•"/>
-        <a:defRPr sz="2000" kern="1200">
+        <a:buClr>
+          <a:schemeClr val="accent2"/>
+        </a:buClr>
+        <a:buSzPct val="110000"/>
+        <a:buFont typeface="Wingdings 2" pitchFamily="18" charset="2"/>
+        <a:buChar char=""/>
+        <a:defRPr lang="en-US" sz="1800" kern="1200" dirty="0" smtClean="0">
           <a:solidFill>
-            <a:schemeClr val="tx1"/>
+            <a:schemeClr val="tx1">
+              <a:lumMod val="65000"/>
+              <a:lumOff val="35000"/>
+            </a:schemeClr>
           </a:solidFill>
           <a:latin typeface="+mn-lt"/>
           <a:ea typeface="+mn-ea"/>
           <a:cs typeface="+mn-cs"/>
         </a:defRPr>
       </a:lvl6pPr>
-      <a:lvl7pPr marL="2971800" indent="-228600" algn="l" defTabSz="914400" rtl="0" eaLnBrk="1" latinLnBrk="0" hangingPunct="1">
+      <a:lvl7pPr marL="2117725" indent="-282575" algn="l" defTabSz="914400" rtl="0" eaLnBrk="1" latinLnBrk="0" hangingPunct="1">
         <a:spcBef>
           <a:spcPct val="20000"/>
         </a:spcBef>
-        <a:buFont typeface="Arial" pitchFamily="34" charset="0"/>
-        <a:buChar char="•"/>
-        <a:defRPr sz="2000" kern="1200">
+        <a:buClr>
+          <a:schemeClr val="accent1">
+            <a:lumMod val="60000"/>
+            <a:lumOff val="40000"/>
+          </a:schemeClr>
+        </a:buClr>
+        <a:buSzPct val="110000"/>
+        <a:buFont typeface="Wingdings 2" pitchFamily="18" charset="2"/>
+        <a:buChar char=""/>
+        <a:defRPr lang="en-US" sz="1800" kern="1200" dirty="0" smtClean="0">
           <a:solidFill>
-            <a:schemeClr val="tx1"/>
+            <a:schemeClr val="tx1">
+              <a:lumMod val="65000"/>
+              <a:lumOff val="35000"/>
+            </a:schemeClr>
           </a:solidFill>
           <a:latin typeface="+mn-lt"/>
           <a:ea typeface="+mn-ea"/>
           <a:cs typeface="+mn-cs"/>
         </a:defRPr>
       </a:lvl7pPr>
-      <a:lvl8pPr marL="3429000" indent="-228600" algn="l" defTabSz="914400" rtl="0" eaLnBrk="1" latinLnBrk="0" hangingPunct="1">
+      <a:lvl8pPr marL="2398713" indent="-282575" algn="l" defTabSz="914400" rtl="0" eaLnBrk="1" latinLnBrk="0" hangingPunct="1">
         <a:spcBef>
           <a:spcPct val="20000"/>
         </a:spcBef>
-        <a:buFont typeface="Arial" pitchFamily="34" charset="0"/>
-        <a:buChar char="•"/>
-        <a:defRPr sz="2000" kern="1200">
+        <a:buClr>
+          <a:schemeClr val="accent2"/>
+        </a:buClr>
+        <a:buSzPct val="110000"/>
+        <a:buFont typeface="Wingdings 2" pitchFamily="18" charset="2"/>
+        <a:buChar char=""/>
+        <a:defRPr lang="en-US" sz="1800" kern="1200" dirty="0" smtClean="0">
           <a:solidFill>
-            <a:schemeClr val="tx1"/>
+            <a:schemeClr val="tx1">
+              <a:lumMod val="65000"/>
+              <a:lumOff val="35000"/>
+            </a:schemeClr>
           </a:solidFill>
           <a:latin typeface="+mn-lt"/>
           <a:ea typeface="+mn-ea"/>
           <a:cs typeface="+mn-cs"/>
         </a:defRPr>
       </a:lvl8pPr>
-      <a:lvl9pPr marL="3886200" indent="-228600" algn="l" defTabSz="914400" rtl="0" eaLnBrk="1" latinLnBrk="0" hangingPunct="1">
+      <a:lvl9pPr marL="2689225" indent="-282575" algn="l" defTabSz="914400" rtl="0" eaLnBrk="1" latinLnBrk="0" hangingPunct="1">
         <a:spcBef>
           <a:spcPct val="20000"/>
         </a:spcBef>
-        <a:buFont typeface="Arial" pitchFamily="34" charset="0"/>
-        <a:buChar char="•"/>
-        <a:defRPr sz="2000" kern="1200">
+        <a:buClr>
+          <a:schemeClr val="accent1">
+            <a:lumMod val="60000"/>
+            <a:lumOff val="40000"/>
+          </a:schemeClr>
+        </a:buClr>
+        <a:buSzPct val="110000"/>
+        <a:buFont typeface="Wingdings 2" pitchFamily="18" charset="2"/>
+        <a:buChar char=""/>
+        <a:defRPr lang="en-US" sz="1800" kern="1200" dirty="0">
           <a:solidFill>
-            <a:schemeClr val="tx1"/>
+            <a:schemeClr val="tx1">
+              <a:lumMod val="65000"/>
+              <a:lumOff val="35000"/>
+            </a:schemeClr>
           </a:solidFill>
           <a:latin typeface="+mn-lt"/>
           <a:ea typeface="+mn-ea"/>
@@ -3013,7 +3846,7 @@
     </p:bodyStyle>
     <p:otherStyle>
       <a:defPPr>
-        <a:defRPr lang="en-US"/>
+        <a:defRPr/>
       </a:defPPr>
       <a:lvl1pPr marL="0" algn="l" defTabSz="914400" rtl="0" eaLnBrk="1" latinLnBrk="0" hangingPunct="1">
         <a:defRPr sz="1800" kern="1200">
@@ -3136,36 +3969,36 @@
           <p:nvPr>
             <p:extLst>
               <p:ext uri="{D42A27DB-BD31-4B8C-83A1-F6EECF244321}">
-                <p14:modId xmlns:p14="http://schemas.microsoft.com/office/powerpoint/2010/main" val="3251908189"/>
+                <p14:modId xmlns:p14="http://schemas.microsoft.com/office/powerpoint/2010/main" val="268369441"/>
               </p:ext>
             </p:extLst>
           </p:nvPr>
         </p:nvGraphicFramePr>
         <p:xfrm>
-          <a:off x="838200" y="685800"/>
-          <a:ext cx="7391401" cy="2743201"/>
+          <a:off x="228600" y="1219200"/>
+          <a:ext cx="8610600" cy="2926080"/>
         </p:xfrm>
         <a:graphic>
           <a:graphicData uri="http://schemas.openxmlformats.org/drawingml/2006/table">
             <a:tbl>
-              <a:tblPr firstRow="1" bandRow="1">
+              <a:tblPr firstCol="1" bandRow="1">
                 <a:tableStyleId>{5C22544A-7EE6-4342-B048-85BDC9FD1C3A}</a:tableStyleId>
               </a:tblPr>
               <a:tblGrid>
-                <a:gridCol w="1676400"/>
-                <a:gridCol w="5715001"/>
+                <a:gridCol w="1295399"/>
+                <a:gridCol w="7315201"/>
               </a:tblGrid>
-              <a:tr h="304801">
+              <a:tr h="304800">
                 <a:tc>
                   <a:txBody>
                     <a:bodyPr/>
                     <a:lstStyle/>
                     <a:p>
                       <a:r>
-                        <a:rPr lang="en-US" sz="1200" dirty="0" smtClean="0"/>
-                        <a:t>Name</a:t>
+                        <a:rPr lang="en-US" sz="1000" dirty="0" smtClean="0"/>
+                        <a:t>State</a:t>
                       </a:r>
-                      <a:endParaRPr lang="en-US" sz="1200" dirty="0"/>
+                      <a:endParaRPr lang="en-US" sz="1000" dirty="0"/>
                     </a:p>
                   </a:txBody>
                   <a:tcPr/>
@@ -3176,10 +4009,10 @@
                     <a:lstStyle/>
                     <a:p>
                       <a:r>
-                        <a:rPr lang="en-US" sz="1200" dirty="0" smtClean="0"/>
-                        <a:t>{name}</a:t>
+                        <a:rPr lang="en-US" sz="1000" dirty="0" smtClean="0"/>
+                        <a:t>{state}</a:t>
                       </a:r>
-                      <a:endParaRPr lang="en-US" sz="1200" dirty="0"/>
+                      <a:endParaRPr lang="en-US" sz="1000" dirty="0"/>
                     </a:p>
                   </a:txBody>
                   <a:tcPr/>
@@ -3192,10 +4025,10 @@
                     <a:lstStyle/>
                     <a:p>
                       <a:r>
-                        <a:rPr lang="en-US" sz="1200" dirty="0" smtClean="0"/>
-                        <a:t>State</a:t>
+                        <a:rPr lang="en-US" sz="1000" dirty="0" smtClean="0"/>
+                        <a:t>Topic</a:t>
                       </a:r>
-                      <a:endParaRPr lang="en-US" sz="1200" dirty="0"/>
+                      <a:endParaRPr lang="en-US" sz="1000" dirty="0"/>
                     </a:p>
                   </a:txBody>
                   <a:tcPr/>
@@ -3206,10 +4039,10 @@
                     <a:lstStyle/>
                     <a:p>
                       <a:r>
-                        <a:rPr lang="en-US" sz="1200" dirty="0" smtClean="0"/>
-                        <a:t>{state}</a:t>
+                        <a:rPr lang="en-US" sz="1000" dirty="0" smtClean="0"/>
+                        <a:t>{topic}</a:t>
                       </a:r>
-                      <a:endParaRPr lang="en-US" sz="1200" dirty="0"/>
+                      <a:endParaRPr lang="en-US" sz="1000" dirty="0"/>
                     </a:p>
                   </a:txBody>
                   <a:tcPr/>
@@ -3222,10 +4055,10 @@
                     <a:lstStyle/>
                     <a:p>
                       <a:r>
-                        <a:rPr lang="en-US" sz="1200" dirty="0" smtClean="0"/>
-                        <a:t>Group</a:t>
+                        <a:rPr lang="en-US" sz="1000" dirty="0" smtClean="0"/>
+                        <a:t>Problem/Issue</a:t>
                       </a:r>
-                      <a:endParaRPr lang="en-US" sz="1200" dirty="0"/>
+                      <a:endParaRPr lang="en-US" sz="1000" dirty="0"/>
                     </a:p>
                   </a:txBody>
                   <a:tcPr/>
@@ -3236,10 +4069,10 @@
                     <a:lstStyle/>
                     <a:p>
                       <a:r>
-                        <a:rPr lang="en-US" sz="1200" dirty="0" smtClean="0"/>
-                        <a:t>{group}</a:t>
+                        <a:rPr lang="en-US" sz="1000" dirty="0" smtClean="0"/>
+                        <a:t>{issue}</a:t>
                       </a:r>
-                      <a:endParaRPr lang="en-US" sz="1200" dirty="0"/>
+                      <a:endParaRPr lang="en-US" sz="1000" dirty="0"/>
                     </a:p>
                   </a:txBody>
                   <a:tcPr/>
@@ -3252,10 +4085,10 @@
                     <a:lstStyle/>
                     <a:p>
                       <a:r>
-                        <a:rPr lang="en-US" sz="1200" dirty="0" smtClean="0"/>
-                        <a:t>Problem/Issue</a:t>
+                        <a:rPr lang="en-US" sz="1000" dirty="0" smtClean="0"/>
+                        <a:t>Decision</a:t>
                       </a:r>
-                      <a:endParaRPr lang="en-US" sz="1200" dirty="0"/>
+                      <a:endParaRPr lang="en-US" sz="1000" dirty="0"/>
                     </a:p>
                   </a:txBody>
                   <a:tcPr/>
@@ -3266,10 +4099,10 @@
                     <a:lstStyle/>
                     <a:p>
                       <a:r>
-                        <a:rPr lang="en-US" sz="1200" dirty="0" smtClean="0"/>
-                        <a:t>{issue}</a:t>
+                        <a:rPr lang="en-US" sz="1000" dirty="0" smtClean="0"/>
+                        <a:t>{decision}</a:t>
                       </a:r>
-                      <a:endParaRPr lang="en-US" sz="1200" dirty="0"/>
+                      <a:endParaRPr lang="en-US" sz="1000" dirty="0"/>
                     </a:p>
                   </a:txBody>
                   <a:tcPr/>
@@ -3282,10 +4115,10 @@
                     <a:lstStyle/>
                     <a:p>
                       <a:r>
-                        <a:rPr lang="en-US" sz="1200" dirty="0" smtClean="0"/>
-                        <a:t>Decision</a:t>
+                        <a:rPr lang="en-US" sz="1000" dirty="0" smtClean="0"/>
+                        <a:t>Alternatives</a:t>
                       </a:r>
-                      <a:endParaRPr lang="en-US" sz="1200" dirty="0"/>
+                      <a:endParaRPr lang="en-US" sz="1000" dirty="0"/>
                     </a:p>
                   </a:txBody>
                   <a:tcPr/>
@@ -3296,10 +4129,10 @@
                     <a:lstStyle/>
                     <a:p>
                       <a:r>
-                        <a:rPr lang="en-US" sz="1200" dirty="0" smtClean="0"/>
-                        <a:t>{decision}</a:t>
+                        <a:rPr lang="en-US" sz="1000" dirty="0" smtClean="0"/>
+                        <a:t>{alternatives}</a:t>
                       </a:r>
-                      <a:endParaRPr lang="en-US" sz="1200" dirty="0"/>
+                      <a:endParaRPr lang="en-US" sz="1000" dirty="0"/>
                     </a:p>
                   </a:txBody>
                   <a:tcPr/>
@@ -3312,10 +4145,10 @@
                     <a:lstStyle/>
                     <a:p>
                       <a:r>
-                        <a:rPr lang="en-US" sz="1200" dirty="0" smtClean="0"/>
-                        <a:t>Alternatives</a:t>
+                        <a:rPr lang="en-US" sz="1000" dirty="0" smtClean="0"/>
+                        <a:t>Arguments</a:t>
                       </a:r>
-                      <a:endParaRPr lang="en-US" sz="1200" dirty="0"/>
+                      <a:endParaRPr lang="en-US" sz="1000" dirty="0"/>
                     </a:p>
                   </a:txBody>
                   <a:tcPr/>
@@ -3326,10 +4159,10 @@
                     <a:lstStyle/>
                     <a:p>
                       <a:r>
-                        <a:rPr lang="en-US" sz="1200" dirty="0" smtClean="0"/>
-                        <a:t>{alternatives}</a:t>
+                        <a:rPr lang="en-US" sz="1000" dirty="0" smtClean="0"/>
+                        <a:t>{arguments}</a:t>
                       </a:r>
-                      <a:endParaRPr lang="en-US" sz="1200" dirty="0"/>
+                      <a:endParaRPr lang="en-US" sz="1000" dirty="0"/>
                     </a:p>
                   </a:txBody>
                   <a:tcPr/>
@@ -3342,10 +4175,10 @@
                     <a:lstStyle/>
                     <a:p>
                       <a:r>
-                        <a:rPr lang="en-US" sz="1200" dirty="0" smtClean="0"/>
-                        <a:t>Arguments</a:t>
+                        <a:rPr lang="en-US" sz="1000" dirty="0" smtClean="0"/>
+                        <a:t>Related Decision</a:t>
                       </a:r>
-                      <a:endParaRPr lang="en-US" sz="1200" dirty="0"/>
+                      <a:endParaRPr lang="en-US" sz="1000" dirty="0"/>
                     </a:p>
                   </a:txBody>
                   <a:tcPr/>
@@ -3356,10 +4189,10 @@
                     <a:lstStyle/>
                     <a:p>
                       <a:r>
-                        <a:rPr lang="en-US" sz="1200" dirty="0" smtClean="0"/>
-                        <a:t>{arguments}</a:t>
+                        <a:rPr lang="en-US" sz="1000" dirty="0" smtClean="0"/>
+                        <a:t>{decisions}</a:t>
                       </a:r>
-                      <a:endParaRPr lang="en-US" sz="1200" dirty="0"/>
+                      <a:endParaRPr lang="en-US" sz="1000" dirty="0"/>
                     </a:p>
                   </a:txBody>
                   <a:tcPr/>
@@ -3372,10 +4205,10 @@
                     <a:lstStyle/>
                     <a:p>
                       <a:r>
-                        <a:rPr lang="en-US" sz="1200" dirty="0" smtClean="0"/>
-                        <a:t>Related Decision</a:t>
+                        <a:rPr lang="en-US" sz="1000" dirty="0" smtClean="0"/>
+                        <a:t>Related Requirements</a:t>
                       </a:r>
-                      <a:endParaRPr lang="en-US" sz="1200" dirty="0"/>
+                      <a:endParaRPr lang="en-US" sz="1000" dirty="0"/>
                     </a:p>
                   </a:txBody>
                   <a:tcPr/>
@@ -3386,10 +4219,10 @@
                     <a:lstStyle/>
                     <a:p>
                       <a:r>
-                        <a:rPr lang="en-US" sz="1200" dirty="0" smtClean="0"/>
-                        <a:t>{decisions}</a:t>
+                        <a:rPr lang="en-US" sz="1000" dirty="0" smtClean="0"/>
+                        <a:t>{requirements}</a:t>
                       </a:r>
-                      <a:endParaRPr lang="en-US" sz="1200" dirty="0"/>
+                      <a:endParaRPr lang="en-US" sz="1000" dirty="0"/>
                     </a:p>
                   </a:txBody>
                   <a:tcPr/>
@@ -3402,10 +4235,10 @@
                     <a:lstStyle/>
                     <a:p>
                       <a:r>
-                        <a:rPr lang="en-US" sz="1200" dirty="0" smtClean="0"/>
-                        <a:t>Related Requirements</a:t>
+                        <a:rPr lang="en-US" sz="1000" dirty="0" smtClean="0"/>
+                        <a:t>Related Components</a:t>
                       </a:r>
-                      <a:endParaRPr lang="en-US" sz="1200" dirty="0"/>
+                      <a:endParaRPr lang="en-US" sz="1000" dirty="0"/>
                     </a:p>
                   </a:txBody>
                   <a:tcPr/>
@@ -3416,10 +4249,10 @@
                     <a:lstStyle/>
                     <a:p>
                       <a:r>
-                        <a:rPr lang="en-US" sz="1200" dirty="0" smtClean="0"/>
-                        <a:t>{requirements}</a:t>
+                        <a:rPr lang="en-US" sz="1000" dirty="0" smtClean="0"/>
+                        <a:t>{traces}</a:t>
                       </a:r>
-                      <a:endParaRPr lang="en-US" sz="1200" dirty="0"/>
+                      <a:endParaRPr lang="en-US" sz="1000" dirty="0"/>
                     </a:p>
                   </a:txBody>
                   <a:tcPr/>
@@ -3429,6 +4262,52 @@
           </a:graphicData>
         </a:graphic>
       </p:graphicFrame>
+      <p:sp>
+        <p:nvSpPr>
+          <p:cNvPr id="3" name="Title 2"/>
+          <p:cNvSpPr txBox="1">
+            <a:spLocks/>
+          </p:cNvSpPr>
+          <p:nvPr/>
+        </p:nvSpPr>
+        <p:spPr>
+          <a:xfrm>
+            <a:off x="533400" y="152400"/>
+            <a:ext cx="8042276" cy="758732"/>
+          </a:xfrm>
+          <a:prstGeom prst="rect">
+            <a:avLst/>
+          </a:prstGeom>
+        </p:spPr>
+        <p:txBody>
+          <a:bodyPr vert="horz" lIns="91440" tIns="45720" rIns="91440" bIns="45720" rtlCol="0" anchor="b" anchorCtr="0">
+            <a:noAutofit/>
+          </a:bodyPr>
+          <a:lstStyle>
+            <a:lvl1pPr algn="ctr" defTabSz="914400" rtl="0" eaLnBrk="1" latinLnBrk="0" hangingPunct="1">
+              <a:spcBef>
+                <a:spcPct val="0"/>
+              </a:spcBef>
+              <a:buNone/>
+              <a:defRPr sz="4600" kern="1200">
+                <a:solidFill>
+                  <a:schemeClr val="accent1"/>
+                </a:solidFill>
+                <a:latin typeface="+mj-lt"/>
+                <a:ea typeface="+mj-ea"/>
+                <a:cs typeface="+mj-cs"/>
+              </a:defRPr>
+            </a:lvl1pPr>
+          </a:lstStyle>
+          <a:p>
+            <a:r>
+              <a:rPr lang="en-US" sz="2200" dirty="0" smtClean="0"/>
+              <a:t>{name}</a:t>
+            </a:r>
+            <a:endParaRPr lang="en-US" sz="2200" dirty="0"/>
+          </a:p>
+        </p:txBody>
+      </p:sp>
     </p:spTree>
     <p:extLst>
       <p:ext uri="{BB962C8B-B14F-4D97-AF65-F5344CB8AC3E}">
@@ -3461,85 +4340,85 @@
       </p:grpSpPr>
       <p:sp>
         <p:nvSpPr>
-          <p:cNvPr id="2" name="Title 1"/>
-          <p:cNvSpPr>
-            <a:spLocks noGrp="1"/>
-          </p:cNvSpPr>
-          <p:nvPr>
-            <p:ph type="title"/>
-          </p:nvPr>
-        </p:nvSpPr>
-        <p:spPr/>
-        <p:txBody>
-          <a:bodyPr/>
-          <a:lstStyle/>
-          <a:p>
-            <a:r>
-              <a:rPr lang="en-US" dirty="0" smtClean="0"/>
-              <a:t>{title}</a:t>
-            </a:r>
-            <a:endParaRPr lang="en-US" dirty="0"/>
-          </a:p>
-        </p:txBody>
-      </p:sp>
-      <p:pic>
-        <p:nvPicPr>
-          <p:cNvPr id="1026" name="Picture 2"/>
-          <p:cNvPicPr>
-            <a:picLocks noChangeAspect="1" noChangeArrowheads="1"/>
-          </p:cNvPicPr>
+          <p:cNvPr id="3" name="Title 2"/>
+          <p:cNvSpPr txBox="1">
+            <a:spLocks/>
+          </p:cNvSpPr>
           <p:nvPr/>
-        </p:nvPicPr>
-        <p:blipFill>
-          <a:blip r:embed="rId2">
-            <a:extLst>
-              <a:ext uri="{28A0092B-C50C-407E-A947-70E740481C1C}">
-                <a14:useLocalDpi xmlns:a14="http://schemas.microsoft.com/office/drawing/2010/main" val="0"/>
-              </a:ext>
-            </a:extLst>
-          </a:blip>
-          <a:srcRect/>
-          <a:stretch>
-            <a:fillRect/>
-          </a:stretch>
-        </p:blipFill>
-        <p:spPr bwMode="auto">
+        </p:nvSpPr>
+        <p:spPr>
           <a:xfrm>
-            <a:off x="1295400" y="1447800"/>
-            <a:ext cx="6553200" cy="4932783"/>
+            <a:off x="533400" y="381000"/>
+            <a:ext cx="8042276" cy="1447800"/>
+          </a:xfrm>
+          <a:prstGeom prst="rect">
+            <a:avLst/>
+          </a:prstGeom>
+        </p:spPr>
+        <p:txBody>
+          <a:bodyPr vert="horz" lIns="91440" tIns="45720" rIns="91440" bIns="45720" rtlCol="0" anchor="b" anchorCtr="0">
+            <a:noAutofit/>
+          </a:bodyPr>
+          <a:lstStyle>
+            <a:lvl1pPr algn="ctr" defTabSz="914400" rtl="0" eaLnBrk="1" latinLnBrk="0" hangingPunct="1">
+              <a:spcBef>
+                <a:spcPct val="0"/>
+              </a:spcBef>
+              <a:buNone/>
+              <a:defRPr sz="4600" kern="1200">
+                <a:solidFill>
+                  <a:schemeClr val="accent1"/>
+                </a:solidFill>
+                <a:latin typeface="+mj-lt"/>
+                <a:ea typeface="+mj-ea"/>
+                <a:cs typeface="+mj-cs"/>
+              </a:defRPr>
+            </a:lvl1pPr>
+          </a:lstStyle>
+          <a:p>
+            <a:r>
+              <a:rPr lang="en-US" sz="2200" dirty="0" smtClean="0"/>
+              <a:t>{topic}</a:t>
+            </a:r>
+            <a:endParaRPr lang="en-US" sz="2200" dirty="0"/>
+          </a:p>
+        </p:txBody>
+      </p:sp>
+      <p:sp>
+        <p:nvSpPr>
+          <p:cNvPr id="2" name="TextBox 1"/>
+          <p:cNvSpPr txBox="1"/>
+          <p:nvPr/>
+        </p:nvSpPr>
+        <p:spPr>
+          <a:xfrm>
+            <a:off x="1495778" y="2111514"/>
+            <a:ext cx="6505222" cy="369332"/>
           </a:xfrm>
           <a:prstGeom prst="rect">
             <a:avLst/>
           </a:prstGeom>
           <a:noFill/>
-          <a:ln>
-            <a:noFill/>
-          </a:ln>
-          <a:extLst>
-            <a:ext uri="{909E8E84-426E-40DD-AFC4-6F175D3DCCD1}">
-              <a14:hiddenFill xmlns:a14="http://schemas.microsoft.com/office/drawing/2010/main">
-                <a:solidFill>
-                  <a:schemeClr val="accent1"/>
-                </a:solidFill>
-              </a14:hiddenFill>
-            </a:ext>
-            <a:ext uri="{91240B29-F687-4F45-9708-019B960494DF}">
-              <a14:hiddenLine xmlns:a14="http://schemas.microsoft.com/office/drawing/2010/main" w="9525">
-                <a:solidFill>
-                  <a:schemeClr val="tx1"/>
-                </a:solidFill>
-                <a:miter lim="800000"/>
-                <a:headEnd/>
-                <a:tailEnd/>
-              </a14:hiddenLine>
-            </a:ext>
-          </a:extLst>
         </p:spPr>
-      </p:pic>
+        <p:txBody>
+          <a:bodyPr wrap="square" rtlCol="0">
+            <a:spAutoFit/>
+          </a:bodyPr>
+          <a:lstStyle/>
+          <a:p>
+            <a:pPr algn="just"/>
+            <a:r>
+              <a:rPr lang="en-US" smtClean="0"/>
+              <a:t>{description}</a:t>
+            </a:r>
+            <a:endParaRPr lang="en-US" dirty="0"/>
+          </a:p>
+        </p:txBody>
+      </p:sp>
     </p:spTree>
     <p:extLst>
       <p:ext uri="{BB962C8B-B14F-4D97-AF65-F5344CB8AC3E}">
-        <p14:creationId xmlns:p14="http://schemas.microsoft.com/office/powerpoint/2010/main" val="3486677695"/>
+        <p14:creationId xmlns:p14="http://schemas.microsoft.com/office/powerpoint/2010/main" val="130268486"/>
       </p:ext>
     </p:extLst>
   </p:cSld>
@@ -3566,28 +4445,150 @@
           <a:chExt cx="0" cy="0"/>
         </a:xfrm>
       </p:grpSpPr>
-      <p:sp>
-        <p:nvSpPr>
-          <p:cNvPr id="2" name="Title 1"/>
-          <p:cNvSpPr>
-            <a:spLocks noGrp="1"/>
-          </p:cNvSpPr>
-          <p:nvPr>
-            <p:ph type="title"/>
-          </p:nvPr>
-        </p:nvSpPr>
-        <p:spPr/>
-        <p:txBody>
-          <a:bodyPr/>
-          <a:lstStyle/>
-          <a:p>
-            <a:r>
-              <a:rPr lang="en-US" dirty="0"/>
+      <p:pic>
+        <p:nvPicPr>
+          <p:cNvPr id="1026" name="Picture 2"/>
+          <p:cNvPicPr>
+            <a:picLocks noChangeAspect="1" noChangeArrowheads="1"/>
+          </p:cNvPicPr>
+          <p:nvPr/>
+        </p:nvPicPr>
+        <p:blipFill>
+          <a:blip r:embed="rId2" cstate="print">
+            <a:extLst>
+              <a:ext uri="{28A0092B-C50C-407E-A947-70E740481C1C}">
+                <a14:useLocalDpi xmlns:a14="http://schemas.microsoft.com/office/drawing/2010/main" val="0"/>
+              </a:ext>
+            </a:extLst>
+          </a:blip>
+          <a:srcRect/>
+          <a:stretch>
+            <a:fillRect/>
+          </a:stretch>
+        </p:blipFill>
+        <p:spPr bwMode="auto">
+          <a:xfrm>
+            <a:off x="457200" y="1219200"/>
+            <a:ext cx="8305800" cy="5354794"/>
+          </a:xfrm>
+          <a:prstGeom prst="rect">
+            <a:avLst/>
+          </a:prstGeom>
+          <a:ln>
+            <a:noFill/>
+          </a:ln>
+          <a:effectLst>
+            <a:outerShdw blurRad="292100" dist="139700" dir="2700000" algn="tl" rotWithShape="0">
+              <a:srgbClr val="333333">
+                <a:alpha val="65000"/>
+              </a:srgbClr>
+            </a:outerShdw>
+          </a:effectLst>
+          <a:extLst>
+            <a:ext uri="{909E8E84-426E-40dd-AFC4-6F175D3DCCD1}">
+              <a14:hiddenFill xmlns:a14="http://schemas.microsoft.com/office/drawing/2010/main">
+                <a:solidFill>
+                  <a:schemeClr val="accent1"/>
+                </a:solidFill>
+              </a14:hiddenFill>
+            </a:ext>
+            <a:ext uri="{91240B29-F687-4f45-9708-019B960494DF}">
+              <a14:hiddenLine xmlns:a14="http://schemas.microsoft.com/office/drawing/2010/main" w="9525">
+                <a:solidFill>
+                  <a:schemeClr val="tx1"/>
+                </a:solidFill>
+                <a:miter lim="800000"/>
+                <a:headEnd/>
+                <a:tailEnd/>
+              </a14:hiddenLine>
+            </a:ext>
+          </a:extLst>
+        </p:spPr>
+      </p:pic>
+      <p:sp>
+        <p:nvSpPr>
+          <p:cNvPr id="5" name="Title 2"/>
+          <p:cNvSpPr txBox="1">
+            <a:spLocks/>
+          </p:cNvSpPr>
+          <p:nvPr/>
+        </p:nvSpPr>
+        <p:spPr>
+          <a:xfrm>
+            <a:off x="533400" y="152400"/>
+            <a:ext cx="8042276" cy="758732"/>
+          </a:xfrm>
+          <a:prstGeom prst="rect">
+            <a:avLst/>
+          </a:prstGeom>
+        </p:spPr>
+        <p:txBody>
+          <a:bodyPr vert="horz" lIns="91440" tIns="45720" rIns="91440" bIns="45720" rtlCol="0" anchor="b" anchorCtr="0">
+            <a:noAutofit/>
+          </a:bodyPr>
+          <a:lstStyle>
+            <a:lvl1pPr algn="ctr" defTabSz="914400" rtl="0" eaLnBrk="1" latinLnBrk="0" hangingPunct="1">
+              <a:spcBef>
+                <a:spcPct val="0"/>
+              </a:spcBef>
+              <a:buNone/>
+              <a:defRPr sz="4600" kern="1200">
+                <a:solidFill>
+                  <a:schemeClr val="accent1"/>
+                </a:solidFill>
+                <a:latin typeface="+mj-lt"/>
+                <a:ea typeface="+mj-ea"/>
+                <a:cs typeface="+mj-cs"/>
+              </a:defRPr>
+            </a:lvl1pPr>
+          </a:lstStyle>
+          <a:p>
+            <a:r>
+              <a:rPr lang="en-US" sz="2200" dirty="0" smtClean="0"/>
               <a:t>{title}</a:t>
             </a:r>
-          </a:p>
-        </p:txBody>
-      </p:sp>
+            <a:endParaRPr lang="en-US" sz="2200" dirty="0"/>
+          </a:p>
+        </p:txBody>
+      </p:sp>
+    </p:spTree>
+    <p:extLst>
+      <p:ext uri="{BB962C8B-B14F-4D97-AF65-F5344CB8AC3E}">
+        <p14:creationId xmlns:p14="http://schemas.microsoft.com/office/powerpoint/2010/main" val="3486677695"/>
+      </p:ext>
+    </p:extLst>
+  </p:cSld>
+  <p:clrMapOvr>
+    <a:masterClrMapping/>
+  </p:clrMapOvr>
+  <mc:AlternateContent xmlns:mc="http://schemas.openxmlformats.org/markup-compatibility/2006" xmlns:p14="http://schemas.microsoft.com/office/powerpoint/2010/main">
+    <mc:Choice Requires="p14">
+      <p:transition spd="slow" p14:dur="2000"/>
+    </mc:Choice>
+    <mc:Fallback xmlns="">
+      <p:transition xmlns:p14="http://schemas.microsoft.com/office/powerpoint/2010/main" spd="slow"/>
+    </mc:Fallback>
+  </mc:AlternateContent>
+</p:sld>
+</file>
+
+<file path=ppt/slides/slide4.xml><?xml version="1.0" encoding="utf-8"?>
+<p:sld xmlns:a="http://schemas.openxmlformats.org/drawingml/2006/main" xmlns:r="http://schemas.openxmlformats.org/officeDocument/2006/relationships" xmlns:p="http://schemas.openxmlformats.org/presentationml/2006/main">
+  <p:cSld>
+    <p:spTree>
+      <p:nvGrpSpPr>
+        <p:cNvPr id="1" name=""/>
+        <p:cNvGrpSpPr/>
+        <p:nvPr/>
+      </p:nvGrpSpPr>
+      <p:grpSpPr>
+        <a:xfrm>
+          <a:off x="0" y="0"/>
+          <a:ext cx="0" cy="0"/>
+          <a:chOff x="0" y="0"/>
+          <a:chExt cx="0" cy="0"/>
+        </a:xfrm>
+      </p:grpSpPr>
       <p:graphicFrame>
         <p:nvGraphicFramePr>
           <p:cNvPr id="4" name="Table 3"/>
@@ -3597,24 +4598,24 @@
           <p:nvPr>
             <p:extLst>
               <p:ext uri="{D42A27DB-BD31-4B8C-83A1-F6EECF244321}">
-                <p14:modId xmlns:p14="http://schemas.microsoft.com/office/powerpoint/2010/main" val="2079796323"/>
+                <p14:modId xmlns:p14="http://schemas.microsoft.com/office/powerpoint/2010/main" val="2159725999"/>
               </p:ext>
             </p:extLst>
           </p:nvPr>
         </p:nvGraphicFramePr>
         <p:xfrm>
-          <a:off x="304800" y="1600200"/>
-          <a:ext cx="3124200" cy="274320"/>
+          <a:off x="228600" y="1295400"/>
+          <a:ext cx="2819400" cy="274320"/>
         </p:xfrm>
         <a:graphic>
           <a:graphicData uri="http://schemas.openxmlformats.org/drawingml/2006/table">
             <a:tbl>
-              <a:tblPr firstRow="1" bandRow="1">
+              <a:tblPr firstRow="1" firstCol="1" bandRow="1">
                 <a:tableStyleId>{5C22544A-7EE6-4342-B048-85BDC9FD1C3A}</a:tableStyleId>
               </a:tblPr>
               <a:tblGrid>
-                <a:gridCol w="1562100"/>
-                <a:gridCol w="1562100"/>
+                <a:gridCol w="1828800"/>
+                <a:gridCol w="990600"/>
               </a:tblGrid>
               <a:tr h="228600">
                 <a:tc>
@@ -3646,6 +4647,52 @@
           </a:graphicData>
         </a:graphic>
       </p:graphicFrame>
+      <p:sp>
+        <p:nvSpPr>
+          <p:cNvPr id="5" name="Title 2"/>
+          <p:cNvSpPr txBox="1">
+            <a:spLocks/>
+          </p:cNvSpPr>
+          <p:nvPr/>
+        </p:nvSpPr>
+        <p:spPr>
+          <a:xfrm>
+            <a:off x="533400" y="152400"/>
+            <a:ext cx="8042276" cy="758732"/>
+          </a:xfrm>
+          <a:prstGeom prst="rect">
+            <a:avLst/>
+          </a:prstGeom>
+        </p:spPr>
+        <p:txBody>
+          <a:bodyPr vert="horz" lIns="91440" tIns="45720" rIns="91440" bIns="45720" rtlCol="0" anchor="b" anchorCtr="0">
+            <a:noAutofit/>
+          </a:bodyPr>
+          <a:lstStyle>
+            <a:lvl1pPr algn="ctr" defTabSz="914400" rtl="0" eaLnBrk="1" latinLnBrk="0" hangingPunct="1">
+              <a:spcBef>
+                <a:spcPct val="0"/>
+              </a:spcBef>
+              <a:buNone/>
+              <a:defRPr sz="4600" kern="1200">
+                <a:solidFill>
+                  <a:schemeClr val="accent1"/>
+                </a:solidFill>
+                <a:latin typeface="+mj-lt"/>
+                <a:ea typeface="+mj-ea"/>
+                <a:cs typeface="+mj-cs"/>
+              </a:defRPr>
+            </a:lvl1pPr>
+          </a:lstStyle>
+          <a:p>
+            <a:r>
+              <a:rPr lang="en-US" dirty="0" smtClean="0"/>
+              <a:t>{title}</a:t>
+            </a:r>
+            <a:endParaRPr lang="en-US" dirty="0"/>
+          </a:p>
+        </p:txBody>
+      </p:sp>
     </p:spTree>
     <p:extLst>
       <p:ext uri="{BB962C8B-B14F-4D97-AF65-F5344CB8AC3E}">
@@ -3656,13 +4703,21 @@
   <p:clrMapOvr>
     <a:masterClrMapping/>
   </p:clrMapOvr>
+  <mc:AlternateContent xmlns:mc="http://schemas.openxmlformats.org/markup-compatibility/2006" xmlns:p14="http://schemas.microsoft.com/office/powerpoint/2010/main">
+    <mc:Choice Requires="p14">
+      <p:transition spd="slow" p14:dur="2000"/>
+    </mc:Choice>
+    <mc:Fallback xmlns="">
+      <p:transition xmlns:p14="http://schemas.microsoft.com/office/powerpoint/2010/main" spd="slow"/>
+    </mc:Fallback>
+  </mc:AlternateContent>
 </p:sld>
 </file>
 
 <file path=ppt/theme/theme1.xml><?xml version="1.0" encoding="utf-8"?>
-<a:theme xmlns:a="http://schemas.openxmlformats.org/drawingml/2006/main" name="Office Theme">
+<a:theme xmlns:a="http://schemas.openxmlformats.org/drawingml/2006/main" name="Breeze">
   <a:themeElements>
-    <a:clrScheme name="Office">
+    <a:clrScheme name="Breeze">
       <a:dk1>
         <a:sysClr val="windowText" lastClr="000000"/>
       </a:dk1>
@@ -3670,162 +4725,107 @@
         <a:sysClr val="window" lastClr="FFFFFF"/>
       </a:lt1>
       <a:dk2>
-        <a:srgbClr val="1F497D"/>
+        <a:srgbClr val="09213B"/>
       </a:dk2>
       <a:lt2>
-        <a:srgbClr val="EEECE1"/>
+        <a:srgbClr val="D5EDF4"/>
       </a:lt2>
       <a:accent1>
-        <a:srgbClr val="4F81BD"/>
+        <a:srgbClr val="2C7C9F"/>
       </a:accent1>
       <a:accent2>
-        <a:srgbClr val="C0504D"/>
+        <a:srgbClr val="244A58"/>
       </a:accent2>
       <a:accent3>
-        <a:srgbClr val="9BBB59"/>
+        <a:srgbClr val="E2751D"/>
       </a:accent3>
       <a:accent4>
-        <a:srgbClr val="8064A2"/>
+        <a:srgbClr val="FFB400"/>
       </a:accent4>
       <a:accent5>
-        <a:srgbClr val="4BACC6"/>
+        <a:srgbClr val="7EB606"/>
       </a:accent5>
       <a:accent6>
-        <a:srgbClr val="F79646"/>
+        <a:srgbClr val="C00000"/>
       </a:accent6>
       <a:hlink>
-        <a:srgbClr val="0000FF"/>
+        <a:srgbClr val="7030A0"/>
       </a:hlink>
       <a:folHlink>
-        <a:srgbClr val="800080"/>
+        <a:srgbClr val="00B0F0"/>
       </a:folHlink>
     </a:clrScheme>
-    <a:fontScheme name="Office">
+    <a:fontScheme name="Breeze">
       <a:majorFont>
-        <a:latin typeface="Calibri"/>
+        <a:latin typeface="News Gothic MT"/>
         <a:ea typeface=""/>
         <a:cs typeface=""/>
         <a:font script="Jpan" typeface="ＭＳ Ｐゴシック"/>
-        <a:font script="Hang" typeface="맑은 고딕"/>
         <a:font script="Hans" typeface="宋体"/>
         <a:font script="Hant" typeface="新細明體"/>
-        <a:font script="Arab" typeface="Times New Roman"/>
-        <a:font script="Hebr" typeface="Times New Roman"/>
-        <a:font script="Thai" typeface="Angsana New"/>
-        <a:font script="Ethi" typeface="Nyala"/>
-        <a:font script="Beng" typeface="Vrinda"/>
-        <a:font script="Gujr" typeface="Shruti"/>
-        <a:font script="Khmr" typeface="MoolBoran"/>
-        <a:font script="Knda" typeface="Tunga"/>
-        <a:font script="Guru" typeface="Raavi"/>
-        <a:font script="Cans" typeface="Euphemia"/>
-        <a:font script="Cher" typeface="Plantagenet Cherokee"/>
-        <a:font script="Yiii" typeface="Microsoft Yi Baiti"/>
-        <a:font script="Tibt" typeface="Microsoft Himalaya"/>
-        <a:font script="Thaa" typeface="MV Boli"/>
-        <a:font script="Deva" typeface="Mangal"/>
-        <a:font script="Telu" typeface="Gautami"/>
-        <a:font script="Taml" typeface="Latha"/>
-        <a:font script="Syrc" typeface="Estrangelo Edessa"/>
-        <a:font script="Orya" typeface="Kalinga"/>
-        <a:font script="Mlym" typeface="Kartika"/>
-        <a:font script="Laoo" typeface="DokChampa"/>
-        <a:font script="Sinh" typeface="Iskoola Pota"/>
-        <a:font script="Mong" typeface="Mongolian Baiti"/>
-        <a:font script="Viet" typeface="Times New Roman"/>
-        <a:font script="Uigh" typeface="Microsoft Uighur"/>
-        <a:font script="Geor" typeface="Sylfaen"/>
       </a:majorFont>
       <a:minorFont>
-        <a:latin typeface="Calibri"/>
+        <a:latin typeface="News Gothic MT"/>
         <a:ea typeface=""/>
         <a:cs typeface=""/>
         <a:font script="Jpan" typeface="ＭＳ Ｐゴシック"/>
-        <a:font script="Hang" typeface="맑은 고딕"/>
         <a:font script="Hans" typeface="宋体"/>
         <a:font script="Hant" typeface="新細明體"/>
-        <a:font script="Arab" typeface="Arial"/>
-        <a:font script="Hebr" typeface="Arial"/>
-        <a:font script="Thai" typeface="Cordia New"/>
-        <a:font script="Ethi" typeface="Nyala"/>
-        <a:font script="Beng" typeface="Vrinda"/>
-        <a:font script="Gujr" typeface="Shruti"/>
-        <a:font script="Khmr" typeface="DaunPenh"/>
-        <a:font script="Knda" typeface="Tunga"/>
-        <a:font script="Guru" typeface="Raavi"/>
-        <a:font script="Cans" typeface="Euphemia"/>
-        <a:font script="Cher" typeface="Plantagenet Cherokee"/>
-        <a:font script="Yiii" typeface="Microsoft Yi Baiti"/>
-        <a:font script="Tibt" typeface="Microsoft Himalaya"/>
-        <a:font script="Thaa" typeface="MV Boli"/>
-        <a:font script="Deva" typeface="Mangal"/>
-        <a:font script="Telu" typeface="Gautami"/>
-        <a:font script="Taml" typeface="Latha"/>
-        <a:font script="Syrc" typeface="Estrangelo Edessa"/>
-        <a:font script="Orya" typeface="Kalinga"/>
-        <a:font script="Mlym" typeface="Kartika"/>
-        <a:font script="Laoo" typeface="DokChampa"/>
-        <a:font script="Sinh" typeface="Iskoola Pota"/>
-        <a:font script="Mong" typeface="Mongolian Baiti"/>
-        <a:font script="Viet" typeface="Arial"/>
-        <a:font script="Uigh" typeface="Microsoft Uighur"/>
-        <a:font script="Geor" typeface="Sylfaen"/>
       </a:minorFont>
     </a:fontScheme>
-    <a:fmtScheme name="Office">
+    <a:fmtScheme name="Breeze">
       <a:fillStyleLst>
         <a:solidFill>
           <a:schemeClr val="phClr"/>
         </a:solidFill>
         <a:gradFill rotWithShape="1">
           <a:gsLst>
-            <a:gs pos="0">
+            <a:gs pos="31000">
               <a:schemeClr val="phClr">
-                <a:tint val="50000"/>
-                <a:satMod val="300000"/>
-              </a:schemeClr>
-            </a:gs>
-            <a:gs pos="35000">
-              <a:schemeClr val="phClr">
-                <a:tint val="37000"/>
-                <a:satMod val="300000"/>
+                <a:tint val="100000"/>
+                <a:shade val="100000"/>
+                <a:satMod val="120000"/>
               </a:schemeClr>
             </a:gs>
             <a:gs pos="100000">
               <a:schemeClr val="phClr">
-                <a:tint val="15000"/>
-                <a:satMod val="350000"/>
+                <a:tint val="50000"/>
+                <a:satMod val="150000"/>
               </a:schemeClr>
             </a:gs>
           </a:gsLst>
-          <a:lin ang="16200000" scaled="1"/>
+          <a:lin ang="5400000" scaled="1"/>
         </a:gradFill>
         <a:gradFill rotWithShape="1">
           <a:gsLst>
             <a:gs pos="0">
               <a:schemeClr val="phClr">
-                <a:shade val="51000"/>
-                <a:satMod val="130000"/>
+                <a:shade val="100000"/>
+                <a:satMod val="120000"/>
               </a:schemeClr>
             </a:gs>
-            <a:gs pos="80000">
+            <a:gs pos="69000">
               <a:schemeClr val="phClr">
-                <a:shade val="93000"/>
-                <a:satMod val="130000"/>
+                <a:tint val="80000"/>
+                <a:shade val="100000"/>
+                <a:satMod val="150000"/>
               </a:schemeClr>
             </a:gs>
             <a:gs pos="100000">
               <a:schemeClr val="phClr">
-                <a:shade val="94000"/>
-                <a:satMod val="135000"/>
+                <a:tint val="50000"/>
+                <a:shade val="100000"/>
+                <a:satMod val="150000"/>
               </a:schemeClr>
             </a:gs>
           </a:gsLst>
-          <a:lin ang="16200000" scaled="0"/>
+          <a:path path="circle">
+            <a:fillToRect l="100000" t="100000" r="100000" b="100000"/>
+          </a:path>
         </a:gradFill>
       </a:fillStyleLst>
       <a:lnStyleLst>
-        <a:ln w="9525" cap="flat" cmpd="sng" algn="ctr">
+        <a:ln w="12700" cap="flat" cmpd="sng" algn="ctr">
           <a:solidFill>
             <a:schemeClr val="phClr">
               <a:shade val="95000"/>
@@ -3834,13 +4834,13 @@
           </a:solidFill>
           <a:prstDash val="solid"/>
         </a:ln>
-        <a:ln w="25400" cap="flat" cmpd="sng" algn="ctr">
+        <a:ln w="25400" cap="flat" cmpd="dbl" algn="ctr">
           <a:solidFill>
             <a:schemeClr val="phClr"/>
           </a:solidFill>
           <a:prstDash val="solid"/>
         </a:ln>
-        <a:ln w="38100" cap="flat" cmpd="sng" algn="ctr">
+        <a:ln w="31750" cap="flat" cmpd="dbl" algn="ctr">
           <a:solidFill>
             <a:schemeClr val="phClr"/>
           </a:solidFill>
@@ -3849,41 +4849,38 @@
       </a:lnStyleLst>
       <a:effectStyleLst>
         <a:effectStyle>
+          <a:effectLst/>
+        </a:effectStyle>
+        <a:effectStyle>
           <a:effectLst>
-            <a:outerShdw blurRad="40000" dist="20000" dir="5400000" rotWithShape="0">
+            <a:outerShdw blurRad="63500" dist="25400" dir="5400000" sx="101000" sy="101000" rotWithShape="0">
               <a:srgbClr val="000000">
-                <a:alpha val="38000"/>
+                <a:alpha val="40000"/>
               </a:srgbClr>
             </a:outerShdw>
           </a:effectLst>
         </a:effectStyle>
         <a:effectStyle>
           <a:effectLst>
-            <a:outerShdw blurRad="40000" dist="23000" dir="5400000" rotWithShape="0">
-              <a:srgbClr val="000000">
-                <a:alpha val="35000"/>
+            <a:innerShdw blurRad="127000" dist="25400" dir="13500000">
+              <a:srgbClr val="C0C0C0">
+                <a:alpha val="75000"/>
               </a:srgbClr>
-            </a:outerShdw>
-          </a:effectLst>
-        </a:effectStyle>
-        <a:effectStyle>
-          <a:effectLst>
-            <a:outerShdw blurRad="40000" dist="23000" dir="5400000" rotWithShape="0">
-              <a:srgbClr val="000000">
-                <a:alpha val="35000"/>
+            </a:innerShdw>
+            <a:outerShdw blurRad="88900" dist="25400" dir="5400000" sx="102000" sy="102000" algn="ctr" rotWithShape="0">
+              <a:srgbClr val="C0C0C0">
+                <a:alpha val="40000"/>
               </a:srgbClr>
             </a:outerShdw>
           </a:effectLst>
           <a:scene3d>
-            <a:camera prst="orthographicFront">
-              <a:rot lat="0" lon="0" rev="0"/>
-            </a:camera>
-            <a:lightRig rig="threePt" dir="t">
-              <a:rot lat="0" lon="0" rev="1200000"/>
+            <a:camera prst="perspectiveLeft" fov="300000"/>
+            <a:lightRig rig="soft" dir="l">
+              <a:rot lat="0" lon="0" rev="4200000"/>
             </a:lightRig>
           </a:scene3d>
-          <a:sp3d>
-            <a:bevelT w="63500" h="25400"/>
+          <a:sp3d extrusionH="38100" prstMaterial="powder">
+            <a:bevelT w="50800" h="88900" prst="convex"/>
           </a:sp3d>
         </a:effectStyle>
       </a:effectStyleLst>
@@ -3917,29 +4914,68 @@
             <a:fillToRect l="50000" t="-80000" r="50000" b="180000"/>
           </a:path>
         </a:gradFill>
-        <a:gradFill rotWithShape="1">
-          <a:gsLst>
-            <a:gs pos="0">
+        <a:blipFill rotWithShape="1">
+          <a:blip xmlns:r="http://schemas.openxmlformats.org/officeDocument/2006/relationships" r:embed="rId1">
+            <a:duotone>
               <a:schemeClr val="phClr">
-                <a:tint val="80000"/>
-                <a:satMod val="300000"/>
+                <a:shade val="40000"/>
+                <a:satMod val="400000"/>
               </a:schemeClr>
-            </a:gs>
-            <a:gs pos="100000">
               <a:schemeClr val="phClr">
-                <a:shade val="30000"/>
+                <a:tint val="10000"/>
                 <a:satMod val="200000"/>
               </a:schemeClr>
-            </a:gs>
-          </a:gsLst>
-          <a:path path="circle">
-            <a:fillToRect l="50000" t="50000" r="50000" b="50000"/>
-          </a:path>
-        </a:gradFill>
+            </a:duotone>
+          </a:blip>
+          <a:stretch/>
+        </a:blipFill>
       </a:bgFillStyleLst>
     </a:fmtScheme>
   </a:themeElements>
-  <a:objectDefaults/>
+  <a:objectDefaults>
+    <a:spDef>
+      <a:spPr/>
+      <a:bodyPr rtlCol="0" anchor="ctr"/>
+      <a:lstStyle>
+        <a:defPPr algn="ctr">
+          <a:defRPr/>
+        </a:defPPr>
+      </a:lstStyle>
+      <a:style>
+        <a:lnRef idx="1">
+          <a:schemeClr val="accent1"/>
+        </a:lnRef>
+        <a:fillRef idx="3">
+          <a:schemeClr val="accent1"/>
+        </a:fillRef>
+        <a:effectRef idx="2">
+          <a:schemeClr val="accent1"/>
+        </a:effectRef>
+        <a:fontRef idx="minor">
+          <a:schemeClr val="lt1"/>
+        </a:fontRef>
+      </a:style>
+    </a:spDef>
+    <a:lnDef>
+      <a:spPr/>
+      <a:bodyPr/>
+      <a:lstStyle/>
+      <a:style>
+        <a:lnRef idx="2">
+          <a:schemeClr val="accent1"/>
+        </a:lnRef>
+        <a:fillRef idx="0">
+          <a:schemeClr val="accent1"/>
+        </a:fillRef>
+        <a:effectRef idx="1">
+          <a:schemeClr val="accent1"/>
+        </a:effectRef>
+        <a:fontRef idx="minor">
+          <a:schemeClr val="tx1"/>
+        </a:fontRef>
+      </a:style>
+    </a:lnDef>
+  </a:objectDefaults>
   <a:extraClrSchemeLst/>
 </a:theme>
 </file>
</xml_diff>